<commit_message>
les events + exos + pwp
</commit_message>
<xml_diff>
--- a/cours.pptx
+++ b/cours.pptx
@@ -91,6 +91,16 @@
     <p:sldId id="407" r:id="rId85"/>
     <p:sldId id="408" r:id="rId86"/>
     <p:sldId id="409" r:id="rId87"/>
+    <p:sldId id="382" r:id="rId88"/>
+    <p:sldId id="383" r:id="rId89"/>
+    <p:sldId id="384" r:id="rId90"/>
+    <p:sldId id="388" r:id="rId91"/>
+    <p:sldId id="389" r:id="rId92"/>
+    <p:sldId id="390" r:id="rId93"/>
+    <p:sldId id="385" r:id="rId94"/>
+    <p:sldId id="386" r:id="rId95"/>
+    <p:sldId id="414" r:id="rId96"/>
+    <p:sldId id="387" r:id="rId97"/>
   </p:sldIdLst>
   <p:sldSz cx="12192000" cy="6858000"/>
   <p:notesSz cx="6858000" cy="9144000"/>
@@ -344,7 +354,7 @@
           <a:p>
             <a:fld id="{6AD61AA8-A60B-4213-843B-33CCD8DDD4AE}" type="datetimeFigureOut">
               <a:rPr lang="fr-FR" smtClean="0"/>
-              <a:t>18/12/2023</a:t>
+              <a:t>19/12/2023</a:t>
             </a:fld>
             <a:endParaRPr lang="fr-FR"/>
           </a:p>
@@ -542,7 +552,7 @@
           <a:p>
             <a:fld id="{6AD61AA8-A60B-4213-843B-33CCD8DDD4AE}" type="datetimeFigureOut">
               <a:rPr lang="fr-FR" smtClean="0"/>
-              <a:t>18/12/2023</a:t>
+              <a:t>19/12/2023</a:t>
             </a:fld>
             <a:endParaRPr lang="fr-FR"/>
           </a:p>
@@ -750,7 +760,7 @@
           <a:p>
             <a:fld id="{6AD61AA8-A60B-4213-843B-33CCD8DDD4AE}" type="datetimeFigureOut">
               <a:rPr lang="fr-FR" smtClean="0"/>
-              <a:t>18/12/2023</a:t>
+              <a:t>19/12/2023</a:t>
             </a:fld>
             <a:endParaRPr lang="fr-FR"/>
           </a:p>
@@ -948,7 +958,7 @@
           <a:p>
             <a:fld id="{6AD61AA8-A60B-4213-843B-33CCD8DDD4AE}" type="datetimeFigureOut">
               <a:rPr lang="fr-FR" smtClean="0"/>
-              <a:t>18/12/2023</a:t>
+              <a:t>19/12/2023</a:t>
             </a:fld>
             <a:endParaRPr lang="fr-FR"/>
           </a:p>
@@ -1223,7 +1233,7 @@
           <a:p>
             <a:fld id="{6AD61AA8-A60B-4213-843B-33CCD8DDD4AE}" type="datetimeFigureOut">
               <a:rPr lang="fr-FR" smtClean="0"/>
-              <a:t>18/12/2023</a:t>
+              <a:t>19/12/2023</a:t>
             </a:fld>
             <a:endParaRPr lang="fr-FR"/>
           </a:p>
@@ -1488,7 +1498,7 @@
           <a:p>
             <a:fld id="{6AD61AA8-A60B-4213-843B-33CCD8DDD4AE}" type="datetimeFigureOut">
               <a:rPr lang="fr-FR" smtClean="0"/>
-              <a:t>18/12/2023</a:t>
+              <a:t>19/12/2023</a:t>
             </a:fld>
             <a:endParaRPr lang="fr-FR"/>
           </a:p>
@@ -1900,7 +1910,7 @@
           <a:p>
             <a:fld id="{6AD61AA8-A60B-4213-843B-33CCD8DDD4AE}" type="datetimeFigureOut">
               <a:rPr lang="fr-FR" smtClean="0"/>
-              <a:t>18/12/2023</a:t>
+              <a:t>19/12/2023</a:t>
             </a:fld>
             <a:endParaRPr lang="fr-FR"/>
           </a:p>
@@ -2041,7 +2051,7 @@
           <a:p>
             <a:fld id="{6AD61AA8-A60B-4213-843B-33CCD8DDD4AE}" type="datetimeFigureOut">
               <a:rPr lang="fr-FR" smtClean="0"/>
-              <a:t>18/12/2023</a:t>
+              <a:t>19/12/2023</a:t>
             </a:fld>
             <a:endParaRPr lang="fr-FR"/>
           </a:p>
@@ -2154,7 +2164,7 @@
           <a:p>
             <a:fld id="{6AD61AA8-A60B-4213-843B-33CCD8DDD4AE}" type="datetimeFigureOut">
               <a:rPr lang="fr-FR" smtClean="0"/>
-              <a:t>18/12/2023</a:t>
+              <a:t>19/12/2023</a:t>
             </a:fld>
             <a:endParaRPr lang="fr-FR"/>
           </a:p>
@@ -2465,7 +2475,7 @@
           <a:p>
             <a:fld id="{6AD61AA8-A60B-4213-843B-33CCD8DDD4AE}" type="datetimeFigureOut">
               <a:rPr lang="fr-FR" smtClean="0"/>
-              <a:t>18/12/2023</a:t>
+              <a:t>19/12/2023</a:t>
             </a:fld>
             <a:endParaRPr lang="fr-FR"/>
           </a:p>
@@ -2753,7 +2763,7 @@
           <a:p>
             <a:fld id="{6AD61AA8-A60B-4213-843B-33CCD8DDD4AE}" type="datetimeFigureOut">
               <a:rPr lang="fr-FR" smtClean="0"/>
-              <a:t>18/12/2023</a:t>
+              <a:t>19/12/2023</a:t>
             </a:fld>
             <a:endParaRPr lang="fr-FR"/>
           </a:p>
@@ -2994,7 +3004,7 @@
           <a:p>
             <a:fld id="{6AD61AA8-A60B-4213-843B-33CCD8DDD4AE}" type="datetimeFigureOut">
               <a:rPr lang="fr-FR" smtClean="0"/>
-              <a:t>18/12/2023</a:t>
+              <a:t>19/12/2023</a:t>
             </a:fld>
             <a:endParaRPr lang="fr-FR"/>
           </a:p>
@@ -18972,20 +18982,20 @@
           <a:p>
             <a:pPr algn="ctr"/>
             <a:endParaRPr lang="fr-FR" sz="2800" dirty="0">
-              <a:hlinkClick r:id="rId2"/>
+              <a:hlinkClick r:id=""/>
             </a:endParaRPr>
           </a:p>
           <a:p>
             <a:pPr algn="ctr"/>
             <a:endParaRPr lang="fr-FR" sz="2800" dirty="0">
-              <a:hlinkClick r:id="rId2"/>
+              <a:hlinkClick r:id=""/>
             </a:endParaRPr>
           </a:p>
           <a:p>
             <a:pPr algn="ctr"/>
             <a:r>
               <a:rPr lang="fr-FR" sz="2800" dirty="0">
-                <a:hlinkClick r:id="rId2"/>
+                <a:hlinkClick r:id=""/>
               </a:rPr>
               <a:t>DOC MDN </a:t>
             </a:r>
@@ -19008,7 +19018,7 @@
           <p:nvPr/>
         </p:nvPicPr>
         <p:blipFill>
-          <a:blip r:embed="rId3">
+          <a:blip r:embed="rId2">
             <a:extLst>
               <a:ext uri="{28A0092B-C50C-407E-A947-70E740481C1C}">
                 <a14:useLocalDpi xmlns:a14="http://schemas.microsoft.com/office/drawing/2010/main" val="0"/>
@@ -19465,20 +19475,20 @@
           <a:p>
             <a:pPr algn="ctr"/>
             <a:endParaRPr lang="fr-FR" sz="2800" dirty="0">
-              <a:hlinkClick r:id="rId2"/>
+              <a:hlinkClick r:id=""/>
             </a:endParaRPr>
           </a:p>
           <a:p>
             <a:pPr algn="ctr"/>
             <a:endParaRPr lang="fr-FR" sz="2800" dirty="0">
-              <a:hlinkClick r:id="rId2"/>
+              <a:hlinkClick r:id=""/>
             </a:endParaRPr>
           </a:p>
           <a:p>
             <a:pPr algn="ctr"/>
             <a:r>
               <a:rPr lang="fr-FR" sz="2800" dirty="0">
-                <a:hlinkClick r:id="rId3"/>
+                <a:hlinkClick r:id="rId2"/>
               </a:rPr>
               <a:t>DOC MDN </a:t>
             </a:r>
@@ -19501,7 +19511,7 @@
           <p:nvPr/>
         </p:nvPicPr>
         <p:blipFill>
-          <a:blip r:embed="rId4">
+          <a:blip r:embed="rId3">
             <a:extLst>
               <a:ext uri="{28A0092B-C50C-407E-A947-70E740481C1C}">
                 <a14:useLocalDpi xmlns:a14="http://schemas.microsoft.com/office/drawing/2010/main" val="0"/>
@@ -19841,20 +19851,20 @@
           <a:p>
             <a:pPr algn="ctr"/>
             <a:endParaRPr lang="fr-FR" sz="2800" dirty="0">
-              <a:hlinkClick r:id="rId2"/>
+              <a:hlinkClick r:id=""/>
             </a:endParaRPr>
           </a:p>
           <a:p>
             <a:pPr algn="ctr"/>
             <a:endParaRPr lang="fr-FR" sz="2800" dirty="0">
-              <a:hlinkClick r:id="rId2"/>
+              <a:hlinkClick r:id=""/>
             </a:endParaRPr>
           </a:p>
           <a:p>
             <a:pPr algn="ctr"/>
             <a:r>
               <a:rPr lang="fr-FR" sz="2800" dirty="0">
-                <a:hlinkClick r:id="rId3"/>
+                <a:hlinkClick r:id="rId2"/>
               </a:rPr>
               <a:t>DOC MDN </a:t>
             </a:r>
@@ -19877,7 +19887,7 @@
           <p:nvPr/>
         </p:nvPicPr>
         <p:blipFill>
-          <a:blip r:embed="rId4">
+          <a:blip r:embed="rId3">
             <a:extLst>
               <a:ext uri="{28A0092B-C50C-407E-A947-70E740481C1C}">
                 <a14:useLocalDpi xmlns:a14="http://schemas.microsoft.com/office/drawing/2010/main" val="0"/>
@@ -23852,6 +23862,707 @@
 </p:sld>
 </file>
 
+<file path=ppt/slides/slide87.xml><?xml version="1.0" encoding="utf-8"?>
+<p:sld xmlns:a="http://schemas.openxmlformats.org/drawingml/2006/main" xmlns:r="http://schemas.openxmlformats.org/officeDocument/2006/relationships" xmlns:p="http://schemas.openxmlformats.org/presentationml/2006/main">
+  <p:cSld>
+    <p:spTree>
+      <p:nvGrpSpPr>
+        <p:cNvPr id="1" name=""/>
+        <p:cNvGrpSpPr/>
+        <p:nvPr/>
+      </p:nvGrpSpPr>
+      <p:grpSpPr>
+        <a:xfrm>
+          <a:off x="0" y="0"/>
+          <a:ext cx="0" cy="0"/>
+          <a:chOff x="0" y="0"/>
+          <a:chExt cx="0" cy="0"/>
+        </a:xfrm>
+      </p:grpSpPr>
+      <p:sp>
+        <p:nvSpPr>
+          <p:cNvPr id="3" name="Titre 1">
+            <a:extLst>
+              <a:ext uri="{FF2B5EF4-FFF2-40B4-BE49-F238E27FC236}">
+                <a16:creationId xmlns:a16="http://schemas.microsoft.com/office/drawing/2014/main" id="{E7373E66-041F-37D5-0ADF-25BA87ABC979}"/>
+              </a:ext>
+            </a:extLst>
+          </p:cNvPr>
+          <p:cNvSpPr>
+            <a:spLocks noGrp="1"/>
+          </p:cNvSpPr>
+          <p:nvPr>
+            <p:ph type="title"/>
+          </p:nvPr>
+        </p:nvSpPr>
+        <p:spPr>
+          <a:xfrm>
+            <a:off x="1097279" y="286603"/>
+            <a:ext cx="11167425" cy="1450757"/>
+          </a:xfrm>
+        </p:spPr>
+        <p:txBody>
+          <a:bodyPr>
+            <a:normAutofit/>
+          </a:bodyPr>
+          <a:lstStyle/>
+          <a:p>
+            <a:r>
+              <a:rPr lang="fr-FR" dirty="0"/>
+              <a:t>IX- Les évènements </a:t>
+            </a:r>
+            <a:br>
+              <a:rPr lang="fr-FR" dirty="0"/>
+            </a:br>
+            <a:r>
+              <a:rPr lang="fr-FR" dirty="0"/>
+              <a:t>	</a:t>
+            </a:r>
+            <a:r>
+              <a:rPr lang="fr-FR" sz="3600" i="1" dirty="0"/>
+              <a:t>  1. Définition</a:t>
+            </a:r>
+          </a:p>
+        </p:txBody>
+      </p:sp>
+      <p:sp>
+        <p:nvSpPr>
+          <p:cNvPr id="2" name="ZoneTexte 1">
+            <a:extLst>
+              <a:ext uri="{FF2B5EF4-FFF2-40B4-BE49-F238E27FC236}">
+                <a16:creationId xmlns:a16="http://schemas.microsoft.com/office/drawing/2014/main" id="{7D71B00C-76FE-E5DE-9A9B-A3535EC275EF}"/>
+              </a:ext>
+            </a:extLst>
+          </p:cNvPr>
+          <p:cNvSpPr txBox="1"/>
+          <p:nvPr/>
+        </p:nvSpPr>
+        <p:spPr>
+          <a:xfrm>
+            <a:off x="478172" y="2567030"/>
+            <a:ext cx="11006355" cy="3416320"/>
+          </a:xfrm>
+          <a:prstGeom prst="rect">
+            <a:avLst/>
+          </a:prstGeom>
+          <a:noFill/>
+        </p:spPr>
+        <p:txBody>
+          <a:bodyPr wrap="square" rtlCol="0">
+            <a:spAutoFit/>
+          </a:bodyPr>
+          <a:lstStyle/>
+          <a:p>
+            <a:r>
+              <a:rPr lang="fr-FR" sz="2400" dirty="0"/>
+              <a:t>En programmation un évènement correspond à une action de l’utilisateur, par exemple:</a:t>
+            </a:r>
+          </a:p>
+          <a:p>
+            <a:r>
+              <a:rPr lang="fr-FR" sz="2400" dirty="0"/>
+              <a:t>Clic sur un bouton, pression sur une touche, chargement d’une page etc..</a:t>
+            </a:r>
+          </a:p>
+          <a:p>
+            <a:endParaRPr lang="fr-FR" sz="2400" dirty="0"/>
+          </a:p>
+          <a:p>
+            <a:r>
+              <a:rPr lang="fr-FR" sz="2400" dirty="0"/>
+              <a:t>En JavaScript, les évènements sont enregistrés comme des </a:t>
+            </a:r>
+            <a:r>
+              <a:rPr lang="fr-FR" sz="2400" b="1" dirty="0"/>
+              <a:t>objets</a:t>
+            </a:r>
+            <a:r>
+              <a:rPr lang="fr-FR" sz="2400" dirty="0"/>
+              <a:t> et contiennent des </a:t>
+            </a:r>
+            <a:r>
+              <a:rPr lang="fr-FR" sz="2400" b="1" dirty="0"/>
+              <a:t>informations</a:t>
+            </a:r>
+            <a:r>
+              <a:rPr lang="fr-FR" sz="2400" dirty="0"/>
+              <a:t> sur l’action qui a été effectuée.</a:t>
+            </a:r>
+          </a:p>
+          <a:p>
+            <a:endParaRPr lang="fr-FR" sz="2400" dirty="0"/>
+          </a:p>
+          <a:p>
+            <a:r>
+              <a:rPr lang="fr-FR" sz="2400" dirty="0"/>
+              <a:t>Pour appliquer une action ou une fonction au déclenchement d’un évènement, nous utilisons des </a:t>
+            </a:r>
+            <a:r>
+              <a:rPr lang="fr-FR" sz="2400" b="1" dirty="0"/>
+              <a:t>écouteurs d’évènements</a:t>
+            </a:r>
+            <a:r>
+              <a:rPr lang="fr-FR" sz="2400" dirty="0"/>
+              <a:t>(</a:t>
+            </a:r>
+            <a:r>
+              <a:rPr lang="fr-FR" sz="2400" dirty="0" err="1"/>
+              <a:t>event</a:t>
+            </a:r>
+            <a:r>
+              <a:rPr lang="fr-FR" sz="2400" dirty="0"/>
+              <a:t> </a:t>
+            </a:r>
+            <a:r>
+              <a:rPr lang="fr-FR" sz="2400" dirty="0" err="1"/>
+              <a:t>listeners</a:t>
+            </a:r>
+            <a:r>
+              <a:rPr lang="fr-FR" sz="2400" dirty="0"/>
+              <a:t>).</a:t>
+            </a:r>
+          </a:p>
+        </p:txBody>
+      </p:sp>
+      <p:pic>
+        <p:nvPicPr>
+          <p:cNvPr id="4" name="Picture 12" descr="JavaScript Logo et symbole, sens, histoire, PNG, marque">
+            <a:extLst>
+              <a:ext uri="{FF2B5EF4-FFF2-40B4-BE49-F238E27FC236}">
+                <a16:creationId xmlns:a16="http://schemas.microsoft.com/office/drawing/2014/main" id="{45EEDE3F-9FB6-A6C0-87D4-EBFEC2E789B2}"/>
+              </a:ext>
+            </a:extLst>
+          </p:cNvPr>
+          <p:cNvPicPr>
+            <a:picLocks noChangeAspect="1" noChangeArrowheads="1"/>
+          </p:cNvPicPr>
+          <p:nvPr/>
+        </p:nvPicPr>
+        <p:blipFill>
+          <a:blip r:embed="rId2">
+            <a:extLst>
+              <a:ext uri="{28A0092B-C50C-407E-A947-70E740481C1C}">
+                <a14:useLocalDpi xmlns:a14="http://schemas.microsoft.com/office/drawing/2010/main" val="0"/>
+              </a:ext>
+            </a:extLst>
+          </a:blip>
+          <a:srcRect/>
+          <a:stretch>
+            <a:fillRect/>
+          </a:stretch>
+        </p:blipFill>
+        <p:spPr bwMode="auto">
+          <a:xfrm>
+            <a:off x="10380582" y="286603"/>
+            <a:ext cx="1550195" cy="876779"/>
+          </a:xfrm>
+          <a:prstGeom prst="rect">
+            <a:avLst/>
+          </a:prstGeom>
+          <a:noFill/>
+          <a:extLst>
+            <a:ext uri="{909E8E84-426E-40DD-AFC4-6F175D3DCCD1}">
+              <a14:hiddenFill xmlns:a14="http://schemas.microsoft.com/office/drawing/2010/main">
+                <a:solidFill>
+                  <a:srgbClr val="FFFFFF"/>
+                </a:solidFill>
+              </a14:hiddenFill>
+            </a:ext>
+          </a:extLst>
+        </p:spPr>
+      </p:pic>
+    </p:spTree>
+    <p:extLst>
+      <p:ext uri="{BB962C8B-B14F-4D97-AF65-F5344CB8AC3E}">
+        <p14:creationId xmlns:p14="http://schemas.microsoft.com/office/powerpoint/2010/main" val="316983045"/>
+      </p:ext>
+    </p:extLst>
+  </p:cSld>
+  <p:clrMapOvr>
+    <a:masterClrMapping/>
+  </p:clrMapOvr>
+</p:sld>
+</file>
+
+<file path=ppt/slides/slide88.xml><?xml version="1.0" encoding="utf-8"?>
+<p:sld xmlns:a="http://schemas.openxmlformats.org/drawingml/2006/main" xmlns:r="http://schemas.openxmlformats.org/officeDocument/2006/relationships" xmlns:p="http://schemas.openxmlformats.org/presentationml/2006/main">
+  <p:cSld>
+    <p:spTree>
+      <p:nvGrpSpPr>
+        <p:cNvPr id="1" name=""/>
+        <p:cNvGrpSpPr/>
+        <p:nvPr/>
+      </p:nvGrpSpPr>
+      <p:grpSpPr>
+        <a:xfrm>
+          <a:off x="0" y="0"/>
+          <a:ext cx="0" cy="0"/>
+          <a:chOff x="0" y="0"/>
+          <a:chExt cx="0" cy="0"/>
+        </a:xfrm>
+      </p:grpSpPr>
+      <p:sp>
+        <p:nvSpPr>
+          <p:cNvPr id="3" name="Titre 1">
+            <a:extLst>
+              <a:ext uri="{FF2B5EF4-FFF2-40B4-BE49-F238E27FC236}">
+                <a16:creationId xmlns:a16="http://schemas.microsoft.com/office/drawing/2014/main" id="{E7373E66-041F-37D5-0ADF-25BA87ABC979}"/>
+              </a:ext>
+            </a:extLst>
+          </p:cNvPr>
+          <p:cNvSpPr>
+            <a:spLocks noGrp="1"/>
+          </p:cNvSpPr>
+          <p:nvPr>
+            <p:ph type="title"/>
+          </p:nvPr>
+        </p:nvSpPr>
+        <p:spPr>
+          <a:xfrm>
+            <a:off x="1097279" y="286603"/>
+            <a:ext cx="11167425" cy="1450757"/>
+          </a:xfrm>
+        </p:spPr>
+        <p:txBody>
+          <a:bodyPr>
+            <a:normAutofit/>
+          </a:bodyPr>
+          <a:lstStyle/>
+          <a:p>
+            <a:r>
+              <a:rPr lang="fr-FR" dirty="0"/>
+              <a:t>IX- Les évènements </a:t>
+            </a:r>
+            <a:br>
+              <a:rPr lang="fr-FR" dirty="0"/>
+            </a:br>
+            <a:r>
+              <a:rPr lang="fr-FR" dirty="0"/>
+              <a:t>	</a:t>
+            </a:r>
+            <a:r>
+              <a:rPr lang="fr-FR" sz="3600" i="1" dirty="0"/>
+              <a:t>  2. Les écouteurs on…</a:t>
+            </a:r>
+          </a:p>
+        </p:txBody>
+      </p:sp>
+      <p:sp>
+        <p:nvSpPr>
+          <p:cNvPr id="4" name="ZoneTexte 3">
+            <a:extLst>
+              <a:ext uri="{FF2B5EF4-FFF2-40B4-BE49-F238E27FC236}">
+                <a16:creationId xmlns:a16="http://schemas.microsoft.com/office/drawing/2014/main" id="{68D493F2-3FA0-16D4-01C6-572CC7863DF5}"/>
+              </a:ext>
+            </a:extLst>
+          </p:cNvPr>
+          <p:cNvSpPr txBox="1"/>
+          <p:nvPr/>
+        </p:nvSpPr>
+        <p:spPr>
+          <a:xfrm>
+            <a:off x="1333850" y="2449585"/>
+            <a:ext cx="9806730" cy="2092881"/>
+          </a:xfrm>
+          <a:prstGeom prst="rect">
+            <a:avLst/>
+          </a:prstGeom>
+          <a:noFill/>
+        </p:spPr>
+        <p:txBody>
+          <a:bodyPr wrap="square" rtlCol="0">
+            <a:spAutoFit/>
+          </a:bodyPr>
+          <a:lstStyle/>
+          <a:p>
+            <a:r>
+              <a:rPr lang="fr-FR" sz="2800" dirty="0"/>
+              <a:t>Les écouteurs de types on… peuvent être utilisés:</a:t>
+            </a:r>
+          </a:p>
+          <a:p>
+            <a:endParaRPr lang="fr-FR" sz="2800" dirty="0"/>
+          </a:p>
+          <a:p>
+            <a:pPr marL="285750" indent="-285750">
+              <a:buFont typeface="Arial" panose="020B0604020202020204" pitchFamily="34" charset="0"/>
+              <a:buChar char="•"/>
+            </a:pPr>
+            <a:r>
+              <a:rPr lang="fr-FR" sz="2800" dirty="0"/>
+              <a:t>directement dans le html en </a:t>
+            </a:r>
+            <a:r>
+              <a:rPr lang="fr-FR" sz="2800" dirty="0" err="1"/>
+              <a:t>inline</a:t>
+            </a:r>
+            <a:r>
+              <a:rPr lang="fr-FR" sz="2800" dirty="0"/>
+              <a:t> ( comme le </a:t>
+            </a:r>
+            <a:r>
+              <a:rPr lang="fr-FR" sz="2800" dirty="0" err="1"/>
+              <a:t>css</a:t>
+            </a:r>
+            <a:r>
+              <a:rPr lang="fr-FR" sz="2800" dirty="0"/>
+              <a:t>)</a:t>
+            </a:r>
+          </a:p>
+          <a:p>
+            <a:pPr marL="285750" indent="-285750">
+              <a:buFont typeface="Arial" panose="020B0604020202020204" pitchFamily="34" charset="0"/>
+              <a:buChar char="•"/>
+            </a:pPr>
+            <a:r>
+              <a:rPr lang="fr-FR" sz="2800" dirty="0"/>
+              <a:t>Sur un script à part  </a:t>
+            </a:r>
+          </a:p>
+          <a:p>
+            <a:r>
+              <a:rPr lang="fr-FR" dirty="0"/>
+              <a:t> </a:t>
+            </a:r>
+          </a:p>
+        </p:txBody>
+      </p:sp>
+      <p:sp>
+        <p:nvSpPr>
+          <p:cNvPr id="5" name="ZoneTexte 4">
+            <a:extLst>
+              <a:ext uri="{FF2B5EF4-FFF2-40B4-BE49-F238E27FC236}">
+                <a16:creationId xmlns:a16="http://schemas.microsoft.com/office/drawing/2014/main" id="{879A148B-B2CB-AD62-6069-EE721D219390}"/>
+              </a:ext>
+            </a:extLst>
+          </p:cNvPr>
+          <p:cNvSpPr txBox="1"/>
+          <p:nvPr/>
+        </p:nvSpPr>
+        <p:spPr>
+          <a:xfrm>
+            <a:off x="2313683" y="5283215"/>
+            <a:ext cx="9700750" cy="369332"/>
+          </a:xfrm>
+          <a:prstGeom prst="rect">
+            <a:avLst/>
+          </a:prstGeom>
+          <a:noFill/>
+        </p:spPr>
+        <p:txBody>
+          <a:bodyPr wrap="square" rtlCol="0">
+            <a:spAutoFit/>
+          </a:bodyPr>
+          <a:lstStyle/>
+          <a:p>
+            <a:r>
+              <a:rPr lang="fr-FR" dirty="0"/>
+              <a:t>Les écouteurs on.. Sont des méthodes qui tendent à disparaitre</a:t>
+            </a:r>
+          </a:p>
+        </p:txBody>
+      </p:sp>
+      <p:pic>
+        <p:nvPicPr>
+          <p:cNvPr id="2" name="Picture 12" descr="JavaScript Logo et symbole, sens, histoire, PNG, marque">
+            <a:extLst>
+              <a:ext uri="{FF2B5EF4-FFF2-40B4-BE49-F238E27FC236}">
+                <a16:creationId xmlns:a16="http://schemas.microsoft.com/office/drawing/2014/main" id="{B02E4448-F103-E37E-EFAF-41A830569C34}"/>
+              </a:ext>
+            </a:extLst>
+          </p:cNvPr>
+          <p:cNvPicPr>
+            <a:picLocks noChangeAspect="1" noChangeArrowheads="1"/>
+          </p:cNvPicPr>
+          <p:nvPr/>
+        </p:nvPicPr>
+        <p:blipFill>
+          <a:blip r:embed="rId2">
+            <a:extLst>
+              <a:ext uri="{28A0092B-C50C-407E-A947-70E740481C1C}">
+                <a14:useLocalDpi xmlns:a14="http://schemas.microsoft.com/office/drawing/2010/main" val="0"/>
+              </a:ext>
+            </a:extLst>
+          </a:blip>
+          <a:srcRect/>
+          <a:stretch>
+            <a:fillRect/>
+          </a:stretch>
+        </p:blipFill>
+        <p:spPr bwMode="auto">
+          <a:xfrm>
+            <a:off x="10380582" y="286603"/>
+            <a:ext cx="1550195" cy="876779"/>
+          </a:xfrm>
+          <a:prstGeom prst="rect">
+            <a:avLst/>
+          </a:prstGeom>
+          <a:noFill/>
+          <a:extLst>
+            <a:ext uri="{909E8E84-426E-40DD-AFC4-6F175D3DCCD1}">
+              <a14:hiddenFill xmlns:a14="http://schemas.microsoft.com/office/drawing/2010/main">
+                <a:solidFill>
+                  <a:srgbClr val="FFFFFF"/>
+                </a:solidFill>
+              </a14:hiddenFill>
+            </a:ext>
+          </a:extLst>
+        </p:spPr>
+      </p:pic>
+    </p:spTree>
+    <p:extLst>
+      <p:ext uri="{BB962C8B-B14F-4D97-AF65-F5344CB8AC3E}">
+        <p14:creationId xmlns:p14="http://schemas.microsoft.com/office/powerpoint/2010/main" val="1381700047"/>
+      </p:ext>
+    </p:extLst>
+  </p:cSld>
+  <p:clrMapOvr>
+    <a:masterClrMapping/>
+  </p:clrMapOvr>
+</p:sld>
+</file>
+
+<file path=ppt/slides/slide89.xml><?xml version="1.0" encoding="utf-8"?>
+<p:sld xmlns:a="http://schemas.openxmlformats.org/drawingml/2006/main" xmlns:r="http://schemas.openxmlformats.org/officeDocument/2006/relationships" xmlns:p="http://schemas.openxmlformats.org/presentationml/2006/main">
+  <p:cSld>
+    <p:spTree>
+      <p:nvGrpSpPr>
+        <p:cNvPr id="1" name=""/>
+        <p:cNvGrpSpPr/>
+        <p:nvPr/>
+      </p:nvGrpSpPr>
+      <p:grpSpPr>
+        <a:xfrm>
+          <a:off x="0" y="0"/>
+          <a:ext cx="0" cy="0"/>
+          <a:chOff x="0" y="0"/>
+          <a:chExt cx="0" cy="0"/>
+        </a:xfrm>
+      </p:grpSpPr>
+      <p:sp>
+        <p:nvSpPr>
+          <p:cNvPr id="3" name="Titre 1">
+            <a:extLst>
+              <a:ext uri="{FF2B5EF4-FFF2-40B4-BE49-F238E27FC236}">
+                <a16:creationId xmlns:a16="http://schemas.microsoft.com/office/drawing/2014/main" id="{E7373E66-041F-37D5-0ADF-25BA87ABC979}"/>
+              </a:ext>
+            </a:extLst>
+          </p:cNvPr>
+          <p:cNvSpPr>
+            <a:spLocks noGrp="1"/>
+          </p:cNvSpPr>
+          <p:nvPr>
+            <p:ph type="title"/>
+          </p:nvPr>
+        </p:nvSpPr>
+        <p:spPr>
+          <a:xfrm>
+            <a:off x="1097279" y="286603"/>
+            <a:ext cx="11167425" cy="1450757"/>
+          </a:xfrm>
+        </p:spPr>
+        <p:txBody>
+          <a:bodyPr>
+            <a:normAutofit/>
+          </a:bodyPr>
+          <a:lstStyle/>
+          <a:p>
+            <a:r>
+              <a:rPr lang="fr-FR" dirty="0"/>
+              <a:t>IX- Les évènements </a:t>
+            </a:r>
+            <a:br>
+              <a:rPr lang="fr-FR" dirty="0"/>
+            </a:br>
+            <a:r>
+              <a:rPr lang="fr-FR" dirty="0"/>
+              <a:t>	</a:t>
+            </a:r>
+            <a:r>
+              <a:rPr lang="fr-FR" sz="3600" i="1" dirty="0"/>
+              <a:t>  2. Les gestionnaire d’évènements </a:t>
+            </a:r>
+          </a:p>
+        </p:txBody>
+      </p:sp>
+      <p:sp>
+        <p:nvSpPr>
+          <p:cNvPr id="4" name="ZoneTexte 3">
+            <a:extLst>
+              <a:ext uri="{FF2B5EF4-FFF2-40B4-BE49-F238E27FC236}">
+                <a16:creationId xmlns:a16="http://schemas.microsoft.com/office/drawing/2014/main" id="{F48D1965-5159-6736-5F19-C7327EFCE6B4}"/>
+              </a:ext>
+            </a:extLst>
+          </p:cNvPr>
+          <p:cNvSpPr txBox="1"/>
+          <p:nvPr/>
+        </p:nvSpPr>
+        <p:spPr>
+          <a:xfrm>
+            <a:off x="914399" y="2465523"/>
+            <a:ext cx="10687575" cy="1477328"/>
+          </a:xfrm>
+          <a:prstGeom prst="rect">
+            <a:avLst/>
+          </a:prstGeom>
+          <a:noFill/>
+        </p:spPr>
+        <p:txBody>
+          <a:bodyPr wrap="square" rtlCol="0">
+            <a:spAutoFit/>
+          </a:bodyPr>
+          <a:lstStyle/>
+          <a:p>
+            <a:r>
+              <a:rPr lang="fr-FR" dirty="0"/>
+              <a:t>On privilégie l’utilisation de l’écouteur du gestionnaire d’évènements </a:t>
+            </a:r>
+            <a:r>
+              <a:rPr lang="fr-FR" dirty="0">
+                <a:sym typeface="Wingdings" panose="05000000000000000000" pitchFamily="2" charset="2"/>
+              </a:rPr>
+              <a:t> </a:t>
+            </a:r>
+            <a:r>
+              <a:rPr lang="fr-FR" b="1" dirty="0" err="1">
+                <a:sym typeface="Wingdings" panose="05000000000000000000" pitchFamily="2" charset="2"/>
+              </a:rPr>
+              <a:t>addEvenListener</a:t>
+            </a:r>
+            <a:r>
+              <a:rPr lang="fr-FR" b="1" dirty="0">
+                <a:sym typeface="Wingdings" panose="05000000000000000000" pitchFamily="2" charset="2"/>
+              </a:rPr>
+              <a:t>()</a:t>
+            </a:r>
+          </a:p>
+          <a:p>
+            <a:endParaRPr lang="fr-FR" dirty="0">
+              <a:sym typeface="Wingdings" panose="05000000000000000000" pitchFamily="2" charset="2"/>
+            </a:endParaRPr>
+          </a:p>
+          <a:p>
+            <a:r>
+              <a:rPr lang="fr-FR" dirty="0"/>
+              <a:t>Elle prend </a:t>
+            </a:r>
+            <a:r>
+              <a:rPr lang="fr-FR" b="1" dirty="0"/>
+              <a:t>deux arguments</a:t>
+            </a:r>
+            <a:r>
+              <a:rPr lang="fr-FR" dirty="0"/>
+              <a:t>: le premier argument est </a:t>
+            </a:r>
+            <a:r>
+              <a:rPr lang="fr-FR" b="1" dirty="0"/>
+              <a:t>le type d'événement </a:t>
+            </a:r>
+            <a:r>
+              <a:rPr lang="fr-FR" dirty="0"/>
+              <a:t>que l'on souhaite écouter et le deuxième argument est une </a:t>
+            </a:r>
+            <a:r>
+              <a:rPr lang="fr-FR" b="1" dirty="0"/>
+              <a:t>fonction de rappel </a:t>
+            </a:r>
+            <a:r>
+              <a:rPr lang="fr-FR" dirty="0"/>
+              <a:t>(ou "callback") qui sera exécutée chaque fois que l'événement se produit.</a:t>
+            </a:r>
+          </a:p>
+        </p:txBody>
+      </p:sp>
+      <p:pic>
+        <p:nvPicPr>
+          <p:cNvPr id="5" name="Image 4">
+            <a:extLst>
+              <a:ext uri="{FF2B5EF4-FFF2-40B4-BE49-F238E27FC236}">
+                <a16:creationId xmlns:a16="http://schemas.microsoft.com/office/drawing/2014/main" id="{776074B8-1BC6-423D-5D24-9A531A7C4743}"/>
+              </a:ext>
+            </a:extLst>
+          </p:cNvPr>
+          <p:cNvPicPr>
+            <a:picLocks noChangeAspect="1"/>
+          </p:cNvPicPr>
+          <p:nvPr/>
+        </p:nvPicPr>
+        <p:blipFill>
+          <a:blip r:embed="rId2"/>
+          <a:stretch>
+            <a:fillRect/>
+          </a:stretch>
+        </p:blipFill>
+        <p:spPr>
+          <a:xfrm>
+            <a:off x="2927348" y="4201652"/>
+            <a:ext cx="5229955" cy="1390844"/>
+          </a:xfrm>
+          <a:prstGeom prst="rect">
+            <a:avLst/>
+          </a:prstGeom>
+        </p:spPr>
+      </p:pic>
+      <p:pic>
+        <p:nvPicPr>
+          <p:cNvPr id="2" name="Picture 12" descr="JavaScript Logo et symbole, sens, histoire, PNG, marque">
+            <a:extLst>
+              <a:ext uri="{FF2B5EF4-FFF2-40B4-BE49-F238E27FC236}">
+                <a16:creationId xmlns:a16="http://schemas.microsoft.com/office/drawing/2014/main" id="{EC8F2766-A8DB-0BE9-00CA-BEC7DA77C599}"/>
+              </a:ext>
+            </a:extLst>
+          </p:cNvPr>
+          <p:cNvPicPr>
+            <a:picLocks noChangeAspect="1" noChangeArrowheads="1"/>
+          </p:cNvPicPr>
+          <p:nvPr/>
+        </p:nvPicPr>
+        <p:blipFill>
+          <a:blip r:embed="rId3">
+            <a:extLst>
+              <a:ext uri="{28A0092B-C50C-407E-A947-70E740481C1C}">
+                <a14:useLocalDpi xmlns:a14="http://schemas.microsoft.com/office/drawing/2010/main" val="0"/>
+              </a:ext>
+            </a:extLst>
+          </a:blip>
+          <a:srcRect/>
+          <a:stretch>
+            <a:fillRect/>
+          </a:stretch>
+        </p:blipFill>
+        <p:spPr bwMode="auto">
+          <a:xfrm>
+            <a:off x="10380582" y="286603"/>
+            <a:ext cx="1550195" cy="876779"/>
+          </a:xfrm>
+          <a:prstGeom prst="rect">
+            <a:avLst/>
+          </a:prstGeom>
+          <a:noFill/>
+          <a:extLst>
+            <a:ext uri="{909E8E84-426E-40DD-AFC4-6F175D3DCCD1}">
+              <a14:hiddenFill xmlns:a14="http://schemas.microsoft.com/office/drawing/2010/main">
+                <a:solidFill>
+                  <a:srgbClr val="FFFFFF"/>
+                </a:solidFill>
+              </a14:hiddenFill>
+            </a:ext>
+          </a:extLst>
+        </p:spPr>
+      </p:pic>
+    </p:spTree>
+    <p:extLst>
+      <p:ext uri="{BB962C8B-B14F-4D97-AF65-F5344CB8AC3E}">
+        <p14:creationId xmlns:p14="http://schemas.microsoft.com/office/powerpoint/2010/main" val="123487459"/>
+      </p:ext>
+    </p:extLst>
+  </p:cSld>
+  <p:clrMapOvr>
+    <a:masterClrMapping/>
+  </p:clrMapOvr>
+</p:sld>
+</file>
+
 <file path=ppt/slides/slide9.xml><?xml version="1.0" encoding="utf-8"?>
 <p:sld xmlns:a="http://schemas.openxmlformats.org/drawingml/2006/main" xmlns:r="http://schemas.openxmlformats.org/officeDocument/2006/relationships" xmlns:p="http://schemas.openxmlformats.org/presentationml/2006/main">
   <p:cSld>
@@ -24096,6 +24807,2127 @@
     <p:extLst>
       <p:ext uri="{BB962C8B-B14F-4D97-AF65-F5344CB8AC3E}">
         <p14:creationId xmlns:p14="http://schemas.microsoft.com/office/powerpoint/2010/main" val="824610988"/>
+      </p:ext>
+    </p:extLst>
+  </p:cSld>
+  <p:clrMapOvr>
+    <a:masterClrMapping/>
+  </p:clrMapOvr>
+</p:sld>
+</file>
+
+<file path=ppt/slides/slide90.xml><?xml version="1.0" encoding="utf-8"?>
+<p:sld xmlns:a="http://schemas.openxmlformats.org/drawingml/2006/main" xmlns:r="http://schemas.openxmlformats.org/officeDocument/2006/relationships" xmlns:p="http://schemas.openxmlformats.org/presentationml/2006/main">
+  <p:cSld>
+    <p:spTree>
+      <p:nvGrpSpPr>
+        <p:cNvPr id="1" name=""/>
+        <p:cNvGrpSpPr/>
+        <p:nvPr/>
+      </p:nvGrpSpPr>
+      <p:grpSpPr>
+        <a:xfrm>
+          <a:off x="0" y="0"/>
+          <a:ext cx="0" cy="0"/>
+          <a:chOff x="0" y="0"/>
+          <a:chExt cx="0" cy="0"/>
+        </a:xfrm>
+      </p:grpSpPr>
+      <p:sp>
+        <p:nvSpPr>
+          <p:cNvPr id="3" name="Titre 1">
+            <a:extLst>
+              <a:ext uri="{FF2B5EF4-FFF2-40B4-BE49-F238E27FC236}">
+                <a16:creationId xmlns:a16="http://schemas.microsoft.com/office/drawing/2014/main" id="{E7373E66-041F-37D5-0ADF-25BA87ABC979}"/>
+              </a:ext>
+            </a:extLst>
+          </p:cNvPr>
+          <p:cNvSpPr>
+            <a:spLocks noGrp="1"/>
+          </p:cNvSpPr>
+          <p:nvPr>
+            <p:ph type="title"/>
+          </p:nvPr>
+        </p:nvSpPr>
+        <p:spPr>
+          <a:xfrm>
+            <a:off x="1097279" y="286603"/>
+            <a:ext cx="11167425" cy="1450757"/>
+          </a:xfrm>
+        </p:spPr>
+        <p:txBody>
+          <a:bodyPr>
+            <a:normAutofit/>
+          </a:bodyPr>
+          <a:lstStyle/>
+          <a:p>
+            <a:r>
+              <a:rPr lang="fr-FR" dirty="0"/>
+              <a:t>IX- Les évènements </a:t>
+            </a:r>
+            <a:br>
+              <a:rPr lang="fr-FR" dirty="0"/>
+            </a:br>
+            <a:r>
+              <a:rPr lang="fr-FR" dirty="0"/>
+              <a:t>	</a:t>
+            </a:r>
+            <a:r>
+              <a:rPr lang="fr-FR" sz="3600" i="1" dirty="0"/>
+              <a:t>  3. Exemple de quelques événements utiles </a:t>
+            </a:r>
+          </a:p>
+        </p:txBody>
+      </p:sp>
+      <p:sp>
+        <p:nvSpPr>
+          <p:cNvPr id="4" name="ZoneTexte 3">
+            <a:extLst>
+              <a:ext uri="{FF2B5EF4-FFF2-40B4-BE49-F238E27FC236}">
+                <a16:creationId xmlns:a16="http://schemas.microsoft.com/office/drawing/2014/main" id="{F48D1965-5159-6736-5F19-C7327EFCE6B4}"/>
+              </a:ext>
+            </a:extLst>
+          </p:cNvPr>
+          <p:cNvSpPr txBox="1"/>
+          <p:nvPr/>
+        </p:nvSpPr>
+        <p:spPr>
+          <a:xfrm>
+            <a:off x="635885" y="2165986"/>
+            <a:ext cx="11167425" cy="3693319"/>
+          </a:xfrm>
+          <a:prstGeom prst="rect">
+            <a:avLst/>
+          </a:prstGeom>
+          <a:noFill/>
+        </p:spPr>
+        <p:txBody>
+          <a:bodyPr wrap="square" rtlCol="0">
+            <a:spAutoFit/>
+          </a:bodyPr>
+          <a:lstStyle/>
+          <a:p>
+            <a:r>
+              <a:rPr lang="fr-FR" sz="2400" b="1" dirty="0"/>
+              <a:t>Click</a:t>
+            </a:r>
+            <a:r>
+              <a:rPr lang="fr-FR" sz="2400" dirty="0"/>
+              <a:t> : Déclenche un évènement </a:t>
+            </a:r>
+            <a:r>
+              <a:rPr lang="fr-FR" sz="2400" b="1" dirty="0"/>
+              <a:t>au click </a:t>
+            </a:r>
+          </a:p>
+          <a:p>
+            <a:endParaRPr lang="fr-FR" sz="2400" b="1" dirty="0"/>
+          </a:p>
+          <a:p>
+            <a:r>
+              <a:rPr lang="fr-FR" sz="2400" b="1" dirty="0" err="1"/>
+              <a:t>Mouseenter</a:t>
+            </a:r>
+            <a:r>
+              <a:rPr lang="fr-FR" sz="2400" dirty="0"/>
+              <a:t>: Déclenche un évènement au </a:t>
+            </a:r>
+            <a:r>
+              <a:rPr lang="fr-FR" sz="2400" b="1" dirty="0"/>
+              <a:t>survol en entrant sur un élément</a:t>
+            </a:r>
+          </a:p>
+          <a:p>
+            <a:r>
+              <a:rPr lang="fr-FR" sz="2400" b="1" dirty="0"/>
+              <a:t> </a:t>
+            </a:r>
+          </a:p>
+          <a:p>
+            <a:r>
+              <a:rPr lang="fr-FR" sz="2400" b="1" dirty="0" err="1"/>
+              <a:t>Mouseleave</a:t>
+            </a:r>
+            <a:r>
+              <a:rPr lang="fr-FR" sz="2400" dirty="0"/>
+              <a:t>: Déclenche un évènement au </a:t>
+            </a:r>
+            <a:r>
+              <a:rPr lang="fr-FR" sz="2400" b="1" dirty="0"/>
+              <a:t>survol  en sortant d’un élément</a:t>
+            </a:r>
+          </a:p>
+          <a:p>
+            <a:endParaRPr lang="fr-FR" sz="2400" b="1" dirty="0"/>
+          </a:p>
+          <a:p>
+            <a:r>
+              <a:rPr lang="fr-FR" sz="2400" b="1" dirty="0" err="1"/>
+              <a:t>Keydown</a:t>
+            </a:r>
+            <a:r>
+              <a:rPr lang="fr-FR" sz="2400" dirty="0"/>
+              <a:t>: </a:t>
+            </a:r>
+            <a:r>
+              <a:rPr lang="fr-FR" sz="2400" kern="1200" dirty="0">
+                <a:solidFill>
+                  <a:srgbClr val="000000"/>
+                </a:solidFill>
+                <a:effectLst/>
+                <a:latin typeface="Franklin Gothic Book" panose="020B0503020102020204" pitchFamily="34" charset="0"/>
+                <a:ea typeface="+mn-ea"/>
+                <a:cs typeface="+mn-cs"/>
+              </a:rPr>
+              <a:t>Déclenche un évènement </a:t>
+            </a:r>
+            <a:r>
+              <a:rPr lang="fr-FR" sz="2400" dirty="0">
+                <a:solidFill>
+                  <a:srgbClr val="000000"/>
+                </a:solidFill>
+                <a:latin typeface="Franklin Gothic Book" panose="020B0503020102020204" pitchFamily="34" charset="0"/>
+              </a:rPr>
+              <a:t>en </a:t>
+            </a:r>
+            <a:r>
+              <a:rPr lang="fr-FR" sz="2400" b="1" dirty="0">
+                <a:solidFill>
+                  <a:srgbClr val="000000"/>
+                </a:solidFill>
+                <a:latin typeface="Franklin Gothic Book" panose="020B0503020102020204" pitchFamily="34" charset="0"/>
+              </a:rPr>
+              <a:t>appuyant sur une touche du clavier</a:t>
+            </a:r>
+          </a:p>
+          <a:p>
+            <a:r>
+              <a:rPr lang="fr-FR" sz="2400" b="1" dirty="0">
+                <a:solidFill>
+                  <a:srgbClr val="000000"/>
+                </a:solidFill>
+                <a:latin typeface="Franklin Gothic Book" panose="020B0503020102020204" pitchFamily="34" charset="0"/>
+              </a:rPr>
+              <a:t> </a:t>
+            </a:r>
+          </a:p>
+          <a:p>
+            <a:r>
+              <a:rPr lang="fr-FR" sz="2400" b="1" dirty="0" err="1">
+                <a:solidFill>
+                  <a:srgbClr val="000000"/>
+                </a:solidFill>
+                <a:latin typeface="Franklin Gothic Book" panose="020B0503020102020204" pitchFamily="34" charset="0"/>
+              </a:rPr>
+              <a:t>Submit</a:t>
+            </a:r>
+            <a:r>
+              <a:rPr lang="fr-FR" sz="2400" dirty="0">
+                <a:solidFill>
+                  <a:srgbClr val="000000"/>
+                </a:solidFill>
+                <a:latin typeface="Franklin Gothic Book" panose="020B0503020102020204" pitchFamily="34" charset="0"/>
+              </a:rPr>
+              <a:t>: </a:t>
+            </a:r>
+            <a:r>
+              <a:rPr lang="fr-FR" sz="2400" kern="1200" dirty="0">
+                <a:solidFill>
+                  <a:srgbClr val="000000"/>
+                </a:solidFill>
+                <a:effectLst/>
+                <a:latin typeface="Franklin Gothic Book" panose="020B0503020102020204" pitchFamily="34" charset="0"/>
+                <a:ea typeface="+mn-ea"/>
+                <a:cs typeface="+mn-cs"/>
+              </a:rPr>
+              <a:t>Déclenche un évènement </a:t>
+            </a:r>
+            <a:r>
+              <a:rPr lang="fr-FR" sz="2400" b="1" kern="1200" dirty="0">
+                <a:solidFill>
+                  <a:srgbClr val="000000"/>
+                </a:solidFill>
+                <a:effectLst/>
+                <a:latin typeface="Franklin Gothic Book" panose="020B0503020102020204" pitchFamily="34" charset="0"/>
+                <a:ea typeface="+mn-ea"/>
+                <a:cs typeface="+mn-cs"/>
+              </a:rPr>
+              <a:t>lorsqu’on soume</a:t>
+            </a:r>
+            <a:r>
+              <a:rPr lang="fr-FR" sz="2400" b="1" dirty="0">
+                <a:solidFill>
+                  <a:srgbClr val="000000"/>
+                </a:solidFill>
+                <a:latin typeface="Franklin Gothic Book" panose="020B0503020102020204" pitchFamily="34" charset="0"/>
+              </a:rPr>
+              <a:t>t un formulaire </a:t>
+            </a:r>
+          </a:p>
+          <a:p>
+            <a:r>
+              <a:rPr lang="fr-FR" dirty="0">
+                <a:solidFill>
+                  <a:srgbClr val="000000"/>
+                </a:solidFill>
+                <a:latin typeface="Franklin Gothic Book" panose="020B0503020102020204" pitchFamily="34" charset="0"/>
+              </a:rPr>
+              <a:t> </a:t>
+            </a:r>
+            <a:r>
+              <a:rPr lang="fr-FR" dirty="0"/>
+              <a:t> </a:t>
+            </a:r>
+          </a:p>
+        </p:txBody>
+      </p:sp>
+      <p:pic>
+        <p:nvPicPr>
+          <p:cNvPr id="2" name="Picture 12" descr="JavaScript Logo et symbole, sens, histoire, PNG, marque">
+            <a:extLst>
+              <a:ext uri="{FF2B5EF4-FFF2-40B4-BE49-F238E27FC236}">
+                <a16:creationId xmlns:a16="http://schemas.microsoft.com/office/drawing/2014/main" id="{06629C44-41FD-D088-92DB-0B2E6F179BFF}"/>
+              </a:ext>
+            </a:extLst>
+          </p:cNvPr>
+          <p:cNvPicPr>
+            <a:picLocks noChangeAspect="1" noChangeArrowheads="1"/>
+          </p:cNvPicPr>
+          <p:nvPr/>
+        </p:nvPicPr>
+        <p:blipFill>
+          <a:blip r:embed="rId2">
+            <a:extLst>
+              <a:ext uri="{28A0092B-C50C-407E-A947-70E740481C1C}">
+                <a14:useLocalDpi xmlns:a14="http://schemas.microsoft.com/office/drawing/2010/main" val="0"/>
+              </a:ext>
+            </a:extLst>
+          </a:blip>
+          <a:srcRect/>
+          <a:stretch>
+            <a:fillRect/>
+          </a:stretch>
+        </p:blipFill>
+        <p:spPr bwMode="auto">
+          <a:xfrm>
+            <a:off x="10380582" y="286603"/>
+            <a:ext cx="1550195" cy="876779"/>
+          </a:xfrm>
+          <a:prstGeom prst="rect">
+            <a:avLst/>
+          </a:prstGeom>
+          <a:noFill/>
+          <a:extLst>
+            <a:ext uri="{909E8E84-426E-40DD-AFC4-6F175D3DCCD1}">
+              <a14:hiddenFill xmlns:a14="http://schemas.microsoft.com/office/drawing/2010/main">
+                <a:solidFill>
+                  <a:srgbClr val="FFFFFF"/>
+                </a:solidFill>
+              </a14:hiddenFill>
+            </a:ext>
+          </a:extLst>
+        </p:spPr>
+      </p:pic>
+    </p:spTree>
+    <p:extLst>
+      <p:ext uri="{BB962C8B-B14F-4D97-AF65-F5344CB8AC3E}">
+        <p14:creationId xmlns:p14="http://schemas.microsoft.com/office/powerpoint/2010/main" val="2759005723"/>
+      </p:ext>
+    </p:extLst>
+  </p:cSld>
+  <p:clrMapOvr>
+    <a:masterClrMapping/>
+  </p:clrMapOvr>
+</p:sld>
+</file>
+
+<file path=ppt/slides/slide91.xml><?xml version="1.0" encoding="utf-8"?>
+<p:sld xmlns:a="http://schemas.openxmlformats.org/drawingml/2006/main" xmlns:r="http://schemas.openxmlformats.org/officeDocument/2006/relationships" xmlns:p="http://schemas.openxmlformats.org/presentationml/2006/main">
+  <p:cSld>
+    <p:spTree>
+      <p:nvGrpSpPr>
+        <p:cNvPr id="1" name=""/>
+        <p:cNvGrpSpPr/>
+        <p:nvPr/>
+      </p:nvGrpSpPr>
+      <p:grpSpPr>
+        <a:xfrm>
+          <a:off x="0" y="0"/>
+          <a:ext cx="0" cy="0"/>
+          <a:chOff x="0" y="0"/>
+          <a:chExt cx="0" cy="0"/>
+        </a:xfrm>
+      </p:grpSpPr>
+      <p:sp>
+        <p:nvSpPr>
+          <p:cNvPr id="3" name="Titre 1">
+            <a:extLst>
+              <a:ext uri="{FF2B5EF4-FFF2-40B4-BE49-F238E27FC236}">
+                <a16:creationId xmlns:a16="http://schemas.microsoft.com/office/drawing/2014/main" id="{E7373E66-041F-37D5-0ADF-25BA87ABC979}"/>
+              </a:ext>
+            </a:extLst>
+          </p:cNvPr>
+          <p:cNvSpPr>
+            <a:spLocks noGrp="1"/>
+          </p:cNvSpPr>
+          <p:nvPr>
+            <p:ph type="title"/>
+          </p:nvPr>
+        </p:nvSpPr>
+        <p:spPr>
+          <a:xfrm>
+            <a:off x="1097279" y="286603"/>
+            <a:ext cx="11167425" cy="1450757"/>
+          </a:xfrm>
+        </p:spPr>
+        <p:txBody>
+          <a:bodyPr>
+            <a:normAutofit/>
+          </a:bodyPr>
+          <a:lstStyle/>
+          <a:p>
+            <a:r>
+              <a:rPr lang="fr-FR" dirty="0"/>
+              <a:t>IX- Les évènements </a:t>
+            </a:r>
+            <a:br>
+              <a:rPr lang="fr-FR" dirty="0"/>
+            </a:br>
+            <a:r>
+              <a:rPr lang="fr-FR" dirty="0"/>
+              <a:t>	</a:t>
+            </a:r>
+            <a:r>
+              <a:rPr lang="fr-FR" sz="3600" i="1" dirty="0"/>
+              <a:t>  3. Exemple de quelques événements utiles </a:t>
+            </a:r>
+          </a:p>
+        </p:txBody>
+      </p:sp>
+      <p:sp>
+        <p:nvSpPr>
+          <p:cNvPr id="4" name="ZoneTexte 3">
+            <a:extLst>
+              <a:ext uri="{FF2B5EF4-FFF2-40B4-BE49-F238E27FC236}">
+                <a16:creationId xmlns:a16="http://schemas.microsoft.com/office/drawing/2014/main" id="{F48D1965-5159-6736-5F19-C7327EFCE6B4}"/>
+              </a:ext>
+            </a:extLst>
+          </p:cNvPr>
+          <p:cNvSpPr txBox="1"/>
+          <p:nvPr/>
+        </p:nvSpPr>
+        <p:spPr>
+          <a:xfrm>
+            <a:off x="635885" y="2165986"/>
+            <a:ext cx="11167425" cy="3693319"/>
+          </a:xfrm>
+          <a:prstGeom prst="rect">
+            <a:avLst/>
+          </a:prstGeom>
+          <a:noFill/>
+        </p:spPr>
+        <p:txBody>
+          <a:bodyPr wrap="square" rtlCol="0">
+            <a:spAutoFit/>
+          </a:bodyPr>
+          <a:lstStyle/>
+          <a:p>
+            <a:pPr marL="0" algn="l" rtl="0" eaLnBrk="1" latinLnBrk="0" hangingPunct="1">
+              <a:spcBef>
+                <a:spcPts val="0"/>
+              </a:spcBef>
+              <a:spcAft>
+                <a:spcPts val="0"/>
+              </a:spcAft>
+            </a:pPr>
+            <a:r>
+              <a:rPr lang="fr-FR" sz="2400" b="1" kern="1200" dirty="0">
+                <a:solidFill>
+                  <a:srgbClr val="000000"/>
+                </a:solidFill>
+                <a:effectLst/>
+                <a:latin typeface="Franklin Gothic Book" panose="020B0503020102020204" pitchFamily="34" charset="0"/>
+                <a:ea typeface="+mn-ea"/>
+                <a:cs typeface="+mn-cs"/>
+              </a:rPr>
+              <a:t>Input</a:t>
+            </a:r>
+            <a:r>
+              <a:rPr lang="fr-FR" sz="2400" kern="1200" dirty="0">
+                <a:solidFill>
+                  <a:srgbClr val="000000"/>
+                </a:solidFill>
+                <a:effectLst/>
+                <a:latin typeface="Franklin Gothic Book" panose="020B0503020102020204" pitchFamily="34" charset="0"/>
+                <a:ea typeface="+mn-ea"/>
+                <a:cs typeface="+mn-cs"/>
+              </a:rPr>
+              <a:t>: Déclenche un évènement </a:t>
+            </a:r>
+            <a:r>
+              <a:rPr lang="fr-FR" sz="2400" b="1" kern="1200" dirty="0">
+                <a:solidFill>
+                  <a:srgbClr val="000000"/>
+                </a:solidFill>
+                <a:effectLst/>
+                <a:latin typeface="Franklin Gothic Book" panose="020B0503020102020204" pitchFamily="34" charset="0"/>
+                <a:ea typeface="+mn-ea"/>
+                <a:cs typeface="+mn-cs"/>
+              </a:rPr>
+              <a:t>lorsqu’on écrit dans un champ de formulaire</a:t>
+            </a:r>
+          </a:p>
+          <a:p>
+            <a:pPr marL="0" algn="l" rtl="0" eaLnBrk="1" latinLnBrk="0" hangingPunct="1">
+              <a:spcBef>
+                <a:spcPts val="0"/>
+              </a:spcBef>
+              <a:spcAft>
+                <a:spcPts val="0"/>
+              </a:spcAft>
+            </a:pPr>
+            <a:endParaRPr lang="fr-FR" sz="3200" dirty="0">
+              <a:effectLst/>
+            </a:endParaRPr>
+          </a:p>
+          <a:p>
+            <a:pPr marL="0" algn="l" rtl="0" eaLnBrk="1" latinLnBrk="0" hangingPunct="1">
+              <a:spcBef>
+                <a:spcPts val="0"/>
+              </a:spcBef>
+              <a:spcAft>
+                <a:spcPts val="0"/>
+              </a:spcAft>
+            </a:pPr>
+            <a:r>
+              <a:rPr lang="fr-FR" sz="2400" b="1" kern="1200" dirty="0" err="1">
+                <a:solidFill>
+                  <a:srgbClr val="000000"/>
+                </a:solidFill>
+                <a:effectLst/>
+                <a:latin typeface="Franklin Gothic Book" panose="020B0503020102020204" pitchFamily="34" charset="0"/>
+                <a:ea typeface="+mn-ea"/>
+                <a:cs typeface="+mn-cs"/>
+              </a:rPr>
+              <a:t>Load</a:t>
+            </a:r>
+            <a:r>
+              <a:rPr lang="fr-FR" sz="2400" kern="1200" dirty="0">
+                <a:solidFill>
+                  <a:srgbClr val="000000"/>
+                </a:solidFill>
+                <a:effectLst/>
+                <a:latin typeface="Franklin Gothic Book" panose="020B0503020102020204" pitchFamily="34" charset="0"/>
+                <a:ea typeface="+mn-ea"/>
+                <a:cs typeface="+mn-cs"/>
+              </a:rPr>
+              <a:t> : Déclenche un évènement lorsque la </a:t>
+            </a:r>
+            <a:r>
+              <a:rPr lang="fr-FR" sz="2400" b="1" kern="1200" dirty="0">
+                <a:solidFill>
+                  <a:srgbClr val="000000"/>
+                </a:solidFill>
+                <a:effectLst/>
+                <a:latin typeface="Franklin Gothic Book" panose="020B0503020102020204" pitchFamily="34" charset="0"/>
+                <a:ea typeface="+mn-ea"/>
+                <a:cs typeface="+mn-cs"/>
+              </a:rPr>
+              <a:t>page est chargée </a:t>
+            </a:r>
+          </a:p>
+          <a:p>
+            <a:pPr marL="0" algn="l" rtl="0" eaLnBrk="1" latinLnBrk="0" hangingPunct="1">
+              <a:spcBef>
+                <a:spcPts val="0"/>
+              </a:spcBef>
+              <a:spcAft>
+                <a:spcPts val="0"/>
+              </a:spcAft>
+            </a:pPr>
+            <a:endParaRPr lang="fr-FR" sz="3200" dirty="0">
+              <a:effectLst/>
+            </a:endParaRPr>
+          </a:p>
+          <a:p>
+            <a:pPr marL="0" algn="l" rtl="0" eaLnBrk="1" latinLnBrk="0" hangingPunct="1">
+              <a:spcBef>
+                <a:spcPts val="0"/>
+              </a:spcBef>
+              <a:spcAft>
+                <a:spcPts val="0"/>
+              </a:spcAft>
+            </a:pPr>
+            <a:r>
+              <a:rPr lang="fr-FR" sz="2400" b="1" kern="1200" dirty="0">
+                <a:solidFill>
+                  <a:srgbClr val="000000"/>
+                </a:solidFill>
+                <a:effectLst/>
+                <a:latin typeface="Franklin Gothic Book" panose="020B0503020102020204" pitchFamily="34" charset="0"/>
+                <a:ea typeface="+mn-ea"/>
+                <a:cs typeface="+mn-cs"/>
+              </a:rPr>
+              <a:t>Scroll</a:t>
+            </a:r>
+            <a:r>
+              <a:rPr lang="fr-FR" sz="2400" kern="1200" dirty="0">
+                <a:solidFill>
+                  <a:srgbClr val="000000"/>
+                </a:solidFill>
+                <a:effectLst/>
+                <a:latin typeface="Franklin Gothic Book" panose="020B0503020102020204" pitchFamily="34" charset="0"/>
+                <a:ea typeface="+mn-ea"/>
+                <a:cs typeface="+mn-cs"/>
+              </a:rPr>
+              <a:t> : Déclenche un évènement lorsqu’on </a:t>
+            </a:r>
+            <a:r>
+              <a:rPr lang="fr-FR" sz="2400" b="1" kern="1200" dirty="0">
+                <a:solidFill>
+                  <a:srgbClr val="000000"/>
+                </a:solidFill>
+                <a:effectLst/>
+                <a:latin typeface="Franklin Gothic Book" panose="020B0503020102020204" pitchFamily="34" charset="0"/>
+                <a:ea typeface="+mn-ea"/>
+                <a:cs typeface="+mn-cs"/>
+              </a:rPr>
+              <a:t>scroll</a:t>
+            </a:r>
+            <a:r>
+              <a:rPr lang="fr-FR" sz="2400" kern="1200" dirty="0">
+                <a:solidFill>
+                  <a:srgbClr val="000000"/>
+                </a:solidFill>
+                <a:effectLst/>
+                <a:latin typeface="Franklin Gothic Book" panose="020B0503020102020204" pitchFamily="34" charset="0"/>
+                <a:ea typeface="+mn-ea"/>
+                <a:cs typeface="+mn-cs"/>
+              </a:rPr>
+              <a:t> </a:t>
+            </a:r>
+          </a:p>
+          <a:p>
+            <a:pPr marL="0" algn="l" rtl="0" eaLnBrk="1" latinLnBrk="0" hangingPunct="1">
+              <a:spcBef>
+                <a:spcPts val="0"/>
+              </a:spcBef>
+              <a:spcAft>
+                <a:spcPts val="0"/>
+              </a:spcAft>
+            </a:pPr>
+            <a:endParaRPr lang="fr-FR" sz="3200" dirty="0">
+              <a:effectLst/>
+            </a:endParaRPr>
+          </a:p>
+          <a:p>
+            <a:pPr marL="0" algn="l" rtl="0" eaLnBrk="1" latinLnBrk="0" hangingPunct="1">
+              <a:spcBef>
+                <a:spcPts val="0"/>
+              </a:spcBef>
+              <a:spcAft>
+                <a:spcPts val="0"/>
+              </a:spcAft>
+            </a:pPr>
+            <a:r>
+              <a:rPr lang="fr-FR" sz="2400" b="1" kern="1200" dirty="0" err="1">
+                <a:solidFill>
+                  <a:srgbClr val="000000"/>
+                </a:solidFill>
+                <a:effectLst/>
+                <a:latin typeface="Franklin Gothic Book" panose="020B0503020102020204" pitchFamily="34" charset="0"/>
+                <a:ea typeface="+mn-ea"/>
+                <a:cs typeface="+mn-cs"/>
+              </a:rPr>
+              <a:t>Resize</a:t>
+            </a:r>
+            <a:r>
+              <a:rPr lang="fr-FR" sz="2400" kern="1200" dirty="0">
+                <a:solidFill>
+                  <a:srgbClr val="000000"/>
+                </a:solidFill>
+                <a:effectLst/>
+                <a:latin typeface="Franklin Gothic Book" panose="020B0503020102020204" pitchFamily="34" charset="0"/>
+                <a:ea typeface="+mn-ea"/>
+                <a:cs typeface="+mn-cs"/>
+              </a:rPr>
+              <a:t>: Déclenche un évènement lorsque l’on </a:t>
+            </a:r>
+            <a:r>
+              <a:rPr lang="fr-FR" sz="2400" b="1" kern="1200" dirty="0">
+                <a:solidFill>
+                  <a:srgbClr val="000000"/>
+                </a:solidFill>
+                <a:effectLst/>
+                <a:latin typeface="Franklin Gothic Book" panose="020B0503020102020204" pitchFamily="34" charset="0"/>
+                <a:ea typeface="+mn-ea"/>
+                <a:cs typeface="+mn-cs"/>
+              </a:rPr>
+              <a:t>redimensionne la fenêtre </a:t>
+            </a:r>
+            <a:r>
+              <a:rPr lang="fr-FR" sz="2400" kern="1200" dirty="0">
+                <a:solidFill>
+                  <a:srgbClr val="000000"/>
+                </a:solidFill>
+                <a:effectLst/>
+                <a:latin typeface="Franklin Gothic Book" panose="020B0503020102020204" pitchFamily="34" charset="0"/>
+                <a:ea typeface="+mn-ea"/>
+                <a:cs typeface="+mn-cs"/>
+              </a:rPr>
+              <a:t>du navigateur </a:t>
+            </a:r>
+            <a:endParaRPr lang="fr-FR" sz="3200" dirty="0">
+              <a:effectLst/>
+            </a:endParaRPr>
+          </a:p>
+          <a:p>
+            <a:r>
+              <a:rPr lang="fr-FR" dirty="0">
+                <a:solidFill>
+                  <a:srgbClr val="000000"/>
+                </a:solidFill>
+                <a:latin typeface="Franklin Gothic Book" panose="020B0503020102020204" pitchFamily="34" charset="0"/>
+              </a:rPr>
+              <a:t> </a:t>
+            </a:r>
+            <a:r>
+              <a:rPr lang="fr-FR" dirty="0"/>
+              <a:t> </a:t>
+            </a:r>
+          </a:p>
+        </p:txBody>
+      </p:sp>
+      <p:pic>
+        <p:nvPicPr>
+          <p:cNvPr id="2" name="Picture 12" descr="JavaScript Logo et symbole, sens, histoire, PNG, marque">
+            <a:extLst>
+              <a:ext uri="{FF2B5EF4-FFF2-40B4-BE49-F238E27FC236}">
+                <a16:creationId xmlns:a16="http://schemas.microsoft.com/office/drawing/2014/main" id="{1C486637-D65C-32DD-7315-2A2DA0DCDF0D}"/>
+              </a:ext>
+            </a:extLst>
+          </p:cNvPr>
+          <p:cNvPicPr>
+            <a:picLocks noChangeAspect="1" noChangeArrowheads="1"/>
+          </p:cNvPicPr>
+          <p:nvPr/>
+        </p:nvPicPr>
+        <p:blipFill>
+          <a:blip r:embed="rId2">
+            <a:extLst>
+              <a:ext uri="{28A0092B-C50C-407E-A947-70E740481C1C}">
+                <a14:useLocalDpi xmlns:a14="http://schemas.microsoft.com/office/drawing/2010/main" val="0"/>
+              </a:ext>
+            </a:extLst>
+          </a:blip>
+          <a:srcRect/>
+          <a:stretch>
+            <a:fillRect/>
+          </a:stretch>
+        </p:blipFill>
+        <p:spPr bwMode="auto">
+          <a:xfrm>
+            <a:off x="10380582" y="286603"/>
+            <a:ext cx="1550195" cy="876779"/>
+          </a:xfrm>
+          <a:prstGeom prst="rect">
+            <a:avLst/>
+          </a:prstGeom>
+          <a:noFill/>
+          <a:extLst>
+            <a:ext uri="{909E8E84-426E-40DD-AFC4-6F175D3DCCD1}">
+              <a14:hiddenFill xmlns:a14="http://schemas.microsoft.com/office/drawing/2010/main">
+                <a:solidFill>
+                  <a:srgbClr val="FFFFFF"/>
+                </a:solidFill>
+              </a14:hiddenFill>
+            </a:ext>
+          </a:extLst>
+        </p:spPr>
+      </p:pic>
+    </p:spTree>
+    <p:extLst>
+      <p:ext uri="{BB962C8B-B14F-4D97-AF65-F5344CB8AC3E}">
+        <p14:creationId xmlns:p14="http://schemas.microsoft.com/office/powerpoint/2010/main" val="4107862165"/>
+      </p:ext>
+    </p:extLst>
+  </p:cSld>
+  <p:clrMapOvr>
+    <a:masterClrMapping/>
+  </p:clrMapOvr>
+</p:sld>
+</file>
+
+<file path=ppt/slides/slide92.xml><?xml version="1.0" encoding="utf-8"?>
+<p:sld xmlns:a="http://schemas.openxmlformats.org/drawingml/2006/main" xmlns:r="http://schemas.openxmlformats.org/officeDocument/2006/relationships" xmlns:p="http://schemas.openxmlformats.org/presentationml/2006/main">
+  <p:cSld>
+    <p:spTree>
+      <p:nvGrpSpPr>
+        <p:cNvPr id="1" name=""/>
+        <p:cNvGrpSpPr/>
+        <p:nvPr/>
+      </p:nvGrpSpPr>
+      <p:grpSpPr>
+        <a:xfrm>
+          <a:off x="0" y="0"/>
+          <a:ext cx="0" cy="0"/>
+          <a:chOff x="0" y="0"/>
+          <a:chExt cx="0" cy="0"/>
+        </a:xfrm>
+      </p:grpSpPr>
+      <p:sp>
+        <p:nvSpPr>
+          <p:cNvPr id="3" name="Titre 1">
+            <a:extLst>
+              <a:ext uri="{FF2B5EF4-FFF2-40B4-BE49-F238E27FC236}">
+                <a16:creationId xmlns:a16="http://schemas.microsoft.com/office/drawing/2014/main" id="{E7373E66-041F-37D5-0ADF-25BA87ABC979}"/>
+              </a:ext>
+            </a:extLst>
+          </p:cNvPr>
+          <p:cNvSpPr>
+            <a:spLocks noGrp="1"/>
+          </p:cNvSpPr>
+          <p:nvPr>
+            <p:ph type="title"/>
+          </p:nvPr>
+        </p:nvSpPr>
+        <p:spPr>
+          <a:xfrm>
+            <a:off x="1097279" y="286603"/>
+            <a:ext cx="11167425" cy="1450757"/>
+          </a:xfrm>
+        </p:spPr>
+        <p:txBody>
+          <a:bodyPr>
+            <a:normAutofit/>
+          </a:bodyPr>
+          <a:lstStyle/>
+          <a:p>
+            <a:r>
+              <a:rPr lang="fr-FR" dirty="0"/>
+              <a:t>IX- Les évènements </a:t>
+            </a:r>
+            <a:br>
+              <a:rPr lang="fr-FR" dirty="0"/>
+            </a:br>
+            <a:r>
+              <a:rPr lang="fr-FR" dirty="0"/>
+              <a:t>	</a:t>
+            </a:r>
+            <a:r>
+              <a:rPr lang="fr-FR" sz="3600" i="1" dirty="0"/>
+              <a:t>  4. Stopper le comportement par default </a:t>
+            </a:r>
+          </a:p>
+        </p:txBody>
+      </p:sp>
+      <p:sp>
+        <p:nvSpPr>
+          <p:cNvPr id="4" name="ZoneTexte 3">
+            <a:extLst>
+              <a:ext uri="{FF2B5EF4-FFF2-40B4-BE49-F238E27FC236}">
+                <a16:creationId xmlns:a16="http://schemas.microsoft.com/office/drawing/2014/main" id="{F48D1965-5159-6736-5F19-C7327EFCE6B4}"/>
+              </a:ext>
+            </a:extLst>
+          </p:cNvPr>
+          <p:cNvSpPr txBox="1"/>
+          <p:nvPr/>
+        </p:nvSpPr>
+        <p:spPr>
+          <a:xfrm>
+            <a:off x="635885" y="2400877"/>
+            <a:ext cx="11167425" cy="2954655"/>
+          </a:xfrm>
+          <a:prstGeom prst="rect">
+            <a:avLst/>
+          </a:prstGeom>
+          <a:noFill/>
+        </p:spPr>
+        <p:txBody>
+          <a:bodyPr wrap="square" rtlCol="0">
+            <a:spAutoFit/>
+          </a:bodyPr>
+          <a:lstStyle/>
+          <a:p>
+            <a:pPr marL="0" algn="l" rtl="0" eaLnBrk="1" latinLnBrk="0" hangingPunct="1">
+              <a:spcBef>
+                <a:spcPts val="0"/>
+              </a:spcBef>
+              <a:spcAft>
+                <a:spcPts val="0"/>
+              </a:spcAft>
+            </a:pPr>
+            <a:r>
+              <a:rPr lang="fr-FR" sz="2400" dirty="0">
+                <a:solidFill>
+                  <a:srgbClr val="000000"/>
+                </a:solidFill>
+                <a:latin typeface="Franklin Gothic Book" panose="020B0503020102020204" pitchFamily="34" charset="0"/>
+              </a:rPr>
+              <a:t>La méthode </a:t>
+            </a:r>
+            <a:r>
+              <a:rPr lang="fr-FR" sz="2400" b="1" dirty="0" err="1">
+                <a:solidFill>
+                  <a:srgbClr val="000000"/>
+                </a:solidFill>
+                <a:latin typeface="Franklin Gothic Book" panose="020B0503020102020204" pitchFamily="34" charset="0"/>
+              </a:rPr>
+              <a:t>preventDefault</a:t>
+            </a:r>
+            <a:r>
+              <a:rPr lang="fr-FR" sz="2400" b="1" dirty="0">
+                <a:solidFill>
+                  <a:srgbClr val="000000"/>
+                </a:solidFill>
+                <a:latin typeface="Franklin Gothic Book" panose="020B0503020102020204" pitchFamily="34" charset="0"/>
+              </a:rPr>
+              <a:t>() </a:t>
+            </a:r>
+            <a:r>
+              <a:rPr lang="fr-FR" sz="2400" dirty="0">
+                <a:solidFill>
+                  <a:srgbClr val="000000"/>
+                </a:solidFill>
+                <a:latin typeface="Franklin Gothic Book" panose="020B0503020102020204" pitchFamily="34" charset="0"/>
+              </a:rPr>
+              <a:t>est utilisée pour stopper le comportement par default</a:t>
+            </a:r>
+          </a:p>
+          <a:p>
+            <a:pPr marL="0" algn="l" rtl="0" eaLnBrk="1" latinLnBrk="0" hangingPunct="1">
+              <a:spcBef>
+                <a:spcPts val="0"/>
+              </a:spcBef>
+              <a:spcAft>
+                <a:spcPts val="0"/>
+              </a:spcAft>
+            </a:pPr>
+            <a:r>
+              <a:rPr lang="fr-FR" sz="2400" dirty="0">
+                <a:solidFill>
+                  <a:srgbClr val="000000"/>
+                </a:solidFill>
+                <a:latin typeface="Franklin Gothic Book" panose="020B0503020102020204" pitchFamily="34" charset="0"/>
+              </a:rPr>
+              <a:t>d’un évènement. </a:t>
+            </a:r>
+          </a:p>
+          <a:p>
+            <a:pPr marL="0" algn="l" rtl="0" eaLnBrk="1" latinLnBrk="0" hangingPunct="1">
+              <a:spcBef>
+                <a:spcPts val="0"/>
+              </a:spcBef>
+              <a:spcAft>
+                <a:spcPts val="0"/>
+              </a:spcAft>
+            </a:pPr>
+            <a:endParaRPr lang="fr-FR" sz="2400" dirty="0">
+              <a:solidFill>
+                <a:srgbClr val="000000"/>
+              </a:solidFill>
+              <a:latin typeface="Franklin Gothic Book" panose="020B0503020102020204" pitchFamily="34" charset="0"/>
+            </a:endParaRPr>
+          </a:p>
+          <a:p>
+            <a:pPr marL="0" algn="l" rtl="0" eaLnBrk="1" latinLnBrk="0" hangingPunct="1">
+              <a:spcBef>
+                <a:spcPts val="0"/>
+              </a:spcBef>
+              <a:spcAft>
+                <a:spcPts val="0"/>
+              </a:spcAft>
+            </a:pPr>
+            <a:endParaRPr lang="fr-FR" sz="2400" dirty="0">
+              <a:solidFill>
+                <a:srgbClr val="000000"/>
+              </a:solidFill>
+              <a:latin typeface="Franklin Gothic Book" panose="020B0503020102020204" pitchFamily="34" charset="0"/>
+            </a:endParaRPr>
+          </a:p>
+          <a:p>
+            <a:pPr marL="0" algn="l" rtl="0" eaLnBrk="1" latinLnBrk="0" hangingPunct="1">
+              <a:spcBef>
+                <a:spcPts val="0"/>
+              </a:spcBef>
+              <a:spcAft>
+                <a:spcPts val="0"/>
+              </a:spcAft>
+            </a:pPr>
+            <a:r>
+              <a:rPr lang="fr-FR" sz="2400" dirty="0">
+                <a:solidFill>
+                  <a:srgbClr val="000000"/>
+                </a:solidFill>
+                <a:latin typeface="Franklin Gothic Book" panose="020B0503020102020204" pitchFamily="34" charset="0"/>
+              </a:rPr>
+              <a:t>Cette méthode est très utilisée lorsque l’on réalise des </a:t>
+            </a:r>
+            <a:r>
+              <a:rPr lang="fr-FR" sz="2400" b="1" dirty="0">
+                <a:solidFill>
+                  <a:srgbClr val="000000"/>
+                </a:solidFill>
+                <a:latin typeface="Franklin Gothic Book" panose="020B0503020102020204" pitchFamily="34" charset="0"/>
+              </a:rPr>
+              <a:t>vérifications sur des formulaires, </a:t>
+            </a:r>
+            <a:r>
+              <a:rPr lang="fr-FR" sz="2400" dirty="0">
+                <a:solidFill>
+                  <a:srgbClr val="000000"/>
+                </a:solidFill>
+                <a:latin typeface="Franklin Gothic Book" panose="020B0503020102020204" pitchFamily="34" charset="0"/>
+              </a:rPr>
+              <a:t>afin d’empêcher que le formulaire soit envoyé avant que le message ne soit vu par l’utilisateur. </a:t>
+            </a:r>
+            <a:endParaRPr lang="fr-FR" sz="3200" dirty="0">
+              <a:effectLst/>
+            </a:endParaRPr>
+          </a:p>
+          <a:p>
+            <a:r>
+              <a:rPr lang="fr-FR" dirty="0">
+                <a:solidFill>
+                  <a:srgbClr val="000000"/>
+                </a:solidFill>
+                <a:latin typeface="Franklin Gothic Book" panose="020B0503020102020204" pitchFamily="34" charset="0"/>
+              </a:rPr>
+              <a:t> </a:t>
+            </a:r>
+            <a:r>
+              <a:rPr lang="fr-FR" dirty="0"/>
+              <a:t> </a:t>
+            </a:r>
+          </a:p>
+        </p:txBody>
+      </p:sp>
+      <p:pic>
+        <p:nvPicPr>
+          <p:cNvPr id="2" name="Picture 12" descr="JavaScript Logo et symbole, sens, histoire, PNG, marque">
+            <a:extLst>
+              <a:ext uri="{FF2B5EF4-FFF2-40B4-BE49-F238E27FC236}">
+                <a16:creationId xmlns:a16="http://schemas.microsoft.com/office/drawing/2014/main" id="{307EA689-4BDE-0F96-63BF-8F3B6A85AE10}"/>
+              </a:ext>
+            </a:extLst>
+          </p:cNvPr>
+          <p:cNvPicPr>
+            <a:picLocks noChangeAspect="1" noChangeArrowheads="1"/>
+          </p:cNvPicPr>
+          <p:nvPr/>
+        </p:nvPicPr>
+        <p:blipFill>
+          <a:blip r:embed="rId2">
+            <a:extLst>
+              <a:ext uri="{28A0092B-C50C-407E-A947-70E740481C1C}">
+                <a14:useLocalDpi xmlns:a14="http://schemas.microsoft.com/office/drawing/2010/main" val="0"/>
+              </a:ext>
+            </a:extLst>
+          </a:blip>
+          <a:srcRect/>
+          <a:stretch>
+            <a:fillRect/>
+          </a:stretch>
+        </p:blipFill>
+        <p:spPr bwMode="auto">
+          <a:xfrm>
+            <a:off x="10380582" y="286603"/>
+            <a:ext cx="1550195" cy="876779"/>
+          </a:xfrm>
+          <a:prstGeom prst="rect">
+            <a:avLst/>
+          </a:prstGeom>
+          <a:noFill/>
+          <a:extLst>
+            <a:ext uri="{909E8E84-426E-40DD-AFC4-6F175D3DCCD1}">
+              <a14:hiddenFill xmlns:a14="http://schemas.microsoft.com/office/drawing/2010/main">
+                <a:solidFill>
+                  <a:srgbClr val="FFFFFF"/>
+                </a:solidFill>
+              </a14:hiddenFill>
+            </a:ext>
+          </a:extLst>
+        </p:spPr>
+      </p:pic>
+    </p:spTree>
+    <p:extLst>
+      <p:ext uri="{BB962C8B-B14F-4D97-AF65-F5344CB8AC3E}">
+        <p14:creationId xmlns:p14="http://schemas.microsoft.com/office/powerpoint/2010/main" val="3680892933"/>
+      </p:ext>
+    </p:extLst>
+  </p:cSld>
+  <p:clrMapOvr>
+    <a:masterClrMapping/>
+  </p:clrMapOvr>
+</p:sld>
+</file>
+
+<file path=ppt/slides/slide93.xml><?xml version="1.0" encoding="utf-8"?>
+<p:sld xmlns:a="http://schemas.openxmlformats.org/drawingml/2006/main" xmlns:r="http://schemas.openxmlformats.org/officeDocument/2006/relationships" xmlns:p="http://schemas.openxmlformats.org/presentationml/2006/main">
+  <p:cSld>
+    <p:spTree>
+      <p:nvGrpSpPr>
+        <p:cNvPr id="1" name=""/>
+        <p:cNvGrpSpPr/>
+        <p:nvPr/>
+      </p:nvGrpSpPr>
+      <p:grpSpPr>
+        <a:xfrm>
+          <a:off x="0" y="0"/>
+          <a:ext cx="0" cy="0"/>
+          <a:chOff x="0" y="0"/>
+          <a:chExt cx="0" cy="0"/>
+        </a:xfrm>
+      </p:grpSpPr>
+      <p:sp>
+        <p:nvSpPr>
+          <p:cNvPr id="3" name="Titre 1">
+            <a:extLst>
+              <a:ext uri="{FF2B5EF4-FFF2-40B4-BE49-F238E27FC236}">
+                <a16:creationId xmlns:a16="http://schemas.microsoft.com/office/drawing/2014/main" id="{E7373E66-041F-37D5-0ADF-25BA87ABC979}"/>
+              </a:ext>
+            </a:extLst>
+          </p:cNvPr>
+          <p:cNvSpPr>
+            <a:spLocks noGrp="1"/>
+          </p:cNvSpPr>
+          <p:nvPr>
+            <p:ph type="title"/>
+          </p:nvPr>
+        </p:nvSpPr>
+        <p:spPr>
+          <a:xfrm>
+            <a:off x="1097279" y="286603"/>
+            <a:ext cx="11167425" cy="1450757"/>
+          </a:xfrm>
+        </p:spPr>
+        <p:txBody>
+          <a:bodyPr>
+            <a:normAutofit/>
+          </a:bodyPr>
+          <a:lstStyle/>
+          <a:p>
+            <a:r>
+              <a:rPr lang="fr-FR" dirty="0"/>
+              <a:t>IX- Les évènements </a:t>
+            </a:r>
+            <a:br>
+              <a:rPr lang="fr-FR" dirty="0"/>
+            </a:br>
+            <a:r>
+              <a:rPr lang="fr-FR" dirty="0"/>
+              <a:t>	</a:t>
+            </a:r>
+            <a:r>
+              <a:rPr lang="fr-FR" sz="3600" i="1" dirty="0"/>
+              <a:t>  5. La propagation des évènements </a:t>
+            </a:r>
+          </a:p>
+        </p:txBody>
+      </p:sp>
+      <p:sp>
+        <p:nvSpPr>
+          <p:cNvPr id="4" name="ZoneTexte 3">
+            <a:extLst>
+              <a:ext uri="{FF2B5EF4-FFF2-40B4-BE49-F238E27FC236}">
+                <a16:creationId xmlns:a16="http://schemas.microsoft.com/office/drawing/2014/main" id="{F2731EE4-07BE-7E1C-DA6A-B75D3E677B44}"/>
+              </a:ext>
+            </a:extLst>
+          </p:cNvPr>
+          <p:cNvSpPr txBox="1"/>
+          <p:nvPr/>
+        </p:nvSpPr>
+        <p:spPr>
+          <a:xfrm>
+            <a:off x="1442905" y="1988191"/>
+            <a:ext cx="10268125" cy="4370427"/>
+          </a:xfrm>
+          <a:prstGeom prst="rect">
+            <a:avLst/>
+          </a:prstGeom>
+          <a:noFill/>
+        </p:spPr>
+        <p:txBody>
+          <a:bodyPr wrap="square" rtlCol="0">
+            <a:spAutoFit/>
+          </a:bodyPr>
+          <a:lstStyle/>
+          <a:p>
+            <a:pPr algn="l"/>
+            <a:r>
+              <a:rPr lang="fr-FR" sz="2000" dirty="0">
+                <a:solidFill>
+                  <a:srgbClr val="000000"/>
+                </a:solidFill>
+                <a:latin typeface="Franklin Gothic Book" panose="020B0503020102020204" pitchFamily="34" charset="0"/>
+              </a:rPr>
+              <a:t>Processus par lequel un événement déclenché sur un élément se propage à travers le DOM, jusqu'à atteindre l'élément racine (document) ou jusqu'à ce qu'un gestionnaire d'événements arrête la propagation.</a:t>
+            </a:r>
+          </a:p>
+          <a:p>
+            <a:pPr algn="l"/>
+            <a:endParaRPr lang="fr-FR" sz="2000" dirty="0">
+              <a:solidFill>
+                <a:srgbClr val="000000"/>
+              </a:solidFill>
+              <a:latin typeface="Franklin Gothic Book" panose="020B0503020102020204" pitchFamily="34" charset="0"/>
+            </a:endParaRPr>
+          </a:p>
+          <a:p>
+            <a:pPr marL="342900" indent="-342900" algn="l">
+              <a:buFont typeface="+mj-lt"/>
+              <a:buAutoNum type="arabicPeriod"/>
+            </a:pPr>
+            <a:r>
+              <a:rPr lang="fr-FR" sz="2000" b="1" dirty="0">
+                <a:solidFill>
+                  <a:srgbClr val="000000"/>
+                </a:solidFill>
+                <a:latin typeface="Franklin Gothic Book" panose="020B0503020102020204" pitchFamily="34" charset="0"/>
+              </a:rPr>
+              <a:t>Phase de capture </a:t>
+            </a:r>
+            <a:r>
+              <a:rPr lang="fr-FR" sz="2000" dirty="0">
+                <a:solidFill>
+                  <a:srgbClr val="000000"/>
+                </a:solidFill>
+                <a:latin typeface="Franklin Gothic Book" panose="020B0503020102020204" pitchFamily="34" charset="0"/>
+              </a:rPr>
+              <a:t>: Dans la phase de capture, l'événement descend à travers le DOM de l'élément racine vers l'élément déclencheur. </a:t>
+            </a:r>
+          </a:p>
+          <a:p>
+            <a:pPr marL="342900" indent="-342900" algn="l">
+              <a:buFont typeface="+mj-lt"/>
+              <a:buAutoNum type="arabicPeriod"/>
+            </a:pPr>
+            <a:endParaRPr lang="fr-FR" sz="2000" dirty="0">
+              <a:solidFill>
+                <a:srgbClr val="000000"/>
+              </a:solidFill>
+              <a:latin typeface="Franklin Gothic Book" panose="020B0503020102020204" pitchFamily="34" charset="0"/>
+            </a:endParaRPr>
+          </a:p>
+          <a:p>
+            <a:pPr marL="342900" indent="-342900" algn="l">
+              <a:buFont typeface="+mj-lt"/>
+              <a:buAutoNum type="arabicPeriod"/>
+            </a:pPr>
+            <a:r>
+              <a:rPr lang="fr-FR" sz="2000" b="1" dirty="0">
+                <a:solidFill>
+                  <a:srgbClr val="000000"/>
+                </a:solidFill>
+                <a:latin typeface="Franklin Gothic Book" panose="020B0503020102020204" pitchFamily="34" charset="0"/>
+              </a:rPr>
+              <a:t>Phase de cible </a:t>
+            </a:r>
+            <a:r>
+              <a:rPr lang="fr-FR" sz="2000" dirty="0">
+                <a:solidFill>
+                  <a:srgbClr val="000000"/>
+                </a:solidFill>
+                <a:latin typeface="Franklin Gothic Book" panose="020B0503020102020204" pitchFamily="34" charset="0"/>
+              </a:rPr>
+              <a:t>: Dans la phase de cible, l'événement atteint l'élément déclencheur et les gestionnaires d'événements sont exécutés sur cet élément.</a:t>
+            </a:r>
+          </a:p>
+          <a:p>
+            <a:pPr marL="342900" indent="-342900" algn="l">
+              <a:buFont typeface="+mj-lt"/>
+              <a:buAutoNum type="arabicPeriod"/>
+            </a:pPr>
+            <a:endParaRPr lang="fr-FR" sz="2000" dirty="0">
+              <a:solidFill>
+                <a:srgbClr val="000000"/>
+              </a:solidFill>
+              <a:latin typeface="Franklin Gothic Book" panose="020B0503020102020204" pitchFamily="34" charset="0"/>
+            </a:endParaRPr>
+          </a:p>
+          <a:p>
+            <a:pPr marL="342900" indent="-342900" algn="l">
+              <a:buFont typeface="+mj-lt"/>
+              <a:buAutoNum type="arabicPeriod"/>
+            </a:pPr>
+            <a:r>
+              <a:rPr lang="fr-FR" sz="2000" b="1" dirty="0">
+                <a:solidFill>
+                  <a:srgbClr val="000000"/>
+                </a:solidFill>
+                <a:latin typeface="Franklin Gothic Book" panose="020B0503020102020204" pitchFamily="34" charset="0"/>
+              </a:rPr>
+              <a:t>Phase de propagation </a:t>
+            </a:r>
+            <a:r>
+              <a:rPr lang="fr-FR" sz="2000" dirty="0">
+                <a:solidFill>
+                  <a:srgbClr val="000000"/>
+                </a:solidFill>
+                <a:latin typeface="Franklin Gothic Book" panose="020B0503020102020204" pitchFamily="34" charset="0"/>
+              </a:rPr>
+              <a:t>: Dans la phase de propagation, l'événement remonte à travers le DOM, de l'élément déclencheur à l'élément racine. Pendant cette phase, </a:t>
+            </a:r>
+            <a:r>
+              <a:rPr lang="fr-FR" sz="2000" b="1" dirty="0">
+                <a:solidFill>
+                  <a:srgbClr val="000000"/>
+                </a:solidFill>
+                <a:latin typeface="Franklin Gothic Book" panose="020B0503020102020204" pitchFamily="34" charset="0"/>
+              </a:rPr>
+              <a:t>les gestionnaires d'événements sont exécutés sur les ancêtres de l'élément déclencheur.</a:t>
+            </a:r>
+          </a:p>
+          <a:p>
+            <a:endParaRPr lang="fr-FR" dirty="0"/>
+          </a:p>
+        </p:txBody>
+      </p:sp>
+      <p:pic>
+        <p:nvPicPr>
+          <p:cNvPr id="2" name="Picture 12" descr="JavaScript Logo et symbole, sens, histoire, PNG, marque">
+            <a:extLst>
+              <a:ext uri="{FF2B5EF4-FFF2-40B4-BE49-F238E27FC236}">
+                <a16:creationId xmlns:a16="http://schemas.microsoft.com/office/drawing/2014/main" id="{77118B57-5B15-1598-B18A-513EF8246D8A}"/>
+              </a:ext>
+            </a:extLst>
+          </p:cNvPr>
+          <p:cNvPicPr>
+            <a:picLocks noChangeAspect="1" noChangeArrowheads="1"/>
+          </p:cNvPicPr>
+          <p:nvPr/>
+        </p:nvPicPr>
+        <p:blipFill>
+          <a:blip r:embed="rId2">
+            <a:extLst>
+              <a:ext uri="{28A0092B-C50C-407E-A947-70E740481C1C}">
+                <a14:useLocalDpi xmlns:a14="http://schemas.microsoft.com/office/drawing/2010/main" val="0"/>
+              </a:ext>
+            </a:extLst>
+          </a:blip>
+          <a:srcRect/>
+          <a:stretch>
+            <a:fillRect/>
+          </a:stretch>
+        </p:blipFill>
+        <p:spPr bwMode="auto">
+          <a:xfrm>
+            <a:off x="10380582" y="286603"/>
+            <a:ext cx="1550195" cy="876779"/>
+          </a:xfrm>
+          <a:prstGeom prst="rect">
+            <a:avLst/>
+          </a:prstGeom>
+          <a:noFill/>
+          <a:extLst>
+            <a:ext uri="{909E8E84-426E-40DD-AFC4-6F175D3DCCD1}">
+              <a14:hiddenFill xmlns:a14="http://schemas.microsoft.com/office/drawing/2010/main">
+                <a:solidFill>
+                  <a:srgbClr val="FFFFFF"/>
+                </a:solidFill>
+              </a14:hiddenFill>
+            </a:ext>
+          </a:extLst>
+        </p:spPr>
+      </p:pic>
+    </p:spTree>
+    <p:extLst>
+      <p:ext uri="{BB962C8B-B14F-4D97-AF65-F5344CB8AC3E}">
+        <p14:creationId xmlns:p14="http://schemas.microsoft.com/office/powerpoint/2010/main" val="3858400750"/>
+      </p:ext>
+    </p:extLst>
+  </p:cSld>
+  <p:clrMapOvr>
+    <a:masterClrMapping/>
+  </p:clrMapOvr>
+</p:sld>
+</file>
+
+<file path=ppt/slides/slide94.xml><?xml version="1.0" encoding="utf-8"?>
+<p:sld xmlns:a="http://schemas.openxmlformats.org/drawingml/2006/main" xmlns:r="http://schemas.openxmlformats.org/officeDocument/2006/relationships" xmlns:p="http://schemas.openxmlformats.org/presentationml/2006/main">
+  <p:cSld>
+    <p:spTree>
+      <p:nvGrpSpPr>
+        <p:cNvPr id="1" name=""/>
+        <p:cNvGrpSpPr/>
+        <p:nvPr/>
+      </p:nvGrpSpPr>
+      <p:grpSpPr>
+        <a:xfrm>
+          <a:off x="0" y="0"/>
+          <a:ext cx="0" cy="0"/>
+          <a:chOff x="0" y="0"/>
+          <a:chExt cx="0" cy="0"/>
+        </a:xfrm>
+      </p:grpSpPr>
+      <p:sp>
+        <p:nvSpPr>
+          <p:cNvPr id="3" name="Titre 1">
+            <a:extLst>
+              <a:ext uri="{FF2B5EF4-FFF2-40B4-BE49-F238E27FC236}">
+                <a16:creationId xmlns:a16="http://schemas.microsoft.com/office/drawing/2014/main" id="{E7373E66-041F-37D5-0ADF-25BA87ABC979}"/>
+              </a:ext>
+            </a:extLst>
+          </p:cNvPr>
+          <p:cNvSpPr>
+            <a:spLocks noGrp="1"/>
+          </p:cNvSpPr>
+          <p:nvPr>
+            <p:ph type="title"/>
+          </p:nvPr>
+        </p:nvSpPr>
+        <p:spPr>
+          <a:xfrm>
+            <a:off x="1097279" y="286603"/>
+            <a:ext cx="11167425" cy="1450757"/>
+          </a:xfrm>
+        </p:spPr>
+        <p:txBody>
+          <a:bodyPr>
+            <a:normAutofit/>
+          </a:bodyPr>
+          <a:lstStyle/>
+          <a:p>
+            <a:r>
+              <a:rPr lang="fr-FR" dirty="0"/>
+              <a:t>IX- Les évènements </a:t>
+            </a:r>
+            <a:br>
+              <a:rPr lang="fr-FR" dirty="0"/>
+            </a:br>
+            <a:r>
+              <a:rPr lang="fr-FR" dirty="0"/>
+              <a:t>	</a:t>
+            </a:r>
+            <a:r>
+              <a:rPr lang="fr-FR" sz="3600" i="1" dirty="0"/>
+              <a:t>  6. Stopper la propagation</a:t>
+            </a:r>
+          </a:p>
+        </p:txBody>
+      </p:sp>
+      <p:sp>
+        <p:nvSpPr>
+          <p:cNvPr id="8" name="ZoneTexte 7">
+            <a:extLst>
+              <a:ext uri="{FF2B5EF4-FFF2-40B4-BE49-F238E27FC236}">
+                <a16:creationId xmlns:a16="http://schemas.microsoft.com/office/drawing/2014/main" id="{FF8794D0-D65F-370E-3343-6B6CB8B83303}"/>
+              </a:ext>
+            </a:extLst>
+          </p:cNvPr>
+          <p:cNvSpPr txBox="1"/>
+          <p:nvPr/>
+        </p:nvSpPr>
+        <p:spPr>
+          <a:xfrm>
+            <a:off x="1097278" y="3124172"/>
+            <a:ext cx="11167425" cy="1200329"/>
+          </a:xfrm>
+          <a:prstGeom prst="rect">
+            <a:avLst/>
+          </a:prstGeom>
+          <a:noFill/>
+        </p:spPr>
+        <p:txBody>
+          <a:bodyPr wrap="square" rtlCol="0">
+            <a:spAutoFit/>
+          </a:bodyPr>
+          <a:lstStyle/>
+          <a:p>
+            <a:r>
+              <a:rPr lang="fr-FR" sz="2400" dirty="0"/>
+              <a:t>La propagation peut être arrêté à tout moment en utilisant la méthode </a:t>
+            </a:r>
+            <a:r>
+              <a:rPr lang="fr-FR" sz="2400" b="1" dirty="0" err="1"/>
+              <a:t>stopPropagation</a:t>
+            </a:r>
+            <a:r>
+              <a:rPr lang="fr-FR" sz="2400" b="1" dirty="0"/>
+              <a:t>() </a:t>
+            </a:r>
+            <a:r>
+              <a:rPr lang="fr-FR" sz="2400" dirty="0"/>
+              <a:t>de l’objet Event. Cette méthode empêche l’évènement de se propager plus loin dans le DOM  </a:t>
+            </a:r>
+          </a:p>
+        </p:txBody>
+      </p:sp>
+      <p:pic>
+        <p:nvPicPr>
+          <p:cNvPr id="2" name="Picture 12" descr="JavaScript Logo et symbole, sens, histoire, PNG, marque">
+            <a:extLst>
+              <a:ext uri="{FF2B5EF4-FFF2-40B4-BE49-F238E27FC236}">
+                <a16:creationId xmlns:a16="http://schemas.microsoft.com/office/drawing/2014/main" id="{4AD875DD-6B98-9253-C610-D50FA1078425}"/>
+              </a:ext>
+            </a:extLst>
+          </p:cNvPr>
+          <p:cNvPicPr>
+            <a:picLocks noChangeAspect="1" noChangeArrowheads="1"/>
+          </p:cNvPicPr>
+          <p:nvPr/>
+        </p:nvPicPr>
+        <p:blipFill>
+          <a:blip r:embed="rId2">
+            <a:extLst>
+              <a:ext uri="{28A0092B-C50C-407E-A947-70E740481C1C}">
+                <a14:useLocalDpi xmlns:a14="http://schemas.microsoft.com/office/drawing/2010/main" val="0"/>
+              </a:ext>
+            </a:extLst>
+          </a:blip>
+          <a:srcRect/>
+          <a:stretch>
+            <a:fillRect/>
+          </a:stretch>
+        </p:blipFill>
+        <p:spPr bwMode="auto">
+          <a:xfrm>
+            <a:off x="10380582" y="286603"/>
+            <a:ext cx="1550195" cy="876779"/>
+          </a:xfrm>
+          <a:prstGeom prst="rect">
+            <a:avLst/>
+          </a:prstGeom>
+          <a:noFill/>
+          <a:extLst>
+            <a:ext uri="{909E8E84-426E-40DD-AFC4-6F175D3DCCD1}">
+              <a14:hiddenFill xmlns:a14="http://schemas.microsoft.com/office/drawing/2010/main">
+                <a:solidFill>
+                  <a:srgbClr val="FFFFFF"/>
+                </a:solidFill>
+              </a14:hiddenFill>
+            </a:ext>
+          </a:extLst>
+        </p:spPr>
+      </p:pic>
+    </p:spTree>
+    <p:extLst>
+      <p:ext uri="{BB962C8B-B14F-4D97-AF65-F5344CB8AC3E}">
+        <p14:creationId xmlns:p14="http://schemas.microsoft.com/office/powerpoint/2010/main" val="2226626547"/>
+      </p:ext>
+    </p:extLst>
+  </p:cSld>
+  <p:clrMapOvr>
+    <a:masterClrMapping/>
+  </p:clrMapOvr>
+</p:sld>
+</file>
+
+<file path=ppt/slides/slide95.xml><?xml version="1.0" encoding="utf-8"?>
+<p:sld xmlns:a="http://schemas.openxmlformats.org/drawingml/2006/main" xmlns:r="http://schemas.openxmlformats.org/officeDocument/2006/relationships" xmlns:p="http://schemas.openxmlformats.org/presentationml/2006/main">
+  <p:cSld>
+    <p:spTree>
+      <p:nvGrpSpPr>
+        <p:cNvPr id="1" name=""/>
+        <p:cNvGrpSpPr/>
+        <p:nvPr/>
+      </p:nvGrpSpPr>
+      <p:grpSpPr>
+        <a:xfrm>
+          <a:off x="0" y="0"/>
+          <a:ext cx="0" cy="0"/>
+          <a:chOff x="0" y="0"/>
+          <a:chExt cx="0" cy="0"/>
+        </a:xfrm>
+      </p:grpSpPr>
+      <p:sp>
+        <p:nvSpPr>
+          <p:cNvPr id="3" name="Titre 1">
+            <a:extLst>
+              <a:ext uri="{FF2B5EF4-FFF2-40B4-BE49-F238E27FC236}">
+                <a16:creationId xmlns:a16="http://schemas.microsoft.com/office/drawing/2014/main" id="{E7373E66-041F-37D5-0ADF-25BA87ABC979}"/>
+              </a:ext>
+            </a:extLst>
+          </p:cNvPr>
+          <p:cNvSpPr>
+            <a:spLocks noGrp="1"/>
+          </p:cNvSpPr>
+          <p:nvPr>
+            <p:ph type="title"/>
+          </p:nvPr>
+        </p:nvSpPr>
+        <p:spPr>
+          <a:xfrm>
+            <a:off x="1097279" y="286603"/>
+            <a:ext cx="11167425" cy="1450757"/>
+          </a:xfrm>
+        </p:spPr>
+        <p:txBody>
+          <a:bodyPr>
+            <a:normAutofit/>
+          </a:bodyPr>
+          <a:lstStyle/>
+          <a:p>
+            <a:r>
+              <a:rPr lang="fr-FR" dirty="0"/>
+              <a:t>IX- Les évènements </a:t>
+            </a:r>
+            <a:br>
+              <a:rPr lang="fr-FR" dirty="0"/>
+            </a:br>
+            <a:r>
+              <a:rPr lang="fr-FR" dirty="0"/>
+              <a:t>	</a:t>
+            </a:r>
+            <a:r>
+              <a:rPr lang="fr-FR" sz="3600" i="1" dirty="0"/>
+              <a:t>  7. Planifier l’exécution </a:t>
+            </a:r>
+          </a:p>
+        </p:txBody>
+      </p:sp>
+      <p:sp>
+        <p:nvSpPr>
+          <p:cNvPr id="4" name="ZoneTexte 3">
+            <a:extLst>
+              <a:ext uri="{FF2B5EF4-FFF2-40B4-BE49-F238E27FC236}">
+                <a16:creationId xmlns:a16="http://schemas.microsoft.com/office/drawing/2014/main" id="{3D8AC56D-C8EC-F123-DFAA-9F2A7E7CAB50}"/>
+              </a:ext>
+            </a:extLst>
+          </p:cNvPr>
+          <p:cNvSpPr txBox="1"/>
+          <p:nvPr/>
+        </p:nvSpPr>
+        <p:spPr>
+          <a:xfrm>
+            <a:off x="1364609" y="2300988"/>
+            <a:ext cx="9278224" cy="3785652"/>
+          </a:xfrm>
+          <a:prstGeom prst="rect">
+            <a:avLst/>
+          </a:prstGeom>
+          <a:noFill/>
+        </p:spPr>
+        <p:txBody>
+          <a:bodyPr wrap="square" rtlCol="0">
+            <a:spAutoFit/>
+          </a:bodyPr>
+          <a:lstStyle/>
+          <a:p>
+            <a:r>
+              <a:rPr lang="fr-FR" sz="2400" b="1" dirty="0" err="1"/>
+              <a:t>SetTimeout</a:t>
+            </a:r>
+            <a:r>
+              <a:rPr lang="fr-FR" sz="2400" b="1" dirty="0"/>
+              <a:t>() </a:t>
+            </a:r>
+            <a:r>
+              <a:rPr lang="fr-FR" sz="2400" dirty="0">
+                <a:sym typeface="Wingdings" panose="05000000000000000000" pitchFamily="2" charset="2"/>
+              </a:rPr>
+              <a:t> P</a:t>
+            </a:r>
+            <a:r>
+              <a:rPr lang="fr-FR" sz="2400" dirty="0"/>
+              <a:t>ermet de programmer l'exécution d'une fonction donnée une </a:t>
+            </a:r>
+            <a:r>
+              <a:rPr lang="fr-FR" sz="2400" b="1" dirty="0"/>
+              <a:t>seule fois </a:t>
+            </a:r>
+            <a:r>
+              <a:rPr lang="fr-FR" sz="2400" dirty="0"/>
+              <a:t>après un </a:t>
+            </a:r>
+            <a:r>
+              <a:rPr lang="fr-FR" sz="2400" b="1" dirty="0"/>
+              <a:t>délai donné</a:t>
+            </a:r>
+            <a:r>
+              <a:rPr lang="fr-FR" sz="2400" dirty="0"/>
+              <a:t>. Cela peut être utile pour réaliser des tâches asynchrones ou pour créer des animations.</a:t>
+            </a:r>
+          </a:p>
+          <a:p>
+            <a:endParaRPr lang="fr-FR" sz="2400" dirty="0"/>
+          </a:p>
+          <a:p>
+            <a:endParaRPr lang="fr-FR" sz="2400" dirty="0"/>
+          </a:p>
+          <a:p>
+            <a:endParaRPr lang="fr-FR" sz="2400" dirty="0"/>
+          </a:p>
+          <a:p>
+            <a:endParaRPr lang="fr-FR" sz="2400" dirty="0"/>
+          </a:p>
+          <a:p>
+            <a:endParaRPr lang="fr-FR" sz="2400" dirty="0"/>
+          </a:p>
+          <a:p>
+            <a:endParaRPr lang="fr-FR" sz="2400" dirty="0"/>
+          </a:p>
+          <a:p>
+            <a:endParaRPr lang="fr-FR" sz="2400" dirty="0"/>
+          </a:p>
+        </p:txBody>
+      </p:sp>
+      <p:sp>
+        <p:nvSpPr>
+          <p:cNvPr id="6" name="ZoneTexte 5">
+            <a:extLst>
+              <a:ext uri="{FF2B5EF4-FFF2-40B4-BE49-F238E27FC236}">
+                <a16:creationId xmlns:a16="http://schemas.microsoft.com/office/drawing/2014/main" id="{61634BC1-3C9B-ADB6-9EEE-3ABEA472F69F}"/>
+              </a:ext>
+            </a:extLst>
+          </p:cNvPr>
+          <p:cNvSpPr txBox="1"/>
+          <p:nvPr/>
+        </p:nvSpPr>
+        <p:spPr>
+          <a:xfrm>
+            <a:off x="1813420" y="5222841"/>
+            <a:ext cx="8565160" cy="646331"/>
+          </a:xfrm>
+          <a:prstGeom prst="rect">
+            <a:avLst/>
+          </a:prstGeom>
+          <a:noFill/>
+        </p:spPr>
+        <p:txBody>
+          <a:bodyPr wrap="square" rtlCol="0">
+            <a:spAutoFit/>
+          </a:bodyPr>
+          <a:lstStyle/>
+          <a:p>
+            <a:r>
+              <a:rPr lang="fr-FR" dirty="0" err="1"/>
+              <a:t>Function</a:t>
+            </a:r>
+            <a:r>
+              <a:rPr lang="fr-FR" dirty="0"/>
+              <a:t>: est la fonction à exécuter.</a:t>
+            </a:r>
+          </a:p>
+          <a:p>
+            <a:r>
+              <a:rPr lang="fr-FR" dirty="0"/>
+              <a:t>Delay: est le temps d'attente en millisecondes avant que la fonction ne soit exécutée</a:t>
+            </a:r>
+            <a:r>
+              <a:rPr lang="fr-FR" b="0" i="0" dirty="0">
+                <a:solidFill>
+                  <a:srgbClr val="374151"/>
+                </a:solidFill>
+                <a:effectLst/>
+                <a:latin typeface="Söhne"/>
+              </a:rPr>
+              <a:t>.</a:t>
+            </a:r>
+            <a:endParaRPr lang="fr-FR" dirty="0"/>
+          </a:p>
+        </p:txBody>
+      </p:sp>
+      <p:pic>
+        <p:nvPicPr>
+          <p:cNvPr id="9" name="Image 8">
+            <a:extLst>
+              <a:ext uri="{FF2B5EF4-FFF2-40B4-BE49-F238E27FC236}">
+                <a16:creationId xmlns:a16="http://schemas.microsoft.com/office/drawing/2014/main" id="{04E2BED0-F9E4-2923-DDA6-A14BA8096804}"/>
+              </a:ext>
+            </a:extLst>
+          </p:cNvPr>
+          <p:cNvPicPr>
+            <a:picLocks noChangeAspect="1"/>
+          </p:cNvPicPr>
+          <p:nvPr/>
+        </p:nvPicPr>
+        <p:blipFill>
+          <a:blip r:embed="rId2"/>
+          <a:stretch>
+            <a:fillRect/>
+          </a:stretch>
+        </p:blipFill>
+        <p:spPr>
+          <a:xfrm>
+            <a:off x="2382473" y="3975570"/>
+            <a:ext cx="5910770" cy="436488"/>
+          </a:xfrm>
+          <a:prstGeom prst="rect">
+            <a:avLst/>
+          </a:prstGeom>
+        </p:spPr>
+      </p:pic>
+      <p:pic>
+        <p:nvPicPr>
+          <p:cNvPr id="2" name="Picture 12" descr="JavaScript Logo et symbole, sens, histoire, PNG, marque">
+            <a:extLst>
+              <a:ext uri="{FF2B5EF4-FFF2-40B4-BE49-F238E27FC236}">
+                <a16:creationId xmlns:a16="http://schemas.microsoft.com/office/drawing/2014/main" id="{6A97B245-85D1-06DE-4B4E-232188F36809}"/>
+              </a:ext>
+            </a:extLst>
+          </p:cNvPr>
+          <p:cNvPicPr>
+            <a:picLocks noChangeAspect="1" noChangeArrowheads="1"/>
+          </p:cNvPicPr>
+          <p:nvPr/>
+        </p:nvPicPr>
+        <p:blipFill>
+          <a:blip r:embed="rId3">
+            <a:extLst>
+              <a:ext uri="{28A0092B-C50C-407E-A947-70E740481C1C}">
+                <a14:useLocalDpi xmlns:a14="http://schemas.microsoft.com/office/drawing/2010/main" val="0"/>
+              </a:ext>
+            </a:extLst>
+          </a:blip>
+          <a:srcRect/>
+          <a:stretch>
+            <a:fillRect/>
+          </a:stretch>
+        </p:blipFill>
+        <p:spPr bwMode="auto">
+          <a:xfrm>
+            <a:off x="10380582" y="286603"/>
+            <a:ext cx="1550195" cy="876779"/>
+          </a:xfrm>
+          <a:prstGeom prst="rect">
+            <a:avLst/>
+          </a:prstGeom>
+          <a:noFill/>
+          <a:extLst>
+            <a:ext uri="{909E8E84-426E-40DD-AFC4-6F175D3DCCD1}">
+              <a14:hiddenFill xmlns:a14="http://schemas.microsoft.com/office/drawing/2010/main">
+                <a:solidFill>
+                  <a:srgbClr val="FFFFFF"/>
+                </a:solidFill>
+              </a14:hiddenFill>
+            </a:ext>
+          </a:extLst>
+        </p:spPr>
+      </p:pic>
+    </p:spTree>
+    <p:extLst>
+      <p:ext uri="{BB962C8B-B14F-4D97-AF65-F5344CB8AC3E}">
+        <p14:creationId xmlns:p14="http://schemas.microsoft.com/office/powerpoint/2010/main" val="2323925785"/>
+      </p:ext>
+    </p:extLst>
+  </p:cSld>
+  <p:clrMapOvr>
+    <a:masterClrMapping/>
+  </p:clrMapOvr>
+</p:sld>
+</file>
+
+<file path=ppt/slides/slide96.xml><?xml version="1.0" encoding="utf-8"?>
+<p:sld xmlns:a="http://schemas.openxmlformats.org/drawingml/2006/main" xmlns:r="http://schemas.openxmlformats.org/officeDocument/2006/relationships" xmlns:p="http://schemas.openxmlformats.org/presentationml/2006/main">
+  <p:cSld>
+    <p:spTree>
+      <p:nvGrpSpPr>
+        <p:cNvPr id="1" name=""/>
+        <p:cNvGrpSpPr/>
+        <p:nvPr/>
+      </p:nvGrpSpPr>
+      <p:grpSpPr>
+        <a:xfrm>
+          <a:off x="0" y="0"/>
+          <a:ext cx="0" cy="0"/>
+          <a:chOff x="0" y="0"/>
+          <a:chExt cx="0" cy="0"/>
+        </a:xfrm>
+      </p:grpSpPr>
+      <p:sp>
+        <p:nvSpPr>
+          <p:cNvPr id="3" name="Titre 1">
+            <a:extLst>
+              <a:ext uri="{FF2B5EF4-FFF2-40B4-BE49-F238E27FC236}">
+                <a16:creationId xmlns:a16="http://schemas.microsoft.com/office/drawing/2014/main" id="{E7373E66-041F-37D5-0ADF-25BA87ABC979}"/>
+              </a:ext>
+            </a:extLst>
+          </p:cNvPr>
+          <p:cNvSpPr>
+            <a:spLocks noGrp="1"/>
+          </p:cNvSpPr>
+          <p:nvPr>
+            <p:ph type="title"/>
+          </p:nvPr>
+        </p:nvSpPr>
+        <p:spPr>
+          <a:xfrm>
+            <a:off x="1097279" y="286603"/>
+            <a:ext cx="11167425" cy="1450757"/>
+          </a:xfrm>
+        </p:spPr>
+        <p:txBody>
+          <a:bodyPr>
+            <a:normAutofit/>
+          </a:bodyPr>
+          <a:lstStyle/>
+          <a:p>
+            <a:r>
+              <a:rPr lang="fr-FR" dirty="0"/>
+              <a:t>IX- Les évènements </a:t>
+            </a:r>
+            <a:br>
+              <a:rPr lang="fr-FR" dirty="0"/>
+            </a:br>
+            <a:r>
+              <a:rPr lang="fr-FR" dirty="0"/>
+              <a:t>	</a:t>
+            </a:r>
+            <a:r>
+              <a:rPr lang="fr-FR" sz="3600" i="1" dirty="0"/>
+              <a:t>  7. Planifier l’exécution </a:t>
+            </a:r>
+          </a:p>
+        </p:txBody>
+      </p:sp>
+      <p:sp>
+        <p:nvSpPr>
+          <p:cNvPr id="4" name="ZoneTexte 3">
+            <a:extLst>
+              <a:ext uri="{FF2B5EF4-FFF2-40B4-BE49-F238E27FC236}">
+                <a16:creationId xmlns:a16="http://schemas.microsoft.com/office/drawing/2014/main" id="{3D8AC56D-C8EC-F123-DFAA-9F2A7E7CAB50}"/>
+              </a:ext>
+            </a:extLst>
+          </p:cNvPr>
+          <p:cNvSpPr txBox="1"/>
+          <p:nvPr/>
+        </p:nvSpPr>
+        <p:spPr>
+          <a:xfrm>
+            <a:off x="1456888" y="2519101"/>
+            <a:ext cx="9278224" cy="3046988"/>
+          </a:xfrm>
+          <a:prstGeom prst="rect">
+            <a:avLst/>
+          </a:prstGeom>
+          <a:noFill/>
+        </p:spPr>
+        <p:txBody>
+          <a:bodyPr wrap="square" rtlCol="0">
+            <a:spAutoFit/>
+          </a:bodyPr>
+          <a:lstStyle/>
+          <a:p>
+            <a:r>
+              <a:rPr lang="fr-FR" sz="2400" b="1" dirty="0" err="1"/>
+              <a:t>SetInterval</a:t>
+            </a:r>
+            <a:r>
+              <a:rPr lang="fr-FR" sz="2400" b="1" dirty="0"/>
+              <a:t>() </a:t>
+            </a:r>
+            <a:r>
+              <a:rPr lang="fr-FR" sz="2400" dirty="0">
+                <a:sym typeface="Wingdings" panose="05000000000000000000" pitchFamily="2" charset="2"/>
+              </a:rPr>
+              <a:t> </a:t>
+            </a:r>
+            <a:r>
+              <a:rPr lang="fr-FR" sz="2400" dirty="0"/>
+              <a:t>permet d'exécuter une fonction à intervalles réguliers.</a:t>
+            </a:r>
+          </a:p>
+          <a:p>
+            <a:endParaRPr lang="fr-FR" sz="2400" dirty="0"/>
+          </a:p>
+          <a:p>
+            <a:endParaRPr lang="fr-FR" sz="2400" dirty="0"/>
+          </a:p>
+          <a:p>
+            <a:endParaRPr lang="fr-FR" sz="2400" dirty="0"/>
+          </a:p>
+          <a:p>
+            <a:endParaRPr lang="fr-FR" sz="2400" dirty="0"/>
+          </a:p>
+          <a:p>
+            <a:endParaRPr lang="fr-FR" sz="2400" dirty="0"/>
+          </a:p>
+          <a:p>
+            <a:endParaRPr lang="fr-FR" sz="2400" dirty="0"/>
+          </a:p>
+          <a:p>
+            <a:endParaRPr lang="fr-FR" sz="2400" dirty="0"/>
+          </a:p>
+        </p:txBody>
+      </p:sp>
+      <p:pic>
+        <p:nvPicPr>
+          <p:cNvPr id="5" name="Image 4">
+            <a:extLst>
+              <a:ext uri="{FF2B5EF4-FFF2-40B4-BE49-F238E27FC236}">
+                <a16:creationId xmlns:a16="http://schemas.microsoft.com/office/drawing/2014/main" id="{C6ED48B0-2B63-6581-250C-006C6B88741D}"/>
+              </a:ext>
+            </a:extLst>
+          </p:cNvPr>
+          <p:cNvPicPr>
+            <a:picLocks noChangeAspect="1"/>
+          </p:cNvPicPr>
+          <p:nvPr/>
+        </p:nvPicPr>
+        <p:blipFill>
+          <a:blip r:embed="rId2"/>
+          <a:stretch>
+            <a:fillRect/>
+          </a:stretch>
+        </p:blipFill>
+        <p:spPr>
+          <a:xfrm>
+            <a:off x="2709643" y="3728650"/>
+            <a:ext cx="6081555" cy="627890"/>
+          </a:xfrm>
+          <a:prstGeom prst="rect">
+            <a:avLst/>
+          </a:prstGeom>
+        </p:spPr>
+      </p:pic>
+      <p:sp>
+        <p:nvSpPr>
+          <p:cNvPr id="6" name="ZoneTexte 5">
+            <a:extLst>
+              <a:ext uri="{FF2B5EF4-FFF2-40B4-BE49-F238E27FC236}">
+                <a16:creationId xmlns:a16="http://schemas.microsoft.com/office/drawing/2014/main" id="{FAFDBC1D-018B-418D-5FD4-23952270DACF}"/>
+              </a:ext>
+            </a:extLst>
+          </p:cNvPr>
+          <p:cNvSpPr txBox="1"/>
+          <p:nvPr/>
+        </p:nvSpPr>
+        <p:spPr>
+          <a:xfrm>
+            <a:off x="1897310" y="4638149"/>
+            <a:ext cx="8565160" cy="646331"/>
+          </a:xfrm>
+          <a:prstGeom prst="rect">
+            <a:avLst/>
+          </a:prstGeom>
+          <a:noFill/>
+        </p:spPr>
+        <p:txBody>
+          <a:bodyPr wrap="square" rtlCol="0">
+            <a:spAutoFit/>
+          </a:bodyPr>
+          <a:lstStyle/>
+          <a:p>
+            <a:r>
+              <a:rPr lang="fr-FR" b="1" dirty="0" err="1"/>
+              <a:t>Function</a:t>
+            </a:r>
+            <a:r>
+              <a:rPr lang="fr-FR" dirty="0"/>
+              <a:t>: est la fonction </a:t>
+            </a:r>
+            <a:r>
+              <a:rPr lang="fr-FR" dirty="0" err="1"/>
+              <a:t>callBack</a:t>
+            </a:r>
+            <a:r>
+              <a:rPr lang="fr-FR" dirty="0"/>
+              <a:t> à exécuter.</a:t>
+            </a:r>
+          </a:p>
+          <a:p>
+            <a:r>
+              <a:rPr lang="fr-FR" b="1" dirty="0"/>
+              <a:t>Delay</a:t>
+            </a:r>
+            <a:r>
+              <a:rPr lang="fr-FR" dirty="0"/>
+              <a:t>: est le temps d'attente en millisecondes avant que la fonction ne soit exécutée</a:t>
+            </a:r>
+            <a:r>
+              <a:rPr lang="fr-FR" b="0" i="0" dirty="0">
+                <a:solidFill>
+                  <a:srgbClr val="374151"/>
+                </a:solidFill>
+                <a:effectLst/>
+                <a:latin typeface="Söhne"/>
+              </a:rPr>
+              <a:t>.</a:t>
+            </a:r>
+            <a:endParaRPr lang="fr-FR" dirty="0"/>
+          </a:p>
+        </p:txBody>
+      </p:sp>
+      <p:sp>
+        <p:nvSpPr>
+          <p:cNvPr id="2" name="ZoneTexte 1">
+            <a:extLst>
+              <a:ext uri="{FF2B5EF4-FFF2-40B4-BE49-F238E27FC236}">
+                <a16:creationId xmlns:a16="http://schemas.microsoft.com/office/drawing/2014/main" id="{FEBF2A19-0FFF-0B8C-61AB-3CDCC187D66E}"/>
+              </a:ext>
+            </a:extLst>
+          </p:cNvPr>
+          <p:cNvSpPr txBox="1"/>
+          <p:nvPr/>
+        </p:nvSpPr>
+        <p:spPr>
+          <a:xfrm>
+            <a:off x="2214693" y="5750647"/>
+            <a:ext cx="8313490" cy="923330"/>
+          </a:xfrm>
+          <a:prstGeom prst="rect">
+            <a:avLst/>
+          </a:prstGeom>
+          <a:noFill/>
+        </p:spPr>
+        <p:txBody>
+          <a:bodyPr wrap="square" rtlCol="0">
+            <a:spAutoFit/>
+          </a:bodyPr>
+          <a:lstStyle/>
+          <a:p>
+            <a:r>
+              <a:rPr lang="fr-FR" dirty="0"/>
+              <a:t>Exercice:  faire un compteur qui affiche les nombres de 1 à 3, avec un intervalle de 2sec et termine par afficher fin </a:t>
+            </a:r>
+          </a:p>
+          <a:p>
+            <a:endParaRPr lang="fr-FR" dirty="0"/>
+          </a:p>
+        </p:txBody>
+      </p:sp>
+      <p:pic>
+        <p:nvPicPr>
+          <p:cNvPr id="7" name="Picture 12" descr="JavaScript Logo et symbole, sens, histoire, PNG, marque">
+            <a:extLst>
+              <a:ext uri="{FF2B5EF4-FFF2-40B4-BE49-F238E27FC236}">
+                <a16:creationId xmlns:a16="http://schemas.microsoft.com/office/drawing/2014/main" id="{56E38559-C879-DA86-89B1-6E3E3B288CD4}"/>
+              </a:ext>
+            </a:extLst>
+          </p:cNvPr>
+          <p:cNvPicPr>
+            <a:picLocks noChangeAspect="1" noChangeArrowheads="1"/>
+          </p:cNvPicPr>
+          <p:nvPr/>
+        </p:nvPicPr>
+        <p:blipFill>
+          <a:blip r:embed="rId3">
+            <a:extLst>
+              <a:ext uri="{28A0092B-C50C-407E-A947-70E740481C1C}">
+                <a14:useLocalDpi xmlns:a14="http://schemas.microsoft.com/office/drawing/2010/main" val="0"/>
+              </a:ext>
+            </a:extLst>
+          </a:blip>
+          <a:srcRect/>
+          <a:stretch>
+            <a:fillRect/>
+          </a:stretch>
+        </p:blipFill>
+        <p:spPr bwMode="auto">
+          <a:xfrm>
+            <a:off x="10380582" y="286603"/>
+            <a:ext cx="1550195" cy="876779"/>
+          </a:xfrm>
+          <a:prstGeom prst="rect">
+            <a:avLst/>
+          </a:prstGeom>
+          <a:noFill/>
+          <a:extLst>
+            <a:ext uri="{909E8E84-426E-40DD-AFC4-6F175D3DCCD1}">
+              <a14:hiddenFill xmlns:a14="http://schemas.microsoft.com/office/drawing/2010/main">
+                <a:solidFill>
+                  <a:srgbClr val="FFFFFF"/>
+                </a:solidFill>
+              </a14:hiddenFill>
+            </a:ext>
+          </a:extLst>
+        </p:spPr>
+      </p:pic>
+    </p:spTree>
+    <p:extLst>
+      <p:ext uri="{BB962C8B-B14F-4D97-AF65-F5344CB8AC3E}">
+        <p14:creationId xmlns:p14="http://schemas.microsoft.com/office/powerpoint/2010/main" val="3815784648"/>
       </p:ext>
     </p:extLst>
   </p:cSld>

</xml_diff>

<commit_message>
localStorage + exo themes
</commit_message>
<xml_diff>
--- a/cours.pptx
+++ b/cours.pptx
@@ -119,6 +119,12 @@
     <p:sldId id="434" r:id="rId113"/>
     <p:sldId id="435" r:id="rId114"/>
     <p:sldId id="436" r:id="rId115"/>
+    <p:sldId id="427" r:id="rId116"/>
+    <p:sldId id="428" r:id="rId117"/>
+    <p:sldId id="429" r:id="rId118"/>
+    <p:sldId id="430" r:id="rId119"/>
+    <p:sldId id="472" r:id="rId120"/>
+    <p:sldId id="431" r:id="rId121"/>
   </p:sldIdLst>
   <p:sldSz cx="12192000" cy="6858000"/>
   <p:notesSz cx="6858000" cy="9144000"/>
@@ -372,7 +378,7 @@
           <a:p>
             <a:fld id="{6AD61AA8-A60B-4213-843B-33CCD8DDD4AE}" type="datetimeFigureOut">
               <a:rPr lang="fr-FR" smtClean="0"/>
-              <a:t>10/01/2024</a:t>
+              <a:t>11/01/2024</a:t>
             </a:fld>
             <a:endParaRPr lang="fr-FR"/>
           </a:p>
@@ -570,7 +576,7 @@
           <a:p>
             <a:fld id="{6AD61AA8-A60B-4213-843B-33CCD8DDD4AE}" type="datetimeFigureOut">
               <a:rPr lang="fr-FR" smtClean="0"/>
-              <a:t>10/01/2024</a:t>
+              <a:t>11/01/2024</a:t>
             </a:fld>
             <a:endParaRPr lang="fr-FR"/>
           </a:p>
@@ -778,7 +784,7 @@
           <a:p>
             <a:fld id="{6AD61AA8-A60B-4213-843B-33CCD8DDD4AE}" type="datetimeFigureOut">
               <a:rPr lang="fr-FR" smtClean="0"/>
-              <a:t>10/01/2024</a:t>
+              <a:t>11/01/2024</a:t>
             </a:fld>
             <a:endParaRPr lang="fr-FR"/>
           </a:p>
@@ -976,7 +982,7 @@
           <a:p>
             <a:fld id="{6AD61AA8-A60B-4213-843B-33CCD8DDD4AE}" type="datetimeFigureOut">
               <a:rPr lang="fr-FR" smtClean="0"/>
-              <a:t>10/01/2024</a:t>
+              <a:t>11/01/2024</a:t>
             </a:fld>
             <a:endParaRPr lang="fr-FR"/>
           </a:p>
@@ -1251,7 +1257,7 @@
           <a:p>
             <a:fld id="{6AD61AA8-A60B-4213-843B-33CCD8DDD4AE}" type="datetimeFigureOut">
               <a:rPr lang="fr-FR" smtClean="0"/>
-              <a:t>10/01/2024</a:t>
+              <a:t>11/01/2024</a:t>
             </a:fld>
             <a:endParaRPr lang="fr-FR"/>
           </a:p>
@@ -1516,7 +1522,7 @@
           <a:p>
             <a:fld id="{6AD61AA8-A60B-4213-843B-33CCD8DDD4AE}" type="datetimeFigureOut">
               <a:rPr lang="fr-FR" smtClean="0"/>
-              <a:t>10/01/2024</a:t>
+              <a:t>11/01/2024</a:t>
             </a:fld>
             <a:endParaRPr lang="fr-FR"/>
           </a:p>
@@ -1928,7 +1934,7 @@
           <a:p>
             <a:fld id="{6AD61AA8-A60B-4213-843B-33CCD8DDD4AE}" type="datetimeFigureOut">
               <a:rPr lang="fr-FR" smtClean="0"/>
-              <a:t>10/01/2024</a:t>
+              <a:t>11/01/2024</a:t>
             </a:fld>
             <a:endParaRPr lang="fr-FR"/>
           </a:p>
@@ -2069,7 +2075,7 @@
           <a:p>
             <a:fld id="{6AD61AA8-A60B-4213-843B-33CCD8DDD4AE}" type="datetimeFigureOut">
               <a:rPr lang="fr-FR" smtClean="0"/>
-              <a:t>10/01/2024</a:t>
+              <a:t>11/01/2024</a:t>
             </a:fld>
             <a:endParaRPr lang="fr-FR"/>
           </a:p>
@@ -2182,7 +2188,7 @@
           <a:p>
             <a:fld id="{6AD61AA8-A60B-4213-843B-33CCD8DDD4AE}" type="datetimeFigureOut">
               <a:rPr lang="fr-FR" smtClean="0"/>
-              <a:t>10/01/2024</a:t>
+              <a:t>11/01/2024</a:t>
             </a:fld>
             <a:endParaRPr lang="fr-FR"/>
           </a:p>
@@ -2493,7 +2499,7 @@
           <a:p>
             <a:fld id="{6AD61AA8-A60B-4213-843B-33CCD8DDD4AE}" type="datetimeFigureOut">
               <a:rPr lang="fr-FR" smtClean="0"/>
-              <a:t>10/01/2024</a:t>
+              <a:t>11/01/2024</a:t>
             </a:fld>
             <a:endParaRPr lang="fr-FR"/>
           </a:p>
@@ -2781,7 +2787,7 @@
           <a:p>
             <a:fld id="{6AD61AA8-A60B-4213-843B-33CCD8DDD4AE}" type="datetimeFigureOut">
               <a:rPr lang="fr-FR" smtClean="0"/>
-              <a:t>10/01/2024</a:t>
+              <a:t>11/01/2024</a:t>
             </a:fld>
             <a:endParaRPr lang="fr-FR"/>
           </a:p>
@@ -3022,7 +3028,7 @@
           <a:p>
             <a:fld id="{6AD61AA8-A60B-4213-843B-33CCD8DDD4AE}" type="datetimeFigureOut">
               <a:rPr lang="fr-FR" smtClean="0"/>
-              <a:t>10/01/2024</a:t>
+              <a:t>11/01/2024</a:t>
             </a:fld>
             <a:endParaRPr lang="fr-FR"/>
           </a:p>
@@ -8220,6 +8226,2116 @@
 </p:sld>
 </file>
 
+<file path=ppt/slides/slide115.xml><?xml version="1.0" encoding="utf-8"?>
+<p:sld xmlns:a="http://schemas.openxmlformats.org/drawingml/2006/main" xmlns:r="http://schemas.openxmlformats.org/officeDocument/2006/relationships" xmlns:p="http://schemas.openxmlformats.org/presentationml/2006/main">
+  <p:cSld>
+    <p:spTree>
+      <p:nvGrpSpPr>
+        <p:cNvPr id="1" name=""/>
+        <p:cNvGrpSpPr/>
+        <p:nvPr/>
+      </p:nvGrpSpPr>
+      <p:grpSpPr>
+        <a:xfrm>
+          <a:off x="0" y="0"/>
+          <a:ext cx="0" cy="0"/>
+          <a:chOff x="0" y="0"/>
+          <a:chExt cx="0" cy="0"/>
+        </a:xfrm>
+      </p:grpSpPr>
+      <p:sp>
+        <p:nvSpPr>
+          <p:cNvPr id="3" name="Titre 1">
+            <a:extLst>
+              <a:ext uri="{FF2B5EF4-FFF2-40B4-BE49-F238E27FC236}">
+                <a16:creationId xmlns:a16="http://schemas.microsoft.com/office/drawing/2014/main" id="{E7373E66-041F-37D5-0ADF-25BA87ABC979}"/>
+              </a:ext>
+            </a:extLst>
+          </p:cNvPr>
+          <p:cNvSpPr>
+            <a:spLocks noGrp="1"/>
+          </p:cNvSpPr>
+          <p:nvPr>
+            <p:ph type="title"/>
+          </p:nvPr>
+        </p:nvSpPr>
+        <p:spPr>
+          <a:xfrm>
+            <a:off x="338916" y="154731"/>
+            <a:ext cx="11167425" cy="1450757"/>
+          </a:xfrm>
+        </p:spPr>
+        <p:txBody>
+          <a:bodyPr>
+            <a:normAutofit/>
+          </a:bodyPr>
+          <a:lstStyle/>
+          <a:p>
+            <a:r>
+              <a:rPr lang="fr-FR" dirty="0"/>
+              <a:t>XII- Stocker des données  </a:t>
+            </a:r>
+            <a:br>
+              <a:rPr lang="fr-FR" dirty="0"/>
+            </a:br>
+            <a:r>
+              <a:rPr lang="fr-FR" dirty="0"/>
+              <a:t>	</a:t>
+            </a:r>
+            <a:r>
+              <a:rPr lang="fr-FR" sz="3600" i="1" dirty="0"/>
+              <a:t>  1. Les cookies </a:t>
+            </a:r>
+          </a:p>
+        </p:txBody>
+      </p:sp>
+      <p:sp>
+        <p:nvSpPr>
+          <p:cNvPr id="2" name="ZoneTexte 1">
+            <a:extLst>
+              <a:ext uri="{FF2B5EF4-FFF2-40B4-BE49-F238E27FC236}">
+                <a16:creationId xmlns:a16="http://schemas.microsoft.com/office/drawing/2014/main" id="{345E95FA-EC7D-B2BB-355B-4A4B552582E2}"/>
+              </a:ext>
+            </a:extLst>
+          </p:cNvPr>
+          <p:cNvSpPr txBox="1"/>
+          <p:nvPr/>
+        </p:nvSpPr>
+        <p:spPr>
+          <a:xfrm>
+            <a:off x="1182849" y="2374083"/>
+            <a:ext cx="10167456" cy="4062651"/>
+          </a:xfrm>
+          <a:prstGeom prst="rect">
+            <a:avLst/>
+          </a:prstGeom>
+          <a:noFill/>
+        </p:spPr>
+        <p:txBody>
+          <a:bodyPr wrap="square" rtlCol="0">
+            <a:spAutoFit/>
+          </a:bodyPr>
+          <a:lstStyle/>
+          <a:p>
+            <a:pPr>
+              <a:lnSpc>
+                <a:spcPct val="200000"/>
+              </a:lnSpc>
+            </a:pPr>
+            <a:r>
+              <a:rPr lang="fr-FR" sz="2400" dirty="0">
+                <a:solidFill>
+                  <a:srgbClr val="374151"/>
+                </a:solidFill>
+                <a:latin typeface="Söhne"/>
+              </a:rPr>
+              <a:t>Les cookies vont nous permettre de </a:t>
+            </a:r>
+            <a:r>
+              <a:rPr lang="fr-FR" sz="2400" b="1" dirty="0">
+                <a:solidFill>
+                  <a:srgbClr val="374151"/>
+                </a:solidFill>
+                <a:latin typeface="Söhne"/>
+              </a:rPr>
+              <a:t>stocker des informations sur le navigateur </a:t>
+            </a:r>
+            <a:r>
+              <a:rPr lang="fr-FR" sz="2400" dirty="0">
+                <a:solidFill>
+                  <a:srgbClr val="374151"/>
+                </a:solidFill>
+                <a:latin typeface="Söhne"/>
+              </a:rPr>
+              <a:t>de l'utilisateur, les cookies sont envoyés au serveur web à chaque requête HTTP. Les cookies sont donc </a:t>
+            </a:r>
+            <a:r>
+              <a:rPr lang="fr-FR" sz="2400" b="1" dirty="0">
+                <a:solidFill>
+                  <a:srgbClr val="374151"/>
+                </a:solidFill>
+                <a:latin typeface="Söhne"/>
+              </a:rPr>
+              <a:t>plus lents que le </a:t>
+            </a:r>
+            <a:r>
+              <a:rPr lang="fr-FR" sz="2400" b="1" dirty="0" err="1">
+                <a:solidFill>
+                  <a:srgbClr val="374151"/>
+                </a:solidFill>
+                <a:latin typeface="Söhne"/>
+              </a:rPr>
+              <a:t>localStorage</a:t>
+            </a:r>
+            <a:r>
+              <a:rPr lang="fr-FR" sz="2400" b="1" dirty="0">
+                <a:solidFill>
+                  <a:srgbClr val="374151"/>
+                </a:solidFill>
+                <a:latin typeface="Söhne"/>
+              </a:rPr>
+              <a:t> </a:t>
+            </a:r>
+            <a:r>
+              <a:rPr lang="fr-FR" sz="2400" dirty="0">
+                <a:solidFill>
+                  <a:srgbClr val="374151"/>
+                </a:solidFill>
+                <a:latin typeface="Söhne"/>
+              </a:rPr>
+              <a:t>mais ils permettent de stocker des </a:t>
+            </a:r>
+            <a:r>
+              <a:rPr lang="fr-FR" sz="2400" b="1" dirty="0">
+                <a:solidFill>
+                  <a:srgbClr val="374151"/>
+                </a:solidFill>
+                <a:latin typeface="Söhne"/>
+              </a:rPr>
+              <a:t>informations plus importantes</a:t>
+            </a:r>
+            <a:r>
+              <a:rPr lang="fr-FR" sz="2400" dirty="0">
+                <a:solidFill>
+                  <a:srgbClr val="374151"/>
+                </a:solidFill>
+                <a:latin typeface="Söhne"/>
+              </a:rPr>
+              <a:t>, tels que des informations d'identification.</a:t>
+            </a:r>
+          </a:p>
+          <a:p>
+            <a:endParaRPr lang="fr-FR" dirty="0"/>
+          </a:p>
+        </p:txBody>
+      </p:sp>
+      <p:pic>
+        <p:nvPicPr>
+          <p:cNvPr id="1028" name="Picture 4" descr="MATRIX: Why Did The Oracle Give Neo a Cookie? - YouTube">
+            <a:extLst>
+              <a:ext uri="{FF2B5EF4-FFF2-40B4-BE49-F238E27FC236}">
+                <a16:creationId xmlns:a16="http://schemas.microsoft.com/office/drawing/2014/main" id="{F2B847B1-B711-5982-510F-96B381A3048A}"/>
+              </a:ext>
+            </a:extLst>
+          </p:cNvPr>
+          <p:cNvPicPr>
+            <a:picLocks noChangeAspect="1" noChangeArrowheads="1"/>
+          </p:cNvPicPr>
+          <p:nvPr/>
+        </p:nvPicPr>
+        <p:blipFill>
+          <a:blip r:embed="rId2">
+            <a:extLst>
+              <a:ext uri="{28A0092B-C50C-407E-A947-70E740481C1C}">
+                <a14:useLocalDpi xmlns:a14="http://schemas.microsoft.com/office/drawing/2010/main" val="0"/>
+              </a:ext>
+            </a:extLst>
+          </a:blip>
+          <a:srcRect/>
+          <a:stretch>
+            <a:fillRect/>
+          </a:stretch>
+        </p:blipFill>
+        <p:spPr bwMode="auto">
+          <a:xfrm>
+            <a:off x="8850385" y="22858"/>
+            <a:ext cx="3327635" cy="1871795"/>
+          </a:xfrm>
+          <a:prstGeom prst="rect">
+            <a:avLst/>
+          </a:prstGeom>
+          <a:noFill/>
+          <a:extLst>
+            <a:ext uri="{909E8E84-426E-40DD-AFC4-6F175D3DCCD1}">
+              <a14:hiddenFill xmlns:a14="http://schemas.microsoft.com/office/drawing/2010/main">
+                <a:solidFill>
+                  <a:srgbClr val="FFFFFF"/>
+                </a:solidFill>
+              </a14:hiddenFill>
+            </a:ext>
+          </a:extLst>
+        </p:spPr>
+      </p:pic>
+    </p:spTree>
+    <p:extLst>
+      <p:ext uri="{BB962C8B-B14F-4D97-AF65-F5344CB8AC3E}">
+        <p14:creationId xmlns:p14="http://schemas.microsoft.com/office/powerpoint/2010/main" val="915000580"/>
+      </p:ext>
+    </p:extLst>
+  </p:cSld>
+  <p:clrMapOvr>
+    <a:masterClrMapping/>
+  </p:clrMapOvr>
+</p:sld>
+</file>
+
+<file path=ppt/slides/slide116.xml><?xml version="1.0" encoding="utf-8"?>
+<p:sld xmlns:a="http://schemas.openxmlformats.org/drawingml/2006/main" xmlns:r="http://schemas.openxmlformats.org/officeDocument/2006/relationships" xmlns:p="http://schemas.openxmlformats.org/presentationml/2006/main">
+  <p:cSld>
+    <p:spTree>
+      <p:nvGrpSpPr>
+        <p:cNvPr id="1" name=""/>
+        <p:cNvGrpSpPr/>
+        <p:nvPr/>
+      </p:nvGrpSpPr>
+      <p:grpSpPr>
+        <a:xfrm>
+          <a:off x="0" y="0"/>
+          <a:ext cx="0" cy="0"/>
+          <a:chOff x="0" y="0"/>
+          <a:chExt cx="0" cy="0"/>
+        </a:xfrm>
+      </p:grpSpPr>
+      <p:sp>
+        <p:nvSpPr>
+          <p:cNvPr id="3" name="Titre 1">
+            <a:extLst>
+              <a:ext uri="{FF2B5EF4-FFF2-40B4-BE49-F238E27FC236}">
+                <a16:creationId xmlns:a16="http://schemas.microsoft.com/office/drawing/2014/main" id="{E7373E66-041F-37D5-0ADF-25BA87ABC979}"/>
+              </a:ext>
+            </a:extLst>
+          </p:cNvPr>
+          <p:cNvSpPr>
+            <a:spLocks noGrp="1"/>
+          </p:cNvSpPr>
+          <p:nvPr>
+            <p:ph type="title"/>
+          </p:nvPr>
+        </p:nvSpPr>
+        <p:spPr>
+          <a:xfrm>
+            <a:off x="1024575" y="259443"/>
+            <a:ext cx="11167425" cy="1450757"/>
+          </a:xfrm>
+        </p:spPr>
+        <p:txBody>
+          <a:bodyPr>
+            <a:normAutofit/>
+          </a:bodyPr>
+          <a:lstStyle/>
+          <a:p>
+            <a:r>
+              <a:rPr lang="fr-FR" dirty="0"/>
+              <a:t>XII- Stocker des données  </a:t>
+            </a:r>
+            <a:br>
+              <a:rPr lang="fr-FR" dirty="0"/>
+            </a:br>
+            <a:r>
+              <a:rPr lang="fr-FR" dirty="0"/>
+              <a:t>	</a:t>
+            </a:r>
+            <a:r>
+              <a:rPr lang="fr-FR" sz="3600" i="1" dirty="0"/>
+              <a:t>  1. Les cookies </a:t>
+            </a:r>
+          </a:p>
+        </p:txBody>
+      </p:sp>
+      <p:sp>
+        <p:nvSpPr>
+          <p:cNvPr id="5" name="ZoneTexte 4">
+            <a:extLst>
+              <a:ext uri="{FF2B5EF4-FFF2-40B4-BE49-F238E27FC236}">
+                <a16:creationId xmlns:a16="http://schemas.microsoft.com/office/drawing/2014/main" id="{ABC507A4-5782-8551-CCC2-B957C6BF7E2B}"/>
+              </a:ext>
+            </a:extLst>
+          </p:cNvPr>
+          <p:cNvSpPr txBox="1"/>
+          <p:nvPr/>
+        </p:nvSpPr>
+        <p:spPr>
+          <a:xfrm>
+            <a:off x="843782" y="1906930"/>
+            <a:ext cx="10855354" cy="5078313"/>
+          </a:xfrm>
+          <a:prstGeom prst="rect">
+            <a:avLst/>
+          </a:prstGeom>
+          <a:noFill/>
+        </p:spPr>
+        <p:txBody>
+          <a:bodyPr wrap="square" rtlCol="0">
+            <a:spAutoFit/>
+          </a:bodyPr>
+          <a:lstStyle/>
+          <a:p>
+            <a:r>
+              <a:rPr lang="fr-FR" b="0" dirty="0">
+                <a:effectLst/>
+              </a:rPr>
+              <a:t>Voici les paramètres que vous pouvez appliquer sur les cookies pour les sécuriser :</a:t>
+            </a:r>
+          </a:p>
+          <a:p>
+            <a:endParaRPr lang="fr-FR" b="0" dirty="0">
+              <a:effectLst/>
+            </a:endParaRPr>
+          </a:p>
+          <a:p>
+            <a:pPr marL="285750" indent="-285750">
+              <a:buFont typeface="Arial" panose="020B0604020202020204" pitchFamily="34" charset="0"/>
+              <a:buChar char="•"/>
+            </a:pPr>
+            <a:r>
+              <a:rPr lang="fr-FR" b="1" dirty="0">
+                <a:effectLst/>
+              </a:rPr>
+              <a:t>Path</a:t>
+            </a:r>
+            <a:r>
+              <a:rPr lang="fr-FR" b="0" dirty="0">
+                <a:effectLst/>
+              </a:rPr>
+              <a:t> - Permet de préciser sur quel répertoire (dossier) est disponible le cookie</a:t>
+            </a:r>
+          </a:p>
+          <a:p>
+            <a:endParaRPr lang="fr-FR" b="0" dirty="0">
+              <a:effectLst/>
+            </a:endParaRPr>
+          </a:p>
+          <a:p>
+            <a:pPr marL="285750" indent="-285750">
+              <a:buFont typeface="Arial" panose="020B0604020202020204" pitchFamily="34" charset="0"/>
+              <a:buChar char="•"/>
+            </a:pPr>
+            <a:r>
+              <a:rPr lang="fr-FR" b="1" dirty="0"/>
+              <a:t>D</a:t>
+            </a:r>
+            <a:r>
+              <a:rPr lang="fr-FR" b="1" dirty="0">
+                <a:effectLst/>
+              </a:rPr>
+              <a:t>omain</a:t>
+            </a:r>
+            <a:r>
+              <a:rPr lang="fr-FR" b="0" dirty="0">
+                <a:effectLst/>
+              </a:rPr>
+              <a:t> - Permet de préciser sur quel nom de domaine est disponible le cookie</a:t>
+            </a:r>
+          </a:p>
+          <a:p>
+            <a:pPr marL="285750" indent="-285750">
+              <a:buFont typeface="Arial" panose="020B0604020202020204" pitchFamily="34" charset="0"/>
+              <a:buChar char="•"/>
+            </a:pPr>
+            <a:endParaRPr lang="fr-FR" b="0" dirty="0">
+              <a:effectLst/>
+            </a:endParaRPr>
+          </a:p>
+          <a:p>
+            <a:pPr marL="285750" indent="-285750">
+              <a:buFont typeface="Arial" panose="020B0604020202020204" pitchFamily="34" charset="0"/>
+              <a:buChar char="•"/>
+            </a:pPr>
+            <a:r>
+              <a:rPr lang="fr-FR" b="1" dirty="0"/>
+              <a:t>E</a:t>
+            </a:r>
+            <a:r>
+              <a:rPr lang="fr-FR" b="1" dirty="0">
+                <a:effectLst/>
+              </a:rPr>
+              <a:t>xpires</a:t>
+            </a:r>
+            <a:r>
+              <a:rPr lang="fr-FR" b="0" dirty="0">
+                <a:effectLst/>
+              </a:rPr>
+              <a:t> - Permet de donner une date </a:t>
+            </a:r>
+            <a:r>
+              <a:rPr lang="fr-FR" b="1" dirty="0">
+                <a:effectLst/>
+              </a:rPr>
+              <a:t>UTC</a:t>
+            </a:r>
+            <a:r>
+              <a:rPr lang="fr-FR" b="0" dirty="0">
+                <a:effectLst/>
+              </a:rPr>
+              <a:t> jusqu'à laquelle le cookie est disponible, après cette date, il expirera ( se base sur l’horloge du client, ce qui peut entrainer des problèmes ) </a:t>
+            </a:r>
+          </a:p>
+          <a:p>
+            <a:pPr marL="285750" indent="-285750">
+              <a:buFont typeface="Arial" panose="020B0604020202020204" pitchFamily="34" charset="0"/>
+              <a:buChar char="•"/>
+            </a:pPr>
+            <a:endParaRPr lang="fr-FR" b="0" dirty="0">
+              <a:effectLst/>
+            </a:endParaRPr>
+          </a:p>
+          <a:p>
+            <a:pPr marL="285750" indent="-285750">
+              <a:buFont typeface="Arial" panose="020B0604020202020204" pitchFamily="34" charset="0"/>
+              <a:buChar char="•"/>
+            </a:pPr>
+            <a:r>
+              <a:rPr lang="fr-FR" b="1" dirty="0"/>
+              <a:t>M</a:t>
+            </a:r>
+            <a:r>
+              <a:rPr lang="fr-FR" b="1" dirty="0">
+                <a:effectLst/>
+              </a:rPr>
+              <a:t>ax-</a:t>
+            </a:r>
+            <a:r>
+              <a:rPr lang="fr-FR" b="1" dirty="0" err="1">
+                <a:effectLst/>
+              </a:rPr>
+              <a:t>age</a:t>
+            </a:r>
+            <a:r>
+              <a:rPr lang="fr-FR" b="0" dirty="0">
+                <a:effectLst/>
+              </a:rPr>
+              <a:t> - Se substitue à </a:t>
+            </a:r>
+            <a:r>
+              <a:rPr lang="fr-FR" b="0" i="1" dirty="0">
+                <a:effectLst/>
+              </a:rPr>
+              <a:t>expires</a:t>
+            </a:r>
+            <a:r>
+              <a:rPr lang="fr-FR" b="0" dirty="0">
+                <a:effectLst/>
+              </a:rPr>
+              <a:t>, permet de donner une durée en </a:t>
+            </a:r>
+            <a:r>
+              <a:rPr lang="fr-FR" b="1" dirty="0">
+                <a:effectLst/>
+              </a:rPr>
+              <a:t>secondes</a:t>
+            </a:r>
+            <a:r>
+              <a:rPr lang="fr-FR" b="0" dirty="0">
+                <a:effectLst/>
+              </a:rPr>
+              <a:t> jusqu'à laquelle le cookie est disponible. Après cette date, il expirera ( basé sur le temps écoulé depuis la création du cookie)</a:t>
+            </a:r>
+          </a:p>
+          <a:p>
+            <a:pPr marL="285750" indent="-285750">
+              <a:buFont typeface="Arial" panose="020B0604020202020204" pitchFamily="34" charset="0"/>
+              <a:buChar char="•"/>
+            </a:pPr>
+            <a:endParaRPr lang="fr-FR" b="0" dirty="0">
+              <a:effectLst/>
+            </a:endParaRPr>
+          </a:p>
+          <a:p>
+            <a:pPr marL="285750" indent="-285750">
+              <a:buFont typeface="Arial" panose="020B0604020202020204" pitchFamily="34" charset="0"/>
+              <a:buChar char="•"/>
+            </a:pPr>
+            <a:r>
+              <a:rPr lang="fr-FR" b="1" dirty="0"/>
+              <a:t>S</a:t>
+            </a:r>
+            <a:r>
+              <a:rPr lang="fr-FR" b="1" dirty="0">
+                <a:effectLst/>
+              </a:rPr>
+              <a:t>ecure</a:t>
+            </a:r>
+            <a:r>
+              <a:rPr lang="fr-FR" b="0" dirty="0">
+                <a:effectLst/>
+              </a:rPr>
+              <a:t> - Permet de n'autoriser l'utilisation du cookie que sur les sites sécurisés (https)</a:t>
+            </a:r>
+          </a:p>
+          <a:p>
+            <a:pPr marL="285750" indent="-285750">
+              <a:buFont typeface="Arial" panose="020B0604020202020204" pitchFamily="34" charset="0"/>
+              <a:buChar char="•"/>
+            </a:pPr>
+            <a:endParaRPr lang="fr-FR" dirty="0"/>
+          </a:p>
+          <a:p>
+            <a:pPr marL="285750" indent="-285750">
+              <a:buFont typeface="Arial" panose="020B0604020202020204" pitchFamily="34" charset="0"/>
+              <a:buChar char="•"/>
+            </a:pPr>
+            <a:r>
+              <a:rPr lang="fr-FR" b="0" dirty="0">
+                <a:solidFill>
+                  <a:srgbClr val="FF0000"/>
+                </a:solidFill>
+                <a:effectLst/>
+              </a:rPr>
+              <a:t> ! Uniquement coté serveur </a:t>
+            </a:r>
+            <a:r>
+              <a:rPr lang="fr-FR" b="0" dirty="0">
+                <a:effectLst/>
+                <a:sym typeface="Wingdings" panose="05000000000000000000" pitchFamily="2" charset="2"/>
+              </a:rPr>
+              <a:t> </a:t>
+            </a:r>
+            <a:r>
+              <a:rPr lang="fr-FR" b="1" dirty="0" err="1">
+                <a:effectLst/>
+                <a:sym typeface="Wingdings" panose="05000000000000000000" pitchFamily="2" charset="2"/>
+              </a:rPr>
+              <a:t>HttpOnly</a:t>
+            </a:r>
+            <a:r>
+              <a:rPr lang="fr-FR" b="0" dirty="0">
+                <a:effectLst/>
+                <a:sym typeface="Wingdings" panose="05000000000000000000" pitchFamily="2" charset="2"/>
+              </a:rPr>
+              <a:t> restreint l’accès au cookie de sorte qu’il ne soit pas accessible via JavaScript coté client  protection contre les attaques XSS</a:t>
+            </a:r>
+            <a:endParaRPr lang="fr-FR" b="0" dirty="0">
+              <a:effectLst/>
+            </a:endParaRPr>
+          </a:p>
+          <a:p>
+            <a:br>
+              <a:rPr lang="fr-FR" b="0" dirty="0">
+                <a:effectLst/>
+              </a:rPr>
+            </a:br>
+            <a:endParaRPr lang="fr-FR" dirty="0"/>
+          </a:p>
+        </p:txBody>
+      </p:sp>
+    </p:spTree>
+    <p:extLst>
+      <p:ext uri="{BB962C8B-B14F-4D97-AF65-F5344CB8AC3E}">
+        <p14:creationId xmlns:p14="http://schemas.microsoft.com/office/powerpoint/2010/main" val="1443711041"/>
+      </p:ext>
+    </p:extLst>
+  </p:cSld>
+  <p:clrMapOvr>
+    <a:masterClrMapping/>
+  </p:clrMapOvr>
+</p:sld>
+</file>
+
+<file path=ppt/slides/slide117.xml><?xml version="1.0" encoding="utf-8"?>
+<p:sld xmlns:a="http://schemas.openxmlformats.org/drawingml/2006/main" xmlns:r="http://schemas.openxmlformats.org/officeDocument/2006/relationships" xmlns:p="http://schemas.openxmlformats.org/presentationml/2006/main">
+  <p:cSld>
+    <p:spTree>
+      <p:nvGrpSpPr>
+        <p:cNvPr id="1" name=""/>
+        <p:cNvGrpSpPr/>
+        <p:nvPr/>
+      </p:nvGrpSpPr>
+      <p:grpSpPr>
+        <a:xfrm>
+          <a:off x="0" y="0"/>
+          <a:ext cx="0" cy="0"/>
+          <a:chOff x="0" y="0"/>
+          <a:chExt cx="0" cy="0"/>
+        </a:xfrm>
+      </p:grpSpPr>
+      <p:sp>
+        <p:nvSpPr>
+          <p:cNvPr id="3" name="Titre 1">
+            <a:extLst>
+              <a:ext uri="{FF2B5EF4-FFF2-40B4-BE49-F238E27FC236}">
+                <a16:creationId xmlns:a16="http://schemas.microsoft.com/office/drawing/2014/main" id="{E7373E66-041F-37D5-0ADF-25BA87ABC979}"/>
+              </a:ext>
+            </a:extLst>
+          </p:cNvPr>
+          <p:cNvSpPr>
+            <a:spLocks noGrp="1"/>
+          </p:cNvSpPr>
+          <p:nvPr>
+            <p:ph type="title"/>
+          </p:nvPr>
+        </p:nvSpPr>
+        <p:spPr>
+          <a:xfrm>
+            <a:off x="1097279" y="286603"/>
+            <a:ext cx="11167425" cy="1450757"/>
+          </a:xfrm>
+        </p:spPr>
+        <p:txBody>
+          <a:bodyPr>
+            <a:normAutofit/>
+          </a:bodyPr>
+          <a:lstStyle/>
+          <a:p>
+            <a:r>
+              <a:rPr lang="fr-FR" dirty="0"/>
+              <a:t>XII- Stocker des données  </a:t>
+            </a:r>
+            <a:br>
+              <a:rPr lang="fr-FR" dirty="0"/>
+            </a:br>
+            <a:r>
+              <a:rPr lang="fr-FR" dirty="0"/>
+              <a:t>	</a:t>
+            </a:r>
+            <a:r>
+              <a:rPr lang="fr-FR" sz="3600" i="1" dirty="0"/>
+              <a:t>  2. </a:t>
+            </a:r>
+            <a:r>
+              <a:rPr lang="fr-FR" sz="3600" i="1" dirty="0" err="1"/>
+              <a:t>LocalStorage</a:t>
+            </a:r>
+            <a:r>
+              <a:rPr lang="fr-FR" sz="3600" i="1" dirty="0"/>
+              <a:t> &amp; </a:t>
+            </a:r>
+            <a:r>
+              <a:rPr lang="fr-FR" sz="3600" i="1" dirty="0" err="1"/>
+              <a:t>SessionStorage</a:t>
+            </a:r>
+            <a:r>
+              <a:rPr lang="fr-FR" sz="3600" i="1" dirty="0"/>
+              <a:t> </a:t>
+            </a:r>
+          </a:p>
+        </p:txBody>
+      </p:sp>
+      <p:sp>
+        <p:nvSpPr>
+          <p:cNvPr id="5" name="ZoneTexte 4">
+            <a:extLst>
+              <a:ext uri="{FF2B5EF4-FFF2-40B4-BE49-F238E27FC236}">
+                <a16:creationId xmlns:a16="http://schemas.microsoft.com/office/drawing/2014/main" id="{ABC507A4-5782-8551-CCC2-B957C6BF7E2B}"/>
+              </a:ext>
+            </a:extLst>
+          </p:cNvPr>
+          <p:cNvSpPr txBox="1"/>
+          <p:nvPr/>
+        </p:nvSpPr>
+        <p:spPr>
+          <a:xfrm>
+            <a:off x="1097279" y="2232855"/>
+            <a:ext cx="10855354" cy="646331"/>
+          </a:xfrm>
+          <a:prstGeom prst="rect">
+            <a:avLst/>
+          </a:prstGeom>
+          <a:noFill/>
+        </p:spPr>
+        <p:txBody>
+          <a:bodyPr wrap="square" rtlCol="0">
+            <a:spAutoFit/>
+          </a:bodyPr>
+          <a:lstStyle/>
+          <a:p>
+            <a:br>
+              <a:rPr lang="fr-FR" b="0" dirty="0">
+                <a:effectLst/>
+              </a:rPr>
+            </a:br>
+            <a:endParaRPr lang="fr-FR" dirty="0"/>
+          </a:p>
+        </p:txBody>
+      </p:sp>
+      <p:sp>
+        <p:nvSpPr>
+          <p:cNvPr id="2" name="ZoneTexte 1">
+            <a:extLst>
+              <a:ext uri="{FF2B5EF4-FFF2-40B4-BE49-F238E27FC236}">
+                <a16:creationId xmlns:a16="http://schemas.microsoft.com/office/drawing/2014/main" id="{E5C88D58-4711-A120-876A-E55C385CB91A}"/>
+              </a:ext>
+            </a:extLst>
+          </p:cNvPr>
+          <p:cNvSpPr txBox="1"/>
+          <p:nvPr/>
+        </p:nvSpPr>
+        <p:spPr>
+          <a:xfrm>
+            <a:off x="1359017" y="2114026"/>
+            <a:ext cx="9735704" cy="4524315"/>
+          </a:xfrm>
+          <a:prstGeom prst="rect">
+            <a:avLst/>
+          </a:prstGeom>
+          <a:noFill/>
+        </p:spPr>
+        <p:txBody>
+          <a:bodyPr wrap="square" rtlCol="0">
+            <a:spAutoFit/>
+          </a:bodyPr>
+          <a:lstStyle/>
+          <a:p>
+            <a:r>
+              <a:rPr lang="fr-FR" b="1" dirty="0" err="1"/>
+              <a:t>LocalStorage</a:t>
+            </a:r>
+            <a:r>
+              <a:rPr lang="fr-FR" dirty="0"/>
+              <a:t> : Stocké dans le navigateur même après sa fermeture.</a:t>
+            </a:r>
+          </a:p>
+          <a:p>
+            <a:r>
+              <a:rPr lang="fr-FR" b="1" dirty="0" err="1"/>
+              <a:t>SessionStorage</a:t>
+            </a:r>
+            <a:r>
+              <a:rPr lang="fr-FR" dirty="0"/>
+              <a:t> : Stocké dans le navigateur uniquement pendant la session.</a:t>
+            </a:r>
+          </a:p>
+          <a:p>
+            <a:endParaRPr lang="fr-FR" dirty="0"/>
+          </a:p>
+          <a:p>
+            <a:r>
+              <a:rPr lang="fr-FR" dirty="0"/>
+              <a:t>Quelle différence avec les cookies ? </a:t>
+            </a:r>
+          </a:p>
+          <a:p>
+            <a:endParaRPr lang="fr-FR" dirty="0"/>
+          </a:p>
+          <a:p>
+            <a:r>
+              <a:rPr lang="fr-FR" dirty="0"/>
+              <a:t>Les cookies sont utilisés pour stocker de petits nombres de données importantes, qui doivent être </a:t>
+            </a:r>
+            <a:r>
+              <a:rPr lang="fr-FR" b="1" dirty="0"/>
+              <a:t>envoyé au serveur </a:t>
+            </a:r>
+            <a:r>
+              <a:rPr lang="fr-FR" dirty="0"/>
+              <a:t>comme les identifiants de connexion</a:t>
+            </a:r>
+          </a:p>
+          <a:p>
+            <a:r>
+              <a:rPr lang="fr-FR" dirty="0"/>
+              <a:t>A l’inverse </a:t>
+            </a:r>
+            <a:r>
+              <a:rPr lang="fr-FR" dirty="0" err="1"/>
+              <a:t>LocalStorage</a:t>
+            </a:r>
+            <a:r>
+              <a:rPr lang="fr-FR" dirty="0"/>
+              <a:t> et </a:t>
+            </a:r>
+            <a:r>
+              <a:rPr lang="fr-FR" dirty="0" err="1"/>
+              <a:t>SessionStorage</a:t>
+            </a:r>
+            <a:r>
+              <a:rPr lang="fr-FR" dirty="0"/>
+              <a:t> ne sont </a:t>
+            </a:r>
+            <a:r>
+              <a:rPr lang="fr-FR" b="1" dirty="0"/>
+              <a:t>jamais envoyés au serveur</a:t>
+            </a:r>
+            <a:r>
+              <a:rPr lang="fr-FR" dirty="0"/>
+              <a:t>. </a:t>
+            </a:r>
+          </a:p>
+          <a:p>
+            <a:endParaRPr lang="fr-FR" dirty="0"/>
+          </a:p>
+          <a:p>
+            <a:r>
+              <a:rPr lang="fr-FR" dirty="0"/>
+              <a:t>De plus les informations stockées avec ces méthodes sont accessibles uniquement sur la même origine, si les données sont créées sur monSite.com, ces données ne seront accessibles que sur cette origine, ce qui le rend plus sécure que les cookies. </a:t>
+            </a:r>
+          </a:p>
+          <a:p>
+            <a:endParaRPr lang="fr-FR" dirty="0"/>
+          </a:p>
+          <a:p>
+            <a:r>
+              <a:rPr lang="fr-FR" dirty="0"/>
+              <a:t>NB: </a:t>
+            </a:r>
+            <a:r>
+              <a:rPr lang="fr-FR" dirty="0" err="1"/>
+              <a:t>LocalStorage</a:t>
+            </a:r>
+            <a:r>
+              <a:rPr lang="fr-FR" dirty="0"/>
+              <a:t> &amp; </a:t>
+            </a:r>
+            <a:r>
+              <a:rPr lang="fr-FR" dirty="0" err="1"/>
+              <a:t>SessionStorage</a:t>
+            </a:r>
+            <a:r>
+              <a:rPr lang="fr-FR" dirty="0"/>
+              <a:t> utilisent les mêmes méthodes.	</a:t>
+            </a:r>
+          </a:p>
+          <a:p>
+            <a:r>
+              <a:rPr lang="fr-FR" dirty="0"/>
+              <a:t>       </a:t>
+            </a:r>
+            <a:r>
+              <a:rPr lang="fr-FR" dirty="0" err="1"/>
+              <a:t>LocalStorage</a:t>
+            </a:r>
+            <a:r>
+              <a:rPr lang="fr-FR" dirty="0"/>
+              <a:t> ne peut stocker que des données sous forme de chaînes de caractères.</a:t>
+            </a:r>
+          </a:p>
+          <a:p>
+            <a:r>
+              <a:rPr lang="fr-FR" dirty="0"/>
+              <a:t> </a:t>
+            </a:r>
+          </a:p>
+        </p:txBody>
+      </p:sp>
+    </p:spTree>
+    <p:extLst>
+      <p:ext uri="{BB962C8B-B14F-4D97-AF65-F5344CB8AC3E}">
+        <p14:creationId xmlns:p14="http://schemas.microsoft.com/office/powerpoint/2010/main" val="3126748334"/>
+      </p:ext>
+    </p:extLst>
+  </p:cSld>
+  <p:clrMapOvr>
+    <a:masterClrMapping/>
+  </p:clrMapOvr>
+</p:sld>
+</file>
+
+<file path=ppt/slides/slide118.xml><?xml version="1.0" encoding="utf-8"?>
+<p:sld xmlns:a="http://schemas.openxmlformats.org/drawingml/2006/main" xmlns:r="http://schemas.openxmlformats.org/officeDocument/2006/relationships" xmlns:p="http://schemas.openxmlformats.org/presentationml/2006/main">
+  <p:cSld>
+    <p:spTree>
+      <p:nvGrpSpPr>
+        <p:cNvPr id="1" name=""/>
+        <p:cNvGrpSpPr/>
+        <p:nvPr/>
+      </p:nvGrpSpPr>
+      <p:grpSpPr>
+        <a:xfrm>
+          <a:off x="0" y="0"/>
+          <a:ext cx="0" cy="0"/>
+          <a:chOff x="0" y="0"/>
+          <a:chExt cx="0" cy="0"/>
+        </a:xfrm>
+      </p:grpSpPr>
+      <p:sp>
+        <p:nvSpPr>
+          <p:cNvPr id="3" name="Titre 1">
+            <a:extLst>
+              <a:ext uri="{FF2B5EF4-FFF2-40B4-BE49-F238E27FC236}">
+                <a16:creationId xmlns:a16="http://schemas.microsoft.com/office/drawing/2014/main" id="{E7373E66-041F-37D5-0ADF-25BA87ABC979}"/>
+              </a:ext>
+            </a:extLst>
+          </p:cNvPr>
+          <p:cNvSpPr>
+            <a:spLocks noGrp="1"/>
+          </p:cNvSpPr>
+          <p:nvPr>
+            <p:ph type="title"/>
+          </p:nvPr>
+        </p:nvSpPr>
+        <p:spPr>
+          <a:xfrm>
+            <a:off x="1097279" y="286603"/>
+            <a:ext cx="11167425" cy="1450757"/>
+          </a:xfrm>
+        </p:spPr>
+        <p:txBody>
+          <a:bodyPr>
+            <a:normAutofit/>
+          </a:bodyPr>
+          <a:lstStyle/>
+          <a:p>
+            <a:r>
+              <a:rPr lang="fr-FR" dirty="0"/>
+              <a:t>XII- Stocker des données  </a:t>
+            </a:r>
+            <a:br>
+              <a:rPr lang="fr-FR" dirty="0"/>
+            </a:br>
+            <a:r>
+              <a:rPr lang="fr-FR" dirty="0"/>
+              <a:t>	</a:t>
+            </a:r>
+            <a:r>
+              <a:rPr lang="fr-FR" sz="3600" i="1" dirty="0"/>
+              <a:t>  2. </a:t>
+            </a:r>
+            <a:r>
+              <a:rPr lang="fr-FR" sz="3600" i="1" dirty="0" err="1"/>
+              <a:t>LocalStorage</a:t>
+            </a:r>
+            <a:r>
+              <a:rPr lang="fr-FR" sz="3600" i="1" dirty="0"/>
+              <a:t> &amp; </a:t>
+            </a:r>
+            <a:r>
+              <a:rPr lang="fr-FR" sz="3600" i="1" dirty="0" err="1"/>
+              <a:t>SessionStorage</a:t>
+            </a:r>
+            <a:r>
+              <a:rPr lang="fr-FR" sz="3600" i="1" dirty="0"/>
+              <a:t> </a:t>
+            </a:r>
+          </a:p>
+        </p:txBody>
+      </p:sp>
+      <p:sp>
+        <p:nvSpPr>
+          <p:cNvPr id="5" name="ZoneTexte 4">
+            <a:extLst>
+              <a:ext uri="{FF2B5EF4-FFF2-40B4-BE49-F238E27FC236}">
+                <a16:creationId xmlns:a16="http://schemas.microsoft.com/office/drawing/2014/main" id="{ABC507A4-5782-8551-CCC2-B957C6BF7E2B}"/>
+              </a:ext>
+            </a:extLst>
+          </p:cNvPr>
+          <p:cNvSpPr txBox="1"/>
+          <p:nvPr/>
+        </p:nvSpPr>
+        <p:spPr>
+          <a:xfrm>
+            <a:off x="239367" y="3861024"/>
+            <a:ext cx="10855354" cy="646331"/>
+          </a:xfrm>
+          <a:prstGeom prst="rect">
+            <a:avLst/>
+          </a:prstGeom>
+          <a:noFill/>
+        </p:spPr>
+        <p:txBody>
+          <a:bodyPr wrap="square" rtlCol="0">
+            <a:spAutoFit/>
+          </a:bodyPr>
+          <a:lstStyle/>
+          <a:p>
+            <a:br>
+              <a:rPr lang="fr-FR" b="0" dirty="0">
+                <a:effectLst/>
+              </a:rPr>
+            </a:br>
+            <a:endParaRPr lang="fr-FR" dirty="0"/>
+          </a:p>
+        </p:txBody>
+      </p:sp>
+      <p:pic>
+        <p:nvPicPr>
+          <p:cNvPr id="6" name="Image 5">
+            <a:extLst>
+              <a:ext uri="{FF2B5EF4-FFF2-40B4-BE49-F238E27FC236}">
+                <a16:creationId xmlns:a16="http://schemas.microsoft.com/office/drawing/2014/main" id="{5FCDE9DB-6D12-EEC5-A9A8-78AC63A9A647}"/>
+              </a:ext>
+            </a:extLst>
+          </p:cNvPr>
+          <p:cNvPicPr>
+            <a:picLocks noChangeAspect="1"/>
+          </p:cNvPicPr>
+          <p:nvPr/>
+        </p:nvPicPr>
+        <p:blipFill>
+          <a:blip r:embed="rId2"/>
+          <a:stretch>
+            <a:fillRect/>
+          </a:stretch>
+        </p:blipFill>
+        <p:spPr>
+          <a:xfrm>
+            <a:off x="1287991" y="2133595"/>
+            <a:ext cx="4324954" cy="543001"/>
+          </a:xfrm>
+          <a:prstGeom prst="rect">
+            <a:avLst/>
+          </a:prstGeom>
+        </p:spPr>
+      </p:pic>
+      <p:pic>
+        <p:nvPicPr>
+          <p:cNvPr id="8" name="Image 7">
+            <a:extLst>
+              <a:ext uri="{FF2B5EF4-FFF2-40B4-BE49-F238E27FC236}">
+                <a16:creationId xmlns:a16="http://schemas.microsoft.com/office/drawing/2014/main" id="{4CEE66F6-0DC3-BF24-8CF4-39398DF59549}"/>
+              </a:ext>
+            </a:extLst>
+          </p:cNvPr>
+          <p:cNvPicPr>
+            <a:picLocks noChangeAspect="1"/>
+          </p:cNvPicPr>
+          <p:nvPr/>
+        </p:nvPicPr>
+        <p:blipFill>
+          <a:blip r:embed="rId3"/>
+          <a:stretch>
+            <a:fillRect/>
+          </a:stretch>
+        </p:blipFill>
+        <p:spPr>
+          <a:xfrm>
+            <a:off x="2526414" y="2834800"/>
+            <a:ext cx="3086531" cy="457264"/>
+          </a:xfrm>
+          <a:prstGeom prst="rect">
+            <a:avLst/>
+          </a:prstGeom>
+        </p:spPr>
+      </p:pic>
+      <p:pic>
+        <p:nvPicPr>
+          <p:cNvPr id="10" name="Image 9">
+            <a:extLst>
+              <a:ext uri="{FF2B5EF4-FFF2-40B4-BE49-F238E27FC236}">
+                <a16:creationId xmlns:a16="http://schemas.microsoft.com/office/drawing/2014/main" id="{0939E290-9210-9779-A68E-730F635AD689}"/>
+              </a:ext>
+            </a:extLst>
+          </p:cNvPr>
+          <p:cNvPicPr>
+            <a:picLocks noChangeAspect="1"/>
+          </p:cNvPicPr>
+          <p:nvPr/>
+        </p:nvPicPr>
+        <p:blipFill>
+          <a:blip r:embed="rId4"/>
+          <a:stretch>
+            <a:fillRect/>
+          </a:stretch>
+        </p:blipFill>
+        <p:spPr>
+          <a:xfrm>
+            <a:off x="1878624" y="3450269"/>
+            <a:ext cx="3734321" cy="514422"/>
+          </a:xfrm>
+          <a:prstGeom prst="rect">
+            <a:avLst/>
+          </a:prstGeom>
+        </p:spPr>
+      </p:pic>
+      <p:pic>
+        <p:nvPicPr>
+          <p:cNvPr id="12" name="Image 11">
+            <a:extLst>
+              <a:ext uri="{FF2B5EF4-FFF2-40B4-BE49-F238E27FC236}">
+                <a16:creationId xmlns:a16="http://schemas.microsoft.com/office/drawing/2014/main" id="{74734E7E-6DA5-23B0-B205-6B34436A2E70}"/>
+              </a:ext>
+            </a:extLst>
+          </p:cNvPr>
+          <p:cNvPicPr>
+            <a:picLocks noChangeAspect="1"/>
+          </p:cNvPicPr>
+          <p:nvPr/>
+        </p:nvPicPr>
+        <p:blipFill>
+          <a:blip r:embed="rId5"/>
+          <a:stretch>
+            <a:fillRect/>
+          </a:stretch>
+        </p:blipFill>
+        <p:spPr>
+          <a:xfrm>
+            <a:off x="2774099" y="4236543"/>
+            <a:ext cx="2838846" cy="523948"/>
+          </a:xfrm>
+          <a:prstGeom prst="rect">
+            <a:avLst/>
+          </a:prstGeom>
+        </p:spPr>
+      </p:pic>
+      <p:pic>
+        <p:nvPicPr>
+          <p:cNvPr id="14" name="Image 13">
+            <a:extLst>
+              <a:ext uri="{FF2B5EF4-FFF2-40B4-BE49-F238E27FC236}">
+                <a16:creationId xmlns:a16="http://schemas.microsoft.com/office/drawing/2014/main" id="{03A6E402-A2C2-4955-D336-8D7E39589F9A}"/>
+              </a:ext>
+            </a:extLst>
+          </p:cNvPr>
+          <p:cNvPicPr>
+            <a:picLocks noChangeAspect="1"/>
+          </p:cNvPicPr>
+          <p:nvPr/>
+        </p:nvPicPr>
+        <p:blipFill>
+          <a:blip r:embed="rId6"/>
+          <a:stretch>
+            <a:fillRect/>
+          </a:stretch>
+        </p:blipFill>
+        <p:spPr>
+          <a:xfrm>
+            <a:off x="2755046" y="4925783"/>
+            <a:ext cx="2857899" cy="552527"/>
+          </a:xfrm>
+          <a:prstGeom prst="rect">
+            <a:avLst/>
+          </a:prstGeom>
+        </p:spPr>
+      </p:pic>
+      <p:pic>
+        <p:nvPicPr>
+          <p:cNvPr id="16" name="Image 15">
+            <a:extLst>
+              <a:ext uri="{FF2B5EF4-FFF2-40B4-BE49-F238E27FC236}">
+                <a16:creationId xmlns:a16="http://schemas.microsoft.com/office/drawing/2014/main" id="{1814FA3F-C470-02CC-502D-8974E75EE6B8}"/>
+              </a:ext>
+            </a:extLst>
+          </p:cNvPr>
+          <p:cNvPicPr>
+            <a:picLocks noChangeAspect="1"/>
+          </p:cNvPicPr>
+          <p:nvPr/>
+        </p:nvPicPr>
+        <p:blipFill>
+          <a:blip r:embed="rId7"/>
+          <a:stretch>
+            <a:fillRect/>
+          </a:stretch>
+        </p:blipFill>
+        <p:spPr>
+          <a:xfrm>
+            <a:off x="3259942" y="5643602"/>
+            <a:ext cx="2353003" cy="562053"/>
+          </a:xfrm>
+          <a:prstGeom prst="rect">
+            <a:avLst/>
+          </a:prstGeom>
+        </p:spPr>
+      </p:pic>
+      <p:sp>
+        <p:nvSpPr>
+          <p:cNvPr id="19" name="ZoneTexte 18">
+            <a:extLst>
+              <a:ext uri="{FF2B5EF4-FFF2-40B4-BE49-F238E27FC236}">
+                <a16:creationId xmlns:a16="http://schemas.microsoft.com/office/drawing/2014/main" id="{FC03B0FC-7449-9DC7-B0B0-07F41E61DB60}"/>
+              </a:ext>
+            </a:extLst>
+          </p:cNvPr>
+          <p:cNvSpPr txBox="1"/>
+          <p:nvPr/>
+        </p:nvSpPr>
+        <p:spPr>
+          <a:xfrm>
+            <a:off x="6405725" y="2200412"/>
+            <a:ext cx="2928014" cy="646331"/>
+          </a:xfrm>
+          <a:prstGeom prst="rect">
+            <a:avLst/>
+          </a:prstGeom>
+          <a:noFill/>
+        </p:spPr>
+        <p:txBody>
+          <a:bodyPr wrap="square" rtlCol="0">
+            <a:spAutoFit/>
+          </a:bodyPr>
+          <a:lstStyle/>
+          <a:p>
+            <a:r>
+              <a:rPr lang="fr-FR" dirty="0"/>
+              <a:t>Définir un nouvel élément </a:t>
+            </a:r>
+          </a:p>
+          <a:p>
+            <a:endParaRPr lang="fr-FR" dirty="0"/>
+          </a:p>
+        </p:txBody>
+      </p:sp>
+      <p:sp>
+        <p:nvSpPr>
+          <p:cNvPr id="20" name="ZoneTexte 19">
+            <a:extLst>
+              <a:ext uri="{FF2B5EF4-FFF2-40B4-BE49-F238E27FC236}">
+                <a16:creationId xmlns:a16="http://schemas.microsoft.com/office/drawing/2014/main" id="{92764046-22BF-D252-BCE8-D1EAC58492EB}"/>
+              </a:ext>
+            </a:extLst>
+          </p:cNvPr>
+          <p:cNvSpPr txBox="1"/>
+          <p:nvPr/>
+        </p:nvSpPr>
+        <p:spPr>
+          <a:xfrm>
+            <a:off x="6437429" y="2847253"/>
+            <a:ext cx="2928014" cy="646331"/>
+          </a:xfrm>
+          <a:prstGeom prst="rect">
+            <a:avLst/>
+          </a:prstGeom>
+          <a:noFill/>
+        </p:spPr>
+        <p:txBody>
+          <a:bodyPr wrap="square" rtlCol="0">
+            <a:spAutoFit/>
+          </a:bodyPr>
+          <a:lstStyle/>
+          <a:p>
+            <a:r>
+              <a:rPr lang="fr-FR" dirty="0"/>
+              <a:t>Récupéré un élément </a:t>
+            </a:r>
+          </a:p>
+          <a:p>
+            <a:endParaRPr lang="fr-FR" dirty="0"/>
+          </a:p>
+        </p:txBody>
+      </p:sp>
+      <p:sp>
+        <p:nvSpPr>
+          <p:cNvPr id="21" name="ZoneTexte 20">
+            <a:extLst>
+              <a:ext uri="{FF2B5EF4-FFF2-40B4-BE49-F238E27FC236}">
+                <a16:creationId xmlns:a16="http://schemas.microsoft.com/office/drawing/2014/main" id="{294424EA-7BBD-230B-4C7B-381BAAE3078E}"/>
+              </a:ext>
+            </a:extLst>
+          </p:cNvPr>
+          <p:cNvSpPr txBox="1"/>
+          <p:nvPr/>
+        </p:nvSpPr>
+        <p:spPr>
+          <a:xfrm>
+            <a:off x="6405725" y="3486730"/>
+            <a:ext cx="2928014" cy="646331"/>
+          </a:xfrm>
+          <a:prstGeom prst="rect">
+            <a:avLst/>
+          </a:prstGeom>
+          <a:noFill/>
+        </p:spPr>
+        <p:txBody>
+          <a:bodyPr wrap="square" rtlCol="0">
+            <a:spAutoFit/>
+          </a:bodyPr>
+          <a:lstStyle/>
+          <a:p>
+            <a:r>
+              <a:rPr lang="fr-FR" dirty="0"/>
+              <a:t>Supprimer un élément </a:t>
+            </a:r>
+          </a:p>
+          <a:p>
+            <a:endParaRPr lang="fr-FR" dirty="0"/>
+          </a:p>
+        </p:txBody>
+      </p:sp>
+      <p:sp>
+        <p:nvSpPr>
+          <p:cNvPr id="22" name="ZoneTexte 21">
+            <a:extLst>
+              <a:ext uri="{FF2B5EF4-FFF2-40B4-BE49-F238E27FC236}">
+                <a16:creationId xmlns:a16="http://schemas.microsoft.com/office/drawing/2014/main" id="{2232AB52-ACD2-3B78-5D83-12B6DBF9D35D}"/>
+              </a:ext>
+            </a:extLst>
+          </p:cNvPr>
+          <p:cNvSpPr txBox="1"/>
+          <p:nvPr/>
+        </p:nvSpPr>
+        <p:spPr>
+          <a:xfrm>
+            <a:off x="6405725" y="4279452"/>
+            <a:ext cx="2928014" cy="646331"/>
+          </a:xfrm>
+          <a:prstGeom prst="rect">
+            <a:avLst/>
+          </a:prstGeom>
+          <a:noFill/>
+        </p:spPr>
+        <p:txBody>
+          <a:bodyPr wrap="square" rtlCol="0">
+            <a:spAutoFit/>
+          </a:bodyPr>
+          <a:lstStyle/>
+          <a:p>
+            <a:r>
+              <a:rPr lang="fr-FR" dirty="0"/>
+              <a:t>Supprimer tout le </a:t>
+            </a:r>
+            <a:r>
+              <a:rPr lang="fr-FR" dirty="0" err="1"/>
+              <a:t>storage</a:t>
+            </a:r>
+            <a:r>
+              <a:rPr lang="fr-FR" dirty="0"/>
+              <a:t> </a:t>
+            </a:r>
+          </a:p>
+          <a:p>
+            <a:endParaRPr lang="fr-FR" dirty="0"/>
+          </a:p>
+        </p:txBody>
+      </p:sp>
+      <p:sp>
+        <p:nvSpPr>
+          <p:cNvPr id="23" name="ZoneTexte 22">
+            <a:extLst>
+              <a:ext uri="{FF2B5EF4-FFF2-40B4-BE49-F238E27FC236}">
+                <a16:creationId xmlns:a16="http://schemas.microsoft.com/office/drawing/2014/main" id="{398E6A3E-8B75-98D5-9AD4-6324E3232B42}"/>
+              </a:ext>
+            </a:extLst>
+          </p:cNvPr>
+          <p:cNvSpPr txBox="1"/>
+          <p:nvPr/>
+        </p:nvSpPr>
+        <p:spPr>
+          <a:xfrm>
+            <a:off x="6437429" y="4997271"/>
+            <a:ext cx="3469713" cy="646331"/>
+          </a:xfrm>
+          <a:prstGeom prst="rect">
+            <a:avLst/>
+          </a:prstGeom>
+          <a:noFill/>
+        </p:spPr>
+        <p:txBody>
+          <a:bodyPr wrap="square" rtlCol="0">
+            <a:spAutoFit/>
+          </a:bodyPr>
+          <a:lstStyle/>
+          <a:p>
+            <a:r>
+              <a:rPr lang="fr-FR" dirty="0"/>
+              <a:t>Récupérer la valeur d’une clé </a:t>
+            </a:r>
+          </a:p>
+          <a:p>
+            <a:endParaRPr lang="fr-FR" dirty="0"/>
+          </a:p>
+        </p:txBody>
+      </p:sp>
+      <p:sp>
+        <p:nvSpPr>
+          <p:cNvPr id="24" name="ZoneTexte 23">
+            <a:extLst>
+              <a:ext uri="{FF2B5EF4-FFF2-40B4-BE49-F238E27FC236}">
+                <a16:creationId xmlns:a16="http://schemas.microsoft.com/office/drawing/2014/main" id="{FBD221B5-AE0F-E057-6BDE-7874AB66C144}"/>
+              </a:ext>
+            </a:extLst>
+          </p:cNvPr>
+          <p:cNvSpPr txBox="1"/>
+          <p:nvPr/>
+        </p:nvSpPr>
+        <p:spPr>
+          <a:xfrm>
+            <a:off x="6405725" y="5745859"/>
+            <a:ext cx="4567549" cy="646331"/>
+          </a:xfrm>
+          <a:prstGeom prst="rect">
+            <a:avLst/>
+          </a:prstGeom>
+          <a:noFill/>
+        </p:spPr>
+        <p:txBody>
+          <a:bodyPr wrap="square" rtlCol="0">
+            <a:spAutoFit/>
+          </a:bodyPr>
+          <a:lstStyle/>
+          <a:p>
+            <a:r>
+              <a:rPr lang="fr-FR" dirty="0"/>
+              <a:t>Obtenir le nombre d’éléments stockés </a:t>
+            </a:r>
+          </a:p>
+          <a:p>
+            <a:endParaRPr lang="fr-FR" dirty="0"/>
+          </a:p>
+        </p:txBody>
+      </p:sp>
+    </p:spTree>
+    <p:extLst>
+      <p:ext uri="{BB962C8B-B14F-4D97-AF65-F5344CB8AC3E}">
+        <p14:creationId xmlns:p14="http://schemas.microsoft.com/office/powerpoint/2010/main" val="2728633259"/>
+      </p:ext>
+    </p:extLst>
+  </p:cSld>
+  <p:clrMapOvr>
+    <a:masterClrMapping/>
+  </p:clrMapOvr>
+</p:sld>
+</file>
+
+<file path=ppt/slides/slide119.xml><?xml version="1.0" encoding="utf-8"?>
+<p:sld xmlns:a="http://schemas.openxmlformats.org/drawingml/2006/main" xmlns:r="http://schemas.openxmlformats.org/officeDocument/2006/relationships" xmlns:p="http://schemas.openxmlformats.org/presentationml/2006/main">
+  <p:cSld>
+    <p:spTree>
+      <p:nvGrpSpPr>
+        <p:cNvPr id="1" name=""/>
+        <p:cNvGrpSpPr/>
+        <p:nvPr/>
+      </p:nvGrpSpPr>
+      <p:grpSpPr>
+        <a:xfrm>
+          <a:off x="0" y="0"/>
+          <a:ext cx="0" cy="0"/>
+          <a:chOff x="0" y="0"/>
+          <a:chExt cx="0" cy="0"/>
+        </a:xfrm>
+      </p:grpSpPr>
+      <p:sp>
+        <p:nvSpPr>
+          <p:cNvPr id="3" name="Titre 1">
+            <a:extLst>
+              <a:ext uri="{FF2B5EF4-FFF2-40B4-BE49-F238E27FC236}">
+                <a16:creationId xmlns:a16="http://schemas.microsoft.com/office/drawing/2014/main" id="{E7373E66-041F-37D5-0ADF-25BA87ABC979}"/>
+              </a:ext>
+            </a:extLst>
+          </p:cNvPr>
+          <p:cNvSpPr>
+            <a:spLocks noGrp="1"/>
+          </p:cNvSpPr>
+          <p:nvPr>
+            <p:ph type="title"/>
+          </p:nvPr>
+        </p:nvSpPr>
+        <p:spPr>
+          <a:xfrm>
+            <a:off x="1097279" y="286603"/>
+            <a:ext cx="11167425" cy="1450757"/>
+          </a:xfrm>
+        </p:spPr>
+        <p:txBody>
+          <a:bodyPr>
+            <a:normAutofit/>
+          </a:bodyPr>
+          <a:lstStyle/>
+          <a:p>
+            <a:r>
+              <a:rPr lang="fr-FR" dirty="0"/>
+              <a:t>XII- Stocker des données  </a:t>
+            </a:r>
+            <a:br>
+              <a:rPr lang="fr-FR" dirty="0"/>
+            </a:br>
+            <a:r>
+              <a:rPr lang="fr-FR" dirty="0"/>
+              <a:t>	</a:t>
+            </a:r>
+            <a:r>
+              <a:rPr lang="fr-FR" sz="3600" i="1" dirty="0"/>
+              <a:t>  3. En résumé</a:t>
+            </a:r>
+          </a:p>
+        </p:txBody>
+      </p:sp>
+      <p:cxnSp>
+        <p:nvCxnSpPr>
+          <p:cNvPr id="4" name="Connecteur droit 3">
+            <a:extLst>
+              <a:ext uri="{FF2B5EF4-FFF2-40B4-BE49-F238E27FC236}">
+                <a16:creationId xmlns:a16="http://schemas.microsoft.com/office/drawing/2014/main" id="{0F978538-C635-CB70-AC30-844A56484754}"/>
+              </a:ext>
+            </a:extLst>
+          </p:cNvPr>
+          <p:cNvCxnSpPr>
+            <a:cxnSpLocks/>
+          </p:cNvCxnSpPr>
+          <p:nvPr/>
+        </p:nvCxnSpPr>
+        <p:spPr>
+          <a:xfrm>
+            <a:off x="3874241" y="2127564"/>
+            <a:ext cx="0" cy="4164594"/>
+          </a:xfrm>
+          <a:prstGeom prst="line">
+            <a:avLst/>
+          </a:prstGeom>
+        </p:spPr>
+        <p:style>
+          <a:lnRef idx="2">
+            <a:schemeClr val="dk1"/>
+          </a:lnRef>
+          <a:fillRef idx="0">
+            <a:schemeClr val="dk1"/>
+          </a:fillRef>
+          <a:effectRef idx="1">
+            <a:schemeClr val="dk1"/>
+          </a:effectRef>
+          <a:fontRef idx="minor">
+            <a:schemeClr val="tx1"/>
+          </a:fontRef>
+        </p:style>
+      </p:cxnSp>
+      <p:cxnSp>
+        <p:nvCxnSpPr>
+          <p:cNvPr id="11" name="Connecteur droit 10">
+            <a:extLst>
+              <a:ext uri="{FF2B5EF4-FFF2-40B4-BE49-F238E27FC236}">
+                <a16:creationId xmlns:a16="http://schemas.microsoft.com/office/drawing/2014/main" id="{B77793B4-577D-E4B1-E32A-BC2460F878DE}"/>
+              </a:ext>
+            </a:extLst>
+          </p:cNvPr>
+          <p:cNvCxnSpPr>
+            <a:cxnSpLocks/>
+          </p:cNvCxnSpPr>
+          <p:nvPr/>
+        </p:nvCxnSpPr>
+        <p:spPr>
+          <a:xfrm>
+            <a:off x="8136915" y="2127564"/>
+            <a:ext cx="0" cy="4164594"/>
+          </a:xfrm>
+          <a:prstGeom prst="line">
+            <a:avLst/>
+          </a:prstGeom>
+        </p:spPr>
+        <p:style>
+          <a:lnRef idx="2">
+            <a:schemeClr val="dk1"/>
+          </a:lnRef>
+          <a:fillRef idx="0">
+            <a:schemeClr val="dk1"/>
+          </a:fillRef>
+          <a:effectRef idx="1">
+            <a:schemeClr val="dk1"/>
+          </a:effectRef>
+          <a:fontRef idx="minor">
+            <a:schemeClr val="tx1"/>
+          </a:fontRef>
+        </p:style>
+      </p:cxnSp>
+      <p:sp>
+        <p:nvSpPr>
+          <p:cNvPr id="13" name="ZoneTexte 12">
+            <a:extLst>
+              <a:ext uri="{FF2B5EF4-FFF2-40B4-BE49-F238E27FC236}">
+                <a16:creationId xmlns:a16="http://schemas.microsoft.com/office/drawing/2014/main" id="{C5794159-F218-B93F-C986-40C82EB19328}"/>
+              </a:ext>
+            </a:extLst>
+          </p:cNvPr>
+          <p:cNvSpPr txBox="1"/>
+          <p:nvPr/>
+        </p:nvSpPr>
+        <p:spPr>
+          <a:xfrm>
+            <a:off x="1564168" y="1861551"/>
+            <a:ext cx="954107" cy="369332"/>
+          </a:xfrm>
+          <a:prstGeom prst="rect">
+            <a:avLst/>
+          </a:prstGeom>
+          <a:noFill/>
+        </p:spPr>
+        <p:txBody>
+          <a:bodyPr wrap="none" rtlCol="0">
+            <a:spAutoFit/>
+          </a:bodyPr>
+          <a:lstStyle/>
+          <a:p>
+            <a:r>
+              <a:rPr lang="fr-FR" b="1" u="sng" dirty="0"/>
+              <a:t>Cookies</a:t>
+            </a:r>
+          </a:p>
+        </p:txBody>
+      </p:sp>
+      <p:sp>
+        <p:nvSpPr>
+          <p:cNvPr id="15" name="ZoneTexte 14">
+            <a:extLst>
+              <a:ext uri="{FF2B5EF4-FFF2-40B4-BE49-F238E27FC236}">
+                <a16:creationId xmlns:a16="http://schemas.microsoft.com/office/drawing/2014/main" id="{C548A19B-8A8D-4674-33DC-5CDD453D435C}"/>
+              </a:ext>
+            </a:extLst>
+          </p:cNvPr>
+          <p:cNvSpPr txBox="1"/>
+          <p:nvPr/>
+        </p:nvSpPr>
+        <p:spPr>
+          <a:xfrm>
+            <a:off x="5230208" y="1855171"/>
+            <a:ext cx="1450782" cy="369332"/>
+          </a:xfrm>
+          <a:prstGeom prst="rect">
+            <a:avLst/>
+          </a:prstGeom>
+          <a:noFill/>
+        </p:spPr>
+        <p:txBody>
+          <a:bodyPr wrap="none" rtlCol="0">
+            <a:spAutoFit/>
+          </a:bodyPr>
+          <a:lstStyle/>
+          <a:p>
+            <a:r>
+              <a:rPr lang="fr-FR" b="1" u="sng" dirty="0" err="1"/>
+              <a:t>LocalStorage</a:t>
+            </a:r>
+            <a:endParaRPr lang="fr-FR" b="1" u="sng" dirty="0"/>
+          </a:p>
+        </p:txBody>
+      </p:sp>
+      <p:sp>
+        <p:nvSpPr>
+          <p:cNvPr id="17" name="ZoneTexte 16">
+            <a:extLst>
+              <a:ext uri="{FF2B5EF4-FFF2-40B4-BE49-F238E27FC236}">
+                <a16:creationId xmlns:a16="http://schemas.microsoft.com/office/drawing/2014/main" id="{60A0C096-1C81-CFCA-6BE5-7C97EA2F9019}"/>
+              </a:ext>
+            </a:extLst>
+          </p:cNvPr>
+          <p:cNvSpPr txBox="1"/>
+          <p:nvPr/>
+        </p:nvSpPr>
+        <p:spPr>
+          <a:xfrm>
+            <a:off x="8980249" y="1861551"/>
+            <a:ext cx="1699248" cy="369332"/>
+          </a:xfrm>
+          <a:prstGeom prst="rect">
+            <a:avLst/>
+          </a:prstGeom>
+          <a:noFill/>
+        </p:spPr>
+        <p:txBody>
+          <a:bodyPr wrap="none" rtlCol="0">
+            <a:spAutoFit/>
+          </a:bodyPr>
+          <a:lstStyle/>
+          <a:p>
+            <a:r>
+              <a:rPr lang="fr-FR" b="1" u="sng" dirty="0" err="1"/>
+              <a:t>SessionStorage</a:t>
+            </a:r>
+            <a:endParaRPr lang="fr-FR" b="1" u="sng" dirty="0"/>
+          </a:p>
+        </p:txBody>
+      </p:sp>
+      <p:sp>
+        <p:nvSpPr>
+          <p:cNvPr id="18" name="ZoneTexte 17">
+            <a:extLst>
+              <a:ext uri="{FF2B5EF4-FFF2-40B4-BE49-F238E27FC236}">
+                <a16:creationId xmlns:a16="http://schemas.microsoft.com/office/drawing/2014/main" id="{FC6D1065-B061-01E6-3218-302195D8020A}"/>
+              </a:ext>
+            </a:extLst>
+          </p:cNvPr>
+          <p:cNvSpPr txBox="1"/>
+          <p:nvPr/>
+        </p:nvSpPr>
+        <p:spPr>
+          <a:xfrm>
+            <a:off x="696319" y="2249217"/>
+            <a:ext cx="3087499" cy="369332"/>
+          </a:xfrm>
+          <a:prstGeom prst="rect">
+            <a:avLst/>
+          </a:prstGeom>
+          <a:noFill/>
+        </p:spPr>
+        <p:txBody>
+          <a:bodyPr wrap="square" rtlCol="0">
+            <a:spAutoFit/>
+          </a:bodyPr>
+          <a:lstStyle/>
+          <a:p>
+            <a:r>
+              <a:rPr lang="fr-FR" dirty="0"/>
+              <a:t>Stockage limité environs 4Ko</a:t>
+            </a:r>
+          </a:p>
+        </p:txBody>
+      </p:sp>
+      <p:sp>
+        <p:nvSpPr>
+          <p:cNvPr id="25" name="ZoneTexte 24">
+            <a:extLst>
+              <a:ext uri="{FF2B5EF4-FFF2-40B4-BE49-F238E27FC236}">
+                <a16:creationId xmlns:a16="http://schemas.microsoft.com/office/drawing/2014/main" id="{372BE74A-4175-3594-5ED0-285435A60EFA}"/>
+              </a:ext>
+            </a:extLst>
+          </p:cNvPr>
+          <p:cNvSpPr txBox="1"/>
+          <p:nvPr/>
+        </p:nvSpPr>
+        <p:spPr>
+          <a:xfrm>
+            <a:off x="4055087" y="2249217"/>
+            <a:ext cx="4011552" cy="369332"/>
+          </a:xfrm>
+          <a:prstGeom prst="rect">
+            <a:avLst/>
+          </a:prstGeom>
+          <a:noFill/>
+        </p:spPr>
+        <p:txBody>
+          <a:bodyPr wrap="square" rtlCol="0">
+            <a:spAutoFit/>
+          </a:bodyPr>
+          <a:lstStyle/>
+          <a:p>
+            <a:r>
+              <a:rPr lang="fr-FR" dirty="0"/>
+              <a:t>Stockage jusqu’à plusieurs mégaoctets.</a:t>
+            </a:r>
+          </a:p>
+        </p:txBody>
+      </p:sp>
+      <p:sp>
+        <p:nvSpPr>
+          <p:cNvPr id="26" name="ZoneTexte 25">
+            <a:extLst>
+              <a:ext uri="{FF2B5EF4-FFF2-40B4-BE49-F238E27FC236}">
+                <a16:creationId xmlns:a16="http://schemas.microsoft.com/office/drawing/2014/main" id="{ADE84EE2-1CBB-A86A-316D-8D7F2A9E9D2D}"/>
+              </a:ext>
+            </a:extLst>
+          </p:cNvPr>
+          <p:cNvSpPr txBox="1"/>
+          <p:nvPr/>
+        </p:nvSpPr>
+        <p:spPr>
+          <a:xfrm>
+            <a:off x="8207192" y="2260717"/>
+            <a:ext cx="4055081" cy="369332"/>
+          </a:xfrm>
+          <a:prstGeom prst="rect">
+            <a:avLst/>
+          </a:prstGeom>
+          <a:noFill/>
+        </p:spPr>
+        <p:txBody>
+          <a:bodyPr wrap="square" rtlCol="0">
+            <a:spAutoFit/>
+          </a:bodyPr>
+          <a:lstStyle/>
+          <a:p>
+            <a:r>
+              <a:rPr lang="fr-FR" dirty="0"/>
+              <a:t>Stockage jusqu’à plusieurs mégaoctets.</a:t>
+            </a:r>
+          </a:p>
+        </p:txBody>
+      </p:sp>
+      <p:sp>
+        <p:nvSpPr>
+          <p:cNvPr id="27" name="ZoneTexte 26">
+            <a:extLst>
+              <a:ext uri="{FF2B5EF4-FFF2-40B4-BE49-F238E27FC236}">
+                <a16:creationId xmlns:a16="http://schemas.microsoft.com/office/drawing/2014/main" id="{91D711DB-F6FA-46D1-D92E-03F672C085B2}"/>
+              </a:ext>
+            </a:extLst>
+          </p:cNvPr>
+          <p:cNvSpPr txBox="1"/>
+          <p:nvPr/>
+        </p:nvSpPr>
+        <p:spPr>
+          <a:xfrm>
+            <a:off x="593109" y="3130406"/>
+            <a:ext cx="3156318" cy="646331"/>
+          </a:xfrm>
+          <a:prstGeom prst="rect">
+            <a:avLst/>
+          </a:prstGeom>
+          <a:noFill/>
+        </p:spPr>
+        <p:txBody>
+          <a:bodyPr wrap="square" rtlCol="0">
+            <a:spAutoFit/>
+          </a:bodyPr>
+          <a:lstStyle/>
+          <a:p>
+            <a:pPr algn="ctr"/>
+            <a:r>
+              <a:rPr lang="fr-FR" dirty="0"/>
+              <a:t>Durée de vie définie lors de la création (expires).</a:t>
+            </a:r>
+          </a:p>
+        </p:txBody>
+      </p:sp>
+      <p:sp>
+        <p:nvSpPr>
+          <p:cNvPr id="28" name="ZoneTexte 27">
+            <a:extLst>
+              <a:ext uri="{FF2B5EF4-FFF2-40B4-BE49-F238E27FC236}">
+                <a16:creationId xmlns:a16="http://schemas.microsoft.com/office/drawing/2014/main" id="{1257C5D0-55F2-BB55-CBD9-6BBB031A1228}"/>
+              </a:ext>
+            </a:extLst>
+          </p:cNvPr>
+          <p:cNvSpPr txBox="1"/>
+          <p:nvPr/>
+        </p:nvSpPr>
+        <p:spPr>
+          <a:xfrm>
+            <a:off x="3936657" y="3039759"/>
+            <a:ext cx="4248411" cy="646331"/>
+          </a:xfrm>
+          <a:prstGeom prst="rect">
+            <a:avLst/>
+          </a:prstGeom>
+          <a:noFill/>
+        </p:spPr>
+        <p:txBody>
+          <a:bodyPr wrap="square" rtlCol="0">
+            <a:spAutoFit/>
+          </a:bodyPr>
+          <a:lstStyle/>
+          <a:p>
+            <a:r>
+              <a:rPr lang="fr-FR" dirty="0"/>
+              <a:t>Persiste après la fermeture du navigateur, jusqu’à ce qu’il soit explicitement effacé.</a:t>
+            </a:r>
+          </a:p>
+        </p:txBody>
+      </p:sp>
+      <p:sp>
+        <p:nvSpPr>
+          <p:cNvPr id="29" name="ZoneTexte 28">
+            <a:extLst>
+              <a:ext uri="{FF2B5EF4-FFF2-40B4-BE49-F238E27FC236}">
+                <a16:creationId xmlns:a16="http://schemas.microsoft.com/office/drawing/2014/main" id="{15EFFD1A-94D7-0786-27D5-63302948BA78}"/>
+              </a:ext>
+            </a:extLst>
+          </p:cNvPr>
+          <p:cNvSpPr txBox="1"/>
+          <p:nvPr/>
+        </p:nvSpPr>
+        <p:spPr>
+          <a:xfrm>
+            <a:off x="8483410" y="3153406"/>
+            <a:ext cx="3592357" cy="369332"/>
+          </a:xfrm>
+          <a:prstGeom prst="rect">
+            <a:avLst/>
+          </a:prstGeom>
+          <a:noFill/>
+        </p:spPr>
+        <p:txBody>
+          <a:bodyPr wrap="square" rtlCol="0">
+            <a:spAutoFit/>
+          </a:bodyPr>
+          <a:lstStyle/>
+          <a:p>
+            <a:r>
+              <a:rPr lang="fr-FR" dirty="0"/>
+              <a:t>Limité à la durée de vie de l’onglet. </a:t>
+            </a:r>
+          </a:p>
+        </p:txBody>
+      </p:sp>
+      <p:sp>
+        <p:nvSpPr>
+          <p:cNvPr id="30" name="ZoneTexte 29">
+            <a:extLst>
+              <a:ext uri="{FF2B5EF4-FFF2-40B4-BE49-F238E27FC236}">
+                <a16:creationId xmlns:a16="http://schemas.microsoft.com/office/drawing/2014/main" id="{A49E7A1A-FE09-BE12-A797-ACC67AD83BEC}"/>
+              </a:ext>
+            </a:extLst>
+          </p:cNvPr>
+          <p:cNvSpPr txBox="1"/>
+          <p:nvPr/>
+        </p:nvSpPr>
+        <p:spPr>
+          <a:xfrm>
+            <a:off x="454659" y="4132620"/>
+            <a:ext cx="3329159" cy="369332"/>
+          </a:xfrm>
+          <a:prstGeom prst="rect">
+            <a:avLst/>
+          </a:prstGeom>
+          <a:noFill/>
+        </p:spPr>
+        <p:txBody>
+          <a:bodyPr wrap="square" rtlCol="0">
+            <a:spAutoFit/>
+          </a:bodyPr>
+          <a:lstStyle/>
+          <a:p>
+            <a:r>
+              <a:rPr lang="fr-FR" dirty="0"/>
+              <a:t>Accessible coté client et serveur. </a:t>
+            </a:r>
+          </a:p>
+        </p:txBody>
+      </p:sp>
+      <p:sp>
+        <p:nvSpPr>
+          <p:cNvPr id="31" name="ZoneTexte 30">
+            <a:extLst>
+              <a:ext uri="{FF2B5EF4-FFF2-40B4-BE49-F238E27FC236}">
+                <a16:creationId xmlns:a16="http://schemas.microsoft.com/office/drawing/2014/main" id="{016EE445-98CA-956E-A418-3C8F50AD66D0}"/>
+              </a:ext>
+            </a:extLst>
+          </p:cNvPr>
+          <p:cNvSpPr txBox="1"/>
+          <p:nvPr/>
+        </p:nvSpPr>
+        <p:spPr>
+          <a:xfrm>
+            <a:off x="4216330" y="4154358"/>
+            <a:ext cx="3574091" cy="646331"/>
+          </a:xfrm>
+          <a:prstGeom prst="rect">
+            <a:avLst/>
+          </a:prstGeom>
+          <a:noFill/>
+        </p:spPr>
+        <p:txBody>
+          <a:bodyPr wrap="square" rtlCol="0">
+            <a:spAutoFit/>
+          </a:bodyPr>
+          <a:lstStyle/>
+          <a:p>
+            <a:r>
+              <a:rPr lang="fr-FR" dirty="0"/>
+              <a:t>Accessible uniquement  coté client. </a:t>
+            </a:r>
+          </a:p>
+        </p:txBody>
+      </p:sp>
+      <p:sp>
+        <p:nvSpPr>
+          <p:cNvPr id="32" name="ZoneTexte 31">
+            <a:extLst>
+              <a:ext uri="{FF2B5EF4-FFF2-40B4-BE49-F238E27FC236}">
+                <a16:creationId xmlns:a16="http://schemas.microsoft.com/office/drawing/2014/main" id="{2B807861-D057-48A2-42E3-F22654ACDEB6}"/>
+              </a:ext>
+            </a:extLst>
+          </p:cNvPr>
+          <p:cNvSpPr txBox="1"/>
+          <p:nvPr/>
+        </p:nvSpPr>
+        <p:spPr>
+          <a:xfrm>
+            <a:off x="8426625" y="4154358"/>
+            <a:ext cx="3835648" cy="369332"/>
+          </a:xfrm>
+          <a:prstGeom prst="rect">
+            <a:avLst/>
+          </a:prstGeom>
+          <a:noFill/>
+        </p:spPr>
+        <p:txBody>
+          <a:bodyPr wrap="square" rtlCol="0">
+            <a:spAutoFit/>
+          </a:bodyPr>
+          <a:lstStyle/>
+          <a:p>
+            <a:r>
+              <a:rPr lang="fr-FR" dirty="0"/>
+              <a:t>Accessible uniquement  coté client. </a:t>
+            </a:r>
+          </a:p>
+        </p:txBody>
+      </p:sp>
+      <p:sp>
+        <p:nvSpPr>
+          <p:cNvPr id="33" name="ZoneTexte 32">
+            <a:extLst>
+              <a:ext uri="{FF2B5EF4-FFF2-40B4-BE49-F238E27FC236}">
+                <a16:creationId xmlns:a16="http://schemas.microsoft.com/office/drawing/2014/main" id="{0DAA4D47-B260-8C75-E88C-0C0D03F57F37}"/>
+              </a:ext>
+            </a:extLst>
+          </p:cNvPr>
+          <p:cNvSpPr txBox="1"/>
+          <p:nvPr/>
+        </p:nvSpPr>
+        <p:spPr>
+          <a:xfrm>
+            <a:off x="82358" y="5120641"/>
+            <a:ext cx="3791883" cy="646331"/>
+          </a:xfrm>
+          <a:prstGeom prst="rect">
+            <a:avLst/>
+          </a:prstGeom>
+          <a:noFill/>
+        </p:spPr>
+        <p:txBody>
+          <a:bodyPr wrap="square" rtlCol="0">
+            <a:spAutoFit/>
+          </a:bodyPr>
+          <a:lstStyle/>
+          <a:p>
+            <a:pPr algn="ctr"/>
+            <a:r>
+              <a:rPr lang="fr-FR" dirty="0"/>
+              <a:t>Accessible sur tous les onglets d’une même origine. </a:t>
+            </a:r>
+          </a:p>
+        </p:txBody>
+      </p:sp>
+      <p:sp>
+        <p:nvSpPr>
+          <p:cNvPr id="34" name="ZoneTexte 33">
+            <a:extLst>
+              <a:ext uri="{FF2B5EF4-FFF2-40B4-BE49-F238E27FC236}">
+                <a16:creationId xmlns:a16="http://schemas.microsoft.com/office/drawing/2014/main" id="{04F360E5-F156-FBDF-2B8A-7EB4A5EE6E27}"/>
+              </a:ext>
+            </a:extLst>
+          </p:cNvPr>
+          <p:cNvSpPr txBox="1"/>
+          <p:nvPr/>
+        </p:nvSpPr>
+        <p:spPr>
+          <a:xfrm>
+            <a:off x="4055086" y="5120640"/>
+            <a:ext cx="4197389" cy="646331"/>
+          </a:xfrm>
+          <a:prstGeom prst="rect">
+            <a:avLst/>
+          </a:prstGeom>
+          <a:noFill/>
+        </p:spPr>
+        <p:txBody>
+          <a:bodyPr wrap="square" rtlCol="0">
+            <a:spAutoFit/>
+          </a:bodyPr>
+          <a:lstStyle/>
+          <a:p>
+            <a:pPr algn="ctr"/>
+            <a:r>
+              <a:rPr lang="fr-FR" dirty="0"/>
+              <a:t>Accessible sur tous les onglets d’une même origine. </a:t>
+            </a:r>
+          </a:p>
+        </p:txBody>
+      </p:sp>
+      <p:sp>
+        <p:nvSpPr>
+          <p:cNvPr id="35" name="ZoneTexte 34">
+            <a:extLst>
+              <a:ext uri="{FF2B5EF4-FFF2-40B4-BE49-F238E27FC236}">
+                <a16:creationId xmlns:a16="http://schemas.microsoft.com/office/drawing/2014/main" id="{A7A30F07-E02E-6CE8-32CD-5933A25E64D8}"/>
+              </a:ext>
+            </a:extLst>
+          </p:cNvPr>
+          <p:cNvSpPr txBox="1"/>
+          <p:nvPr/>
+        </p:nvSpPr>
+        <p:spPr>
+          <a:xfrm>
+            <a:off x="8980249" y="5147900"/>
+            <a:ext cx="2897105" cy="369332"/>
+          </a:xfrm>
+          <a:prstGeom prst="rect">
+            <a:avLst/>
+          </a:prstGeom>
+          <a:noFill/>
+        </p:spPr>
+        <p:txBody>
+          <a:bodyPr wrap="square" rtlCol="0">
+            <a:spAutoFit/>
+          </a:bodyPr>
+          <a:lstStyle/>
+          <a:p>
+            <a:r>
+              <a:rPr lang="fr-FR" dirty="0"/>
+              <a:t>Limité à un seul onglet. </a:t>
+            </a:r>
+          </a:p>
+        </p:txBody>
+      </p:sp>
+    </p:spTree>
+    <p:extLst>
+      <p:ext uri="{BB962C8B-B14F-4D97-AF65-F5344CB8AC3E}">
+        <p14:creationId xmlns:p14="http://schemas.microsoft.com/office/powerpoint/2010/main" val="1098382360"/>
+      </p:ext>
+    </p:extLst>
+  </p:cSld>
+  <p:clrMapOvr>
+    <a:masterClrMapping/>
+  </p:clrMapOvr>
+</p:sld>
+</file>
+
 <file path=ppt/slides/slide12.xml><?xml version="1.0" encoding="utf-8"?>
 <p:sld xmlns:a="http://schemas.openxmlformats.org/drawingml/2006/main" xmlns:r="http://schemas.openxmlformats.org/officeDocument/2006/relationships" xmlns:p="http://schemas.openxmlformats.org/presentationml/2006/main">
   <p:cSld>
@@ -8456,6 +10572,179 @@
     <p:extLst>
       <p:ext uri="{BB962C8B-B14F-4D97-AF65-F5344CB8AC3E}">
         <p14:creationId xmlns:p14="http://schemas.microsoft.com/office/powerpoint/2010/main" val="2013872514"/>
+      </p:ext>
+    </p:extLst>
+  </p:cSld>
+  <p:clrMapOvr>
+    <a:masterClrMapping/>
+  </p:clrMapOvr>
+</p:sld>
+</file>
+
+<file path=ppt/slides/slide120.xml><?xml version="1.0" encoding="utf-8"?>
+<p:sld xmlns:a="http://schemas.openxmlformats.org/drawingml/2006/main" xmlns:r="http://schemas.openxmlformats.org/officeDocument/2006/relationships" xmlns:p="http://schemas.openxmlformats.org/presentationml/2006/main">
+  <p:cSld>
+    <p:spTree>
+      <p:nvGrpSpPr>
+        <p:cNvPr id="1" name=""/>
+        <p:cNvGrpSpPr/>
+        <p:nvPr/>
+      </p:nvGrpSpPr>
+      <p:grpSpPr>
+        <a:xfrm>
+          <a:off x="0" y="0"/>
+          <a:ext cx="0" cy="0"/>
+          <a:chOff x="0" y="0"/>
+          <a:chExt cx="0" cy="0"/>
+        </a:xfrm>
+      </p:grpSpPr>
+      <p:sp>
+        <p:nvSpPr>
+          <p:cNvPr id="3" name="Titre 1">
+            <a:extLst>
+              <a:ext uri="{FF2B5EF4-FFF2-40B4-BE49-F238E27FC236}">
+                <a16:creationId xmlns:a16="http://schemas.microsoft.com/office/drawing/2014/main" id="{E7373E66-041F-37D5-0ADF-25BA87ABC979}"/>
+              </a:ext>
+            </a:extLst>
+          </p:cNvPr>
+          <p:cNvSpPr>
+            <a:spLocks noGrp="1"/>
+          </p:cNvSpPr>
+          <p:nvPr>
+            <p:ph type="title"/>
+          </p:nvPr>
+        </p:nvSpPr>
+        <p:spPr>
+          <a:xfrm>
+            <a:off x="1097279" y="286603"/>
+            <a:ext cx="11167425" cy="1450757"/>
+          </a:xfrm>
+        </p:spPr>
+        <p:txBody>
+          <a:bodyPr>
+            <a:normAutofit/>
+          </a:bodyPr>
+          <a:lstStyle/>
+          <a:p>
+            <a:r>
+              <a:rPr lang="fr-FR" dirty="0"/>
+              <a:t>XII- Stocker des données  </a:t>
+            </a:r>
+            <a:br>
+              <a:rPr lang="fr-FR" dirty="0"/>
+            </a:br>
+            <a:r>
+              <a:rPr lang="fr-FR" dirty="0"/>
+              <a:t>	</a:t>
+            </a:r>
+            <a:r>
+              <a:rPr lang="fr-FR" sz="3600" i="1" dirty="0"/>
+              <a:t>  2. </a:t>
+            </a:r>
+            <a:r>
+              <a:rPr lang="fr-FR" sz="3600" i="1" dirty="0" err="1"/>
+              <a:t>LocalStorage</a:t>
+            </a:r>
+            <a:r>
+              <a:rPr lang="fr-FR" sz="3600" i="1" dirty="0"/>
+              <a:t> &amp; </a:t>
+            </a:r>
+            <a:r>
+              <a:rPr lang="fr-FR" sz="3600" i="1" dirty="0" err="1"/>
+              <a:t>SessionStorage</a:t>
+            </a:r>
+            <a:r>
+              <a:rPr lang="fr-FR" sz="3600" i="1" dirty="0"/>
+              <a:t> </a:t>
+            </a:r>
+          </a:p>
+        </p:txBody>
+      </p:sp>
+      <p:sp>
+        <p:nvSpPr>
+          <p:cNvPr id="5" name="ZoneTexte 4">
+            <a:extLst>
+              <a:ext uri="{FF2B5EF4-FFF2-40B4-BE49-F238E27FC236}">
+                <a16:creationId xmlns:a16="http://schemas.microsoft.com/office/drawing/2014/main" id="{ABC507A4-5782-8551-CCC2-B957C6BF7E2B}"/>
+              </a:ext>
+            </a:extLst>
+          </p:cNvPr>
+          <p:cNvSpPr txBox="1"/>
+          <p:nvPr/>
+        </p:nvSpPr>
+        <p:spPr>
+          <a:xfrm>
+            <a:off x="239367" y="3861024"/>
+            <a:ext cx="10855354" cy="646331"/>
+          </a:xfrm>
+          <a:prstGeom prst="rect">
+            <a:avLst/>
+          </a:prstGeom>
+          <a:noFill/>
+        </p:spPr>
+        <p:txBody>
+          <a:bodyPr wrap="square" rtlCol="0">
+            <a:spAutoFit/>
+          </a:bodyPr>
+          <a:lstStyle/>
+          <a:p>
+            <a:br>
+              <a:rPr lang="fr-FR" b="0" dirty="0">
+                <a:effectLst/>
+              </a:rPr>
+            </a:br>
+            <a:endParaRPr lang="fr-FR" dirty="0"/>
+          </a:p>
+        </p:txBody>
+      </p:sp>
+      <p:sp>
+        <p:nvSpPr>
+          <p:cNvPr id="25" name="ZoneTexte 24">
+            <a:extLst>
+              <a:ext uri="{FF2B5EF4-FFF2-40B4-BE49-F238E27FC236}">
+                <a16:creationId xmlns:a16="http://schemas.microsoft.com/office/drawing/2014/main" id="{ABF1DF41-853A-1226-A4B2-1047A425F682}"/>
+              </a:ext>
+            </a:extLst>
+          </p:cNvPr>
+          <p:cNvSpPr txBox="1"/>
+          <p:nvPr/>
+        </p:nvSpPr>
+        <p:spPr>
+          <a:xfrm>
+            <a:off x="1097279" y="2996976"/>
+            <a:ext cx="10284902" cy="1815882"/>
+          </a:xfrm>
+          <a:prstGeom prst="rect">
+            <a:avLst/>
+          </a:prstGeom>
+          <a:noFill/>
+        </p:spPr>
+        <p:txBody>
+          <a:bodyPr wrap="square" rtlCol="0">
+            <a:spAutoFit/>
+          </a:bodyPr>
+          <a:lstStyle/>
+          <a:p>
+            <a:r>
+              <a:rPr lang="fr-FR" sz="2800" dirty="0"/>
+              <a:t>Exercice: </a:t>
+            </a:r>
+          </a:p>
+          <a:p>
+            <a:endParaRPr lang="fr-FR" sz="2800" dirty="0"/>
+          </a:p>
+          <a:p>
+            <a:r>
+              <a:rPr lang="fr-FR" sz="2800" dirty="0"/>
+              <a:t>Réaliser un bouton qui permet de passer en mode sombre et qui se souvient de la dernière préférence choisie</a:t>
+            </a:r>
+          </a:p>
+        </p:txBody>
+      </p:sp>
+    </p:spTree>
+    <p:extLst>
+      <p:ext uri="{BB962C8B-B14F-4D97-AF65-F5344CB8AC3E}">
+        <p14:creationId xmlns:p14="http://schemas.microsoft.com/office/powerpoint/2010/main" val="3135482171"/>
       </p:ext>
     </p:extLst>
   </p:cSld>

</xml_diff>